<commit_message>
Editado aula de POO
</commit_message>
<xml_diff>
--- a/Euripedes Simões de Paula/Java/Programação Orientada a Objetos/Programação Orientada a Objetos.pptx
+++ b/Euripedes Simões de Paula/Java/Programação Orientada a Objetos/Programação Orientada a Objetos.pptx
@@ -15,6 +15,7 @@
     <p:sldId id="263" r:id="rId9"/>
     <p:sldId id="264" r:id="rId10"/>
     <p:sldId id="265" r:id="rId11"/>
+    <p:sldId id="266" r:id="rId12"/>
   </p:sldIdLst>
   <p:sldSz cx="12192000" cy="6858000"/>
   <p:notesSz cx="6858000" cy="9144000"/>
@@ -3957,7 +3958,7 @@
         <p:spPr>
           <a:xfrm>
             <a:off x="1097279" y="1845734"/>
-            <a:ext cx="7441809" cy="4023360"/>
+            <a:ext cx="8498682" cy="4023360"/>
           </a:xfrm>
         </p:spPr>
         <p:txBody>
@@ -4042,13 +4043,13 @@
           <p:nvPr>
             <p:extLst>
               <p:ext uri="{D42A27DB-BD31-4B8C-83A1-F6EECF244321}">
-                <p14:modId xmlns:p14="http://schemas.microsoft.com/office/powerpoint/2010/main" val="1069660893"/>
+                <p14:modId xmlns:p14="http://schemas.microsoft.com/office/powerpoint/2010/main" val="2672377200"/>
               </p:ext>
             </p:extLst>
           </p:nvPr>
         </p:nvGraphicFramePr>
         <p:xfrm>
-          <a:off x="8776144" y="382694"/>
+          <a:off x="9595961" y="382694"/>
           <a:ext cx="2379536" cy="5486400"/>
         </p:xfrm>
         <a:graphic>
@@ -5418,14 +5419,14 @@
           <p:nvPr>
             <p:extLst>
               <p:ext uri="{D42A27DB-BD31-4B8C-83A1-F6EECF244321}">
-                <p14:modId xmlns:p14="http://schemas.microsoft.com/office/powerpoint/2010/main" val="672083814"/>
+                <p14:modId xmlns:p14="http://schemas.microsoft.com/office/powerpoint/2010/main" val="669680589"/>
               </p:ext>
             </p:extLst>
           </p:nvPr>
         </p:nvGraphicFramePr>
         <p:xfrm>
-          <a:off x="1997612" y="1760220"/>
-          <a:ext cx="1659988" cy="3337560"/>
+          <a:off x="4613156" y="3828197"/>
+          <a:ext cx="1659988" cy="2468880"/>
         </p:xfrm>
         <a:graphic>
           <a:graphicData uri="http://schemas.openxmlformats.org/drawingml/2006/table">
@@ -5442,14 +5443,14 @@
                   </a:extLst>
                 </a:gridCol>
               </a:tblGrid>
-              <a:tr h="370840">
+              <a:tr h="222543">
                 <a:tc>
                   <a:txBody>
                     <a:bodyPr/>
                     <a:lstStyle/>
                     <a:p>
                       <a:r>
-                        <a:rPr lang="pt-BR" dirty="0"/>
+                        <a:rPr lang="pt-BR" sz="1200" dirty="0"/>
                         <a:t>Gato</a:t>
                       </a:r>
                     </a:p>
@@ -5462,21 +5463,21 @@
                   </a:ext>
                 </a:extLst>
               </a:tr>
-              <a:tr h="370840">
+              <a:tr h="222543">
                 <a:tc>
                   <a:txBody>
                     <a:bodyPr/>
                     <a:lstStyle/>
                     <a:p>
                       <a:r>
-                        <a:rPr lang="pt-BR" dirty="0"/>
+                        <a:rPr lang="pt-BR" sz="1200" dirty="0"/>
                         <a:t>-id  </a:t>
                       </a:r>
                       <a:r>
-                        <a:rPr lang="pt-BR" dirty="0" err="1"/>
+                        <a:rPr lang="pt-BR" sz="1200" dirty="0" err="1"/>
                         <a:t>int</a:t>
                       </a:r>
-                      <a:endParaRPr lang="pt-BR" dirty="0"/>
+                      <a:endParaRPr lang="pt-BR" sz="1200" dirty="0"/>
                     </a:p>
                   </a:txBody>
                   <a:tcPr/>
@@ -5487,21 +5488,21 @@
                   </a:ext>
                 </a:extLst>
               </a:tr>
-              <a:tr h="370840">
+              <a:tr h="222543">
                 <a:tc>
                   <a:txBody>
                     <a:bodyPr/>
                     <a:lstStyle/>
                     <a:p>
                       <a:r>
-                        <a:rPr lang="pt-BR" dirty="0"/>
+                        <a:rPr lang="pt-BR" sz="1200" dirty="0"/>
                         <a:t>-nome : </a:t>
                       </a:r>
                       <a:r>
-                        <a:rPr lang="pt-BR" dirty="0" err="1"/>
+                        <a:rPr lang="pt-BR" sz="1200" dirty="0" err="1"/>
                         <a:t>String</a:t>
                       </a:r>
-                      <a:endParaRPr lang="pt-BR" dirty="0"/>
+                      <a:endParaRPr lang="pt-BR" sz="1200" dirty="0"/>
                     </a:p>
                   </a:txBody>
                   <a:tcPr/>
@@ -5512,29 +5513,29 @@
                   </a:ext>
                 </a:extLst>
               </a:tr>
-              <a:tr h="370840">
+              <a:tr h="222543">
                 <a:tc>
                   <a:txBody>
                     <a:bodyPr/>
                     <a:lstStyle/>
                     <a:p>
                       <a:r>
-                        <a:rPr lang="pt-BR" dirty="0"/>
+                        <a:rPr lang="pt-BR" sz="1200" dirty="0"/>
                         <a:t>-</a:t>
                       </a:r>
                       <a:r>
-                        <a:rPr lang="pt-BR" dirty="0" err="1"/>
+                        <a:rPr lang="pt-BR" sz="1200" dirty="0" err="1"/>
                         <a:t>raca</a:t>
                       </a:r>
                       <a:r>
-                        <a:rPr lang="pt-BR" dirty="0"/>
+                        <a:rPr lang="pt-BR" sz="1200" dirty="0"/>
                         <a:t> : </a:t>
                       </a:r>
                       <a:r>
-                        <a:rPr lang="pt-BR" dirty="0" err="1"/>
+                        <a:rPr lang="pt-BR" sz="1200" dirty="0" err="1"/>
                         <a:t>String</a:t>
                       </a:r>
-                      <a:endParaRPr lang="pt-BR" dirty="0"/>
+                      <a:endParaRPr lang="pt-BR" sz="1200" dirty="0"/>
                     </a:p>
                   </a:txBody>
                   <a:tcPr/>
@@ -5545,21 +5546,21 @@
                   </a:ext>
                 </a:extLst>
               </a:tr>
-              <a:tr h="370840">
+              <a:tr h="222543">
                 <a:tc>
                   <a:txBody>
                     <a:bodyPr/>
                     <a:lstStyle/>
                     <a:p>
                       <a:r>
-                        <a:rPr lang="pt-BR" dirty="0"/>
+                        <a:rPr lang="pt-BR" sz="1200" dirty="0"/>
                         <a:t>-idade : </a:t>
                       </a:r>
                       <a:r>
-                        <a:rPr lang="pt-BR" dirty="0" err="1"/>
+                        <a:rPr lang="pt-BR" sz="1200" dirty="0" err="1"/>
                         <a:t>int</a:t>
                       </a:r>
-                      <a:endParaRPr lang="pt-BR" dirty="0"/>
+                      <a:endParaRPr lang="pt-BR" sz="1200" dirty="0"/>
                     </a:p>
                   </a:txBody>
                   <a:tcPr/>
@@ -5570,21 +5571,21 @@
                   </a:ext>
                 </a:extLst>
               </a:tr>
-              <a:tr h="370840">
+              <a:tr h="222543">
                 <a:tc>
                   <a:txBody>
                     <a:bodyPr/>
                     <a:lstStyle/>
                     <a:p>
                       <a:r>
-                        <a:rPr lang="pt-BR" dirty="0"/>
+                        <a:rPr lang="pt-BR" sz="1200" dirty="0"/>
                         <a:t>-peso : </a:t>
                       </a:r>
                       <a:r>
-                        <a:rPr lang="pt-BR" dirty="0" err="1"/>
+                        <a:rPr lang="pt-BR" sz="1200" dirty="0" err="1"/>
                         <a:t>float</a:t>
                       </a:r>
-                      <a:endParaRPr lang="pt-BR" dirty="0"/>
+                      <a:endParaRPr lang="pt-BR" sz="1200" dirty="0"/>
                     </a:p>
                   </a:txBody>
                   <a:tcPr/>
@@ -5595,21 +5596,21 @@
                   </a:ext>
                 </a:extLst>
               </a:tr>
-              <a:tr h="370840">
+              <a:tr h="222543">
                 <a:tc>
                   <a:txBody>
                     <a:bodyPr/>
                     <a:lstStyle/>
                     <a:p>
                       <a:r>
-                        <a:rPr lang="pt-BR" dirty="0"/>
+                        <a:rPr lang="pt-BR" sz="1200" dirty="0"/>
                         <a:t>#miar() : </a:t>
                       </a:r>
                       <a:r>
-                        <a:rPr lang="pt-BR" dirty="0" err="1"/>
+                        <a:rPr lang="pt-BR" sz="1200" dirty="0" err="1"/>
                         <a:t>void</a:t>
                       </a:r>
-                      <a:endParaRPr lang="pt-BR" dirty="0"/>
+                      <a:endParaRPr lang="pt-BR" sz="1200" dirty="0"/>
                     </a:p>
                   </a:txBody>
                   <a:tcPr/>
@@ -5620,21 +5621,21 @@
                   </a:ext>
                 </a:extLst>
               </a:tr>
-              <a:tr h="370840">
+              <a:tr h="222543">
                 <a:tc>
                   <a:txBody>
                     <a:bodyPr/>
                     <a:lstStyle/>
                     <a:p>
                       <a:r>
-                        <a:rPr lang="pt-BR" dirty="0"/>
+                        <a:rPr lang="pt-BR" sz="1200" dirty="0"/>
                         <a:t>+comer() : </a:t>
                       </a:r>
                       <a:r>
-                        <a:rPr lang="pt-BR" dirty="0" err="1"/>
+                        <a:rPr lang="pt-BR" sz="1200" dirty="0" err="1"/>
                         <a:t>void</a:t>
                       </a:r>
-                      <a:endParaRPr lang="pt-BR" dirty="0"/>
+                      <a:endParaRPr lang="pt-BR" sz="1200" dirty="0"/>
                     </a:p>
                   </a:txBody>
                   <a:tcPr/>
@@ -5645,21 +5646,21 @@
                   </a:ext>
                 </a:extLst>
               </a:tr>
-              <a:tr h="370840">
+              <a:tr h="222543">
                 <a:tc>
                   <a:txBody>
                     <a:bodyPr/>
                     <a:lstStyle/>
                     <a:p>
                       <a:r>
-                        <a:rPr lang="pt-BR" dirty="0"/>
+                        <a:rPr lang="pt-BR" sz="1200" dirty="0"/>
                         <a:t>+dormir() : </a:t>
                       </a:r>
                       <a:r>
-                        <a:rPr lang="pt-BR" dirty="0" err="1"/>
+                        <a:rPr lang="pt-BR" sz="1200" dirty="0" err="1"/>
                         <a:t>void</a:t>
                       </a:r>
-                      <a:endParaRPr lang="pt-BR" dirty="0"/>
+                      <a:endParaRPr lang="pt-BR" sz="1200" dirty="0"/>
                     </a:p>
                   </a:txBody>
                   <a:tcPr/>
@@ -5688,8 +5689,8 @@
         </p:nvSpPr>
         <p:spPr>
           <a:xfrm>
-            <a:off x="4417255" y="1760220"/>
-            <a:ext cx="1448973" cy="3337560"/>
+            <a:off x="2448826" y="4294189"/>
+            <a:ext cx="1448973" cy="2002888"/>
           </a:xfrm>
           <a:prstGeom prst="roundRect">
             <a:avLst/>
@@ -5717,45 +5718,45 @@
           <a:p>
             <a:pPr algn="ctr"/>
             <a:r>
-              <a:rPr lang="pt-BR" dirty="0"/>
+              <a:rPr lang="pt-BR" sz="1400" dirty="0"/>
               <a:t>Visibilidade</a:t>
             </a:r>
           </a:p>
           <a:p>
             <a:pPr algn="ctr"/>
-            <a:endParaRPr lang="pt-BR" dirty="0"/>
+            <a:endParaRPr lang="pt-BR" sz="1400" dirty="0"/>
           </a:p>
           <a:p>
             <a:pPr algn="ctr"/>
             <a:r>
-              <a:rPr lang="pt-BR" dirty="0"/>
+              <a:rPr lang="pt-BR" sz="1400" dirty="0"/>
               <a:t>+ </a:t>
             </a:r>
             <a:r>
-              <a:rPr lang="pt-BR" dirty="0" err="1"/>
+              <a:rPr lang="pt-BR" sz="1400" dirty="0" err="1"/>
               <a:t>Public</a:t>
             </a:r>
-            <a:endParaRPr lang="pt-BR" dirty="0"/>
+            <a:endParaRPr lang="pt-BR" sz="1400" dirty="0"/>
           </a:p>
           <a:p>
             <a:pPr algn="ctr"/>
             <a:r>
-              <a:rPr lang="pt-BR" dirty="0" err="1"/>
+              <a:rPr lang="pt-BR" sz="1400" dirty="0" err="1"/>
               <a:t>Friendly</a:t>
             </a:r>
-            <a:endParaRPr lang="pt-BR" dirty="0"/>
+            <a:endParaRPr lang="pt-BR" sz="1400" dirty="0"/>
           </a:p>
           <a:p>
             <a:pPr algn="ctr"/>
             <a:r>
-              <a:rPr lang="pt-BR" dirty="0"/>
+              <a:rPr lang="pt-BR" sz="1400" dirty="0"/>
               <a:t>#protected</a:t>
             </a:r>
           </a:p>
           <a:p>
             <a:pPr algn="ctr"/>
             <a:r>
-              <a:rPr lang="pt-BR" dirty="0"/>
+              <a:rPr lang="pt-BR" sz="1400" dirty="0"/>
               <a:t>- Private</a:t>
             </a:r>
           </a:p>
@@ -5765,6 +5766,1658 @@
     <p:extLst>
       <p:ext uri="{BB962C8B-B14F-4D97-AF65-F5344CB8AC3E}">
         <p14:creationId xmlns:p14="http://schemas.microsoft.com/office/powerpoint/2010/main" val="1276696065"/>
+      </p:ext>
+    </p:extLst>
+  </p:cSld>
+  <p:clrMapOvr>
+    <a:masterClrMapping/>
+  </p:clrMapOvr>
+</p:sld>
+</file>
+
+<file path=ppt/slides/slide11.xml><?xml version="1.0" encoding="utf-8"?>
+<p:sld xmlns:a="http://schemas.openxmlformats.org/drawingml/2006/main" xmlns:r="http://schemas.openxmlformats.org/officeDocument/2006/relationships" xmlns:p="http://schemas.openxmlformats.org/presentationml/2006/main">
+  <p:cSld>
+    <p:spTree>
+      <p:nvGrpSpPr>
+        <p:cNvPr id="1" name=""/>
+        <p:cNvGrpSpPr/>
+        <p:nvPr/>
+      </p:nvGrpSpPr>
+      <p:grpSpPr>
+        <a:xfrm>
+          <a:off x="0" y="0"/>
+          <a:ext cx="0" cy="0"/>
+          <a:chOff x="0" y="0"/>
+          <a:chExt cx="0" cy="0"/>
+        </a:xfrm>
+      </p:grpSpPr>
+      <p:sp>
+        <p:nvSpPr>
+          <p:cNvPr id="2" name="Título 1">
+            <a:extLst>
+              <a:ext uri="{FF2B5EF4-FFF2-40B4-BE49-F238E27FC236}">
+                <a16:creationId xmlns:a16="http://schemas.microsoft.com/office/drawing/2014/main" id="{DFA4C97B-A4B4-FF8B-2726-264C74B961DD}"/>
+              </a:ext>
+            </a:extLst>
+          </p:cNvPr>
+          <p:cNvSpPr>
+            <a:spLocks noGrp="1"/>
+          </p:cNvSpPr>
+          <p:nvPr>
+            <p:ph type="title"/>
+          </p:nvPr>
+        </p:nvSpPr>
+        <p:spPr/>
+        <p:txBody>
+          <a:bodyPr/>
+          <a:lstStyle/>
+          <a:p>
+            <a:r>
+              <a:rPr lang="pt-BR" dirty="0"/>
+              <a:t>CLASSES</a:t>
+            </a:r>
+          </a:p>
+        </p:txBody>
+      </p:sp>
+      <p:sp>
+        <p:nvSpPr>
+          <p:cNvPr id="3" name="Espaço Reservado para Conteúdo 2">
+            <a:extLst>
+              <a:ext uri="{FF2B5EF4-FFF2-40B4-BE49-F238E27FC236}">
+                <a16:creationId xmlns:a16="http://schemas.microsoft.com/office/drawing/2014/main" id="{69FCF1EF-6B42-806B-1C74-12D36B66A7D4}"/>
+              </a:ext>
+            </a:extLst>
+          </p:cNvPr>
+          <p:cNvSpPr>
+            <a:spLocks noGrp="1"/>
+          </p:cNvSpPr>
+          <p:nvPr>
+            <p:ph idx="1"/>
+          </p:nvPr>
+        </p:nvSpPr>
+        <p:spPr>
+          <a:xfrm>
+            <a:off x="1097278" y="1845734"/>
+            <a:ext cx="10058399" cy="4023360"/>
+          </a:xfrm>
+        </p:spPr>
+        <p:txBody>
+          <a:bodyPr>
+            <a:normAutofit/>
+          </a:bodyPr>
+          <a:lstStyle/>
+          <a:p>
+            <a:r>
+              <a:rPr lang="pt-BR" dirty="0"/>
+              <a:t>Assim é a organização de um Diagrama de Classe:</a:t>
+            </a:r>
+          </a:p>
+        </p:txBody>
+      </p:sp>
+      <p:graphicFrame>
+        <p:nvGraphicFramePr>
+          <p:cNvPr id="5" name="Tabela 4">
+            <a:extLst>
+              <a:ext uri="{FF2B5EF4-FFF2-40B4-BE49-F238E27FC236}">
+                <a16:creationId xmlns:a16="http://schemas.microsoft.com/office/drawing/2014/main" id="{59EFE0FD-3B69-8BD3-2373-F3542538AB6E}"/>
+              </a:ext>
+            </a:extLst>
+          </p:cNvPr>
+          <p:cNvGraphicFramePr>
+            <a:graphicFrameLocks noGrp="1"/>
+          </p:cNvGraphicFramePr>
+          <p:nvPr>
+            <p:extLst>
+              <p:ext uri="{D42A27DB-BD31-4B8C-83A1-F6EECF244321}">
+                <p14:modId xmlns:p14="http://schemas.microsoft.com/office/powerpoint/2010/main" val="343482403"/>
+              </p:ext>
+            </p:extLst>
+          </p:nvPr>
+        </p:nvGraphicFramePr>
+        <p:xfrm>
+          <a:off x="4835895" y="2407920"/>
+          <a:ext cx="2111200" cy="3291840"/>
+        </p:xfrm>
+        <a:graphic>
+          <a:graphicData uri="http://schemas.openxmlformats.org/drawingml/2006/table">
+            <a:tbl>
+              <a:tblPr firstRow="1" bandRow="1">
+                <a:tableStyleId>{F2DE63D5-997A-4646-A377-4702673A728D}</a:tableStyleId>
+              </a:tblPr>
+              <a:tblGrid>
+                <a:gridCol w="2111200">
+                  <a:extLst>
+                    <a:ext uri="{9D8B030D-6E8A-4147-A177-3AD203B41FA5}">
+                      <a16:colId xmlns:a16="http://schemas.microsoft.com/office/drawing/2014/main" val="1891446650"/>
+                    </a:ext>
+                  </a:extLst>
+                </a:gridCol>
+              </a:tblGrid>
+              <a:tr h="365760">
+                <a:tc>
+                  <a:txBody>
+                    <a:bodyPr/>
+                    <a:lstStyle/>
+                    <a:p>
+                      <a:pPr algn="ctr"/>
+                      <a:r>
+                        <a:rPr lang="pt-BR" sz="1800" b="1" dirty="0">
+                          <a:solidFill>
+                            <a:schemeClr val="tx1"/>
+                          </a:solidFill>
+                        </a:rPr>
+                        <a:t>Gato</a:t>
+                      </a:r>
+                    </a:p>
+                  </a:txBody>
+                  <a:tcPr>
+                    <a:lnL w="12700" cap="flat" cmpd="sng" algn="ctr">
+                      <a:solidFill>
+                        <a:schemeClr val="accent3">
+                          <a:lumMod val="60000"/>
+                          <a:lumOff val="40000"/>
+                        </a:schemeClr>
+                      </a:solidFill>
+                      <a:prstDash val="solid"/>
+                      <a:round/>
+                      <a:headEnd type="none" w="med" len="med"/>
+                      <a:tailEnd type="none" w="med" len="med"/>
+                    </a:lnL>
+                    <a:lnR w="12700" cap="flat" cmpd="sng" algn="ctr">
+                      <a:solidFill>
+                        <a:schemeClr val="accent3">
+                          <a:lumMod val="60000"/>
+                          <a:lumOff val="40000"/>
+                        </a:schemeClr>
+                      </a:solidFill>
+                      <a:prstDash val="solid"/>
+                      <a:round/>
+                      <a:headEnd type="none" w="med" len="med"/>
+                      <a:tailEnd type="none" w="med" len="med"/>
+                    </a:lnR>
+                    <a:lnT w="12700" cap="flat" cmpd="sng" algn="ctr">
+                      <a:solidFill>
+                        <a:schemeClr val="accent3">
+                          <a:lumMod val="60000"/>
+                          <a:lumOff val="40000"/>
+                        </a:schemeClr>
+                      </a:solidFill>
+                      <a:prstDash val="solid"/>
+                      <a:round/>
+                      <a:headEnd type="none" w="med" len="med"/>
+                      <a:tailEnd type="none" w="med" len="med"/>
+                    </a:lnT>
+                    <a:lnB w="12700" cap="flat" cmpd="sng" algn="ctr">
+                      <a:noFill/>
+                      <a:prstDash val="solid"/>
+                    </a:lnB>
+                  </a:tcPr>
+                </a:tc>
+                <a:extLst>
+                  <a:ext uri="{0D108BD9-81ED-4DB2-BD59-A6C34878D82A}">
+                    <a16:rowId xmlns:a16="http://schemas.microsoft.com/office/drawing/2014/main" val="2627390596"/>
+                  </a:ext>
+                </a:extLst>
+              </a:tr>
+              <a:tr h="365760">
+                <a:tc>
+                  <a:txBody>
+                    <a:bodyPr/>
+                    <a:lstStyle/>
+                    <a:p>
+                      <a:r>
+                        <a:rPr lang="pt-BR" sz="1800" dirty="0">
+                          <a:solidFill>
+                            <a:schemeClr val="tx1"/>
+                          </a:solidFill>
+                        </a:rPr>
+                        <a:t>-id  </a:t>
+                      </a:r>
+                      <a:r>
+                        <a:rPr lang="pt-BR" sz="1800" dirty="0" err="1">
+                          <a:solidFill>
+                            <a:schemeClr val="tx1"/>
+                          </a:solidFill>
+                        </a:rPr>
+                        <a:t>int</a:t>
+                      </a:r>
+                      <a:endParaRPr lang="pt-BR" sz="1800" dirty="0">
+                        <a:solidFill>
+                          <a:schemeClr val="tx1"/>
+                        </a:solidFill>
+                      </a:endParaRPr>
+                    </a:p>
+                  </a:txBody>
+                  <a:tcPr>
+                    <a:lnL w="12700" cap="flat" cmpd="sng" algn="ctr">
+                      <a:solidFill>
+                        <a:schemeClr val="accent3">
+                          <a:lumMod val="60000"/>
+                          <a:lumOff val="40000"/>
+                        </a:schemeClr>
+                      </a:solidFill>
+                      <a:prstDash val="solid"/>
+                      <a:round/>
+                      <a:headEnd type="none" w="med" len="med"/>
+                      <a:tailEnd type="none" w="med" len="med"/>
+                    </a:lnL>
+                    <a:lnR w="12700" cap="flat" cmpd="sng" algn="ctr">
+                      <a:solidFill>
+                        <a:schemeClr val="accent3">
+                          <a:lumMod val="60000"/>
+                          <a:lumOff val="40000"/>
+                        </a:schemeClr>
+                      </a:solidFill>
+                      <a:prstDash val="solid"/>
+                      <a:round/>
+                      <a:headEnd type="none" w="med" len="med"/>
+                      <a:tailEnd type="none" w="med" len="med"/>
+                    </a:lnR>
+                    <a:lnT w="12700" cap="flat" cmpd="sng" algn="ctr">
+                      <a:noFill/>
+                      <a:prstDash val="solid"/>
+                    </a:lnT>
+                    <a:lnB w="12700" cap="flat" cmpd="sng" algn="ctr">
+                      <a:noFill/>
+                      <a:prstDash val="solid"/>
+                    </a:lnB>
+                    <a:lnTlToBr w="12700" cmpd="sng">
+                      <a:noFill/>
+                      <a:prstDash val="solid"/>
+                    </a:lnTlToBr>
+                    <a:lnBlToTr w="12700" cmpd="sng">
+                      <a:noFill/>
+                      <a:prstDash val="solid"/>
+                    </a:lnBlToTr>
+                  </a:tcPr>
+                </a:tc>
+                <a:extLst>
+                  <a:ext uri="{0D108BD9-81ED-4DB2-BD59-A6C34878D82A}">
+                    <a16:rowId xmlns:a16="http://schemas.microsoft.com/office/drawing/2014/main" val="1682753626"/>
+                  </a:ext>
+                </a:extLst>
+              </a:tr>
+              <a:tr h="365760">
+                <a:tc>
+                  <a:txBody>
+                    <a:bodyPr/>
+                    <a:lstStyle/>
+                    <a:p>
+                      <a:r>
+                        <a:rPr lang="pt-BR" sz="1800" dirty="0">
+                          <a:solidFill>
+                            <a:schemeClr val="tx1"/>
+                          </a:solidFill>
+                        </a:rPr>
+                        <a:t>-nome : </a:t>
+                      </a:r>
+                      <a:r>
+                        <a:rPr lang="pt-BR" sz="1800" dirty="0" err="1">
+                          <a:solidFill>
+                            <a:schemeClr val="tx1"/>
+                          </a:solidFill>
+                        </a:rPr>
+                        <a:t>String</a:t>
+                      </a:r>
+                      <a:endParaRPr lang="pt-BR" sz="1800" dirty="0">
+                        <a:solidFill>
+                          <a:schemeClr val="tx1"/>
+                        </a:solidFill>
+                      </a:endParaRPr>
+                    </a:p>
+                  </a:txBody>
+                  <a:tcPr>
+                    <a:lnL w="12700" cap="flat" cmpd="sng" algn="ctr">
+                      <a:solidFill>
+                        <a:schemeClr val="accent3">
+                          <a:lumMod val="60000"/>
+                          <a:lumOff val="40000"/>
+                        </a:schemeClr>
+                      </a:solidFill>
+                      <a:prstDash val="solid"/>
+                      <a:round/>
+                      <a:headEnd type="none" w="med" len="med"/>
+                      <a:tailEnd type="none" w="med" len="med"/>
+                    </a:lnL>
+                    <a:lnR w="12700" cap="flat" cmpd="sng" algn="ctr">
+                      <a:solidFill>
+                        <a:schemeClr val="accent3">
+                          <a:lumMod val="60000"/>
+                          <a:lumOff val="40000"/>
+                        </a:schemeClr>
+                      </a:solidFill>
+                      <a:prstDash val="solid"/>
+                      <a:round/>
+                      <a:headEnd type="none" w="med" len="med"/>
+                      <a:tailEnd type="none" w="med" len="med"/>
+                    </a:lnR>
+                    <a:lnT w="12700" cap="flat" cmpd="sng" algn="ctr">
+                      <a:noFill/>
+                      <a:prstDash val="solid"/>
+                    </a:lnT>
+                    <a:lnB w="12700" cap="flat" cmpd="sng" algn="ctr">
+                      <a:noFill/>
+                      <a:prstDash val="solid"/>
+                    </a:lnB>
+                    <a:lnTlToBr w="12700" cmpd="sng">
+                      <a:noFill/>
+                      <a:prstDash val="solid"/>
+                    </a:lnTlToBr>
+                    <a:lnBlToTr w="12700" cmpd="sng">
+                      <a:noFill/>
+                      <a:prstDash val="solid"/>
+                    </a:lnBlToTr>
+                  </a:tcPr>
+                </a:tc>
+                <a:extLst>
+                  <a:ext uri="{0D108BD9-81ED-4DB2-BD59-A6C34878D82A}">
+                    <a16:rowId xmlns:a16="http://schemas.microsoft.com/office/drawing/2014/main" val="1004114936"/>
+                  </a:ext>
+                </a:extLst>
+              </a:tr>
+              <a:tr h="365760">
+                <a:tc>
+                  <a:txBody>
+                    <a:bodyPr/>
+                    <a:lstStyle/>
+                    <a:p>
+                      <a:r>
+                        <a:rPr lang="pt-BR" sz="1800" dirty="0">
+                          <a:solidFill>
+                            <a:schemeClr val="tx1"/>
+                          </a:solidFill>
+                        </a:rPr>
+                        <a:t>-</a:t>
+                      </a:r>
+                      <a:r>
+                        <a:rPr lang="pt-BR" sz="1800" dirty="0" err="1">
+                          <a:solidFill>
+                            <a:schemeClr val="tx1"/>
+                          </a:solidFill>
+                        </a:rPr>
+                        <a:t>raca</a:t>
+                      </a:r>
+                      <a:r>
+                        <a:rPr lang="pt-BR" sz="1800" dirty="0">
+                          <a:solidFill>
+                            <a:schemeClr val="tx1"/>
+                          </a:solidFill>
+                        </a:rPr>
+                        <a:t> : </a:t>
+                      </a:r>
+                      <a:r>
+                        <a:rPr lang="pt-BR" sz="1800" dirty="0" err="1">
+                          <a:solidFill>
+                            <a:schemeClr val="tx1"/>
+                          </a:solidFill>
+                        </a:rPr>
+                        <a:t>String</a:t>
+                      </a:r>
+                      <a:endParaRPr lang="pt-BR" sz="1800" dirty="0">
+                        <a:solidFill>
+                          <a:schemeClr val="tx1"/>
+                        </a:solidFill>
+                      </a:endParaRPr>
+                    </a:p>
+                  </a:txBody>
+                  <a:tcPr>
+                    <a:lnL w="12700" cap="flat" cmpd="sng" algn="ctr">
+                      <a:solidFill>
+                        <a:schemeClr val="accent3">
+                          <a:lumMod val="60000"/>
+                          <a:lumOff val="40000"/>
+                        </a:schemeClr>
+                      </a:solidFill>
+                      <a:prstDash val="solid"/>
+                      <a:round/>
+                      <a:headEnd type="none" w="med" len="med"/>
+                      <a:tailEnd type="none" w="med" len="med"/>
+                    </a:lnL>
+                    <a:lnR w="12700" cap="flat" cmpd="sng" algn="ctr">
+                      <a:solidFill>
+                        <a:schemeClr val="accent3">
+                          <a:lumMod val="60000"/>
+                          <a:lumOff val="40000"/>
+                        </a:schemeClr>
+                      </a:solidFill>
+                      <a:prstDash val="solid"/>
+                      <a:round/>
+                      <a:headEnd type="none" w="med" len="med"/>
+                      <a:tailEnd type="none" w="med" len="med"/>
+                    </a:lnR>
+                    <a:lnT w="12700" cap="flat" cmpd="sng" algn="ctr">
+                      <a:noFill/>
+                      <a:prstDash val="solid"/>
+                    </a:lnT>
+                    <a:lnB w="12700" cap="flat" cmpd="sng" algn="ctr">
+                      <a:noFill/>
+                      <a:prstDash val="solid"/>
+                    </a:lnB>
+                    <a:lnTlToBr w="12700" cmpd="sng">
+                      <a:noFill/>
+                      <a:prstDash val="solid"/>
+                    </a:lnTlToBr>
+                    <a:lnBlToTr w="12700" cmpd="sng">
+                      <a:noFill/>
+                      <a:prstDash val="solid"/>
+                    </a:lnBlToTr>
+                  </a:tcPr>
+                </a:tc>
+                <a:extLst>
+                  <a:ext uri="{0D108BD9-81ED-4DB2-BD59-A6C34878D82A}">
+                    <a16:rowId xmlns:a16="http://schemas.microsoft.com/office/drawing/2014/main" val="2957092515"/>
+                  </a:ext>
+                </a:extLst>
+              </a:tr>
+              <a:tr h="365760">
+                <a:tc>
+                  <a:txBody>
+                    <a:bodyPr/>
+                    <a:lstStyle/>
+                    <a:p>
+                      <a:r>
+                        <a:rPr lang="pt-BR" sz="1800" dirty="0">
+                          <a:solidFill>
+                            <a:schemeClr val="tx1"/>
+                          </a:solidFill>
+                        </a:rPr>
+                        <a:t>-idade : </a:t>
+                      </a:r>
+                      <a:r>
+                        <a:rPr lang="pt-BR" sz="1800" dirty="0" err="1">
+                          <a:solidFill>
+                            <a:schemeClr val="tx1"/>
+                          </a:solidFill>
+                        </a:rPr>
+                        <a:t>int</a:t>
+                      </a:r>
+                      <a:endParaRPr lang="pt-BR" sz="1800" dirty="0">
+                        <a:solidFill>
+                          <a:schemeClr val="tx1"/>
+                        </a:solidFill>
+                      </a:endParaRPr>
+                    </a:p>
+                  </a:txBody>
+                  <a:tcPr>
+                    <a:lnL w="12700" cap="flat" cmpd="sng" algn="ctr">
+                      <a:solidFill>
+                        <a:schemeClr val="accent3">
+                          <a:lumMod val="60000"/>
+                          <a:lumOff val="40000"/>
+                        </a:schemeClr>
+                      </a:solidFill>
+                      <a:prstDash val="solid"/>
+                      <a:round/>
+                      <a:headEnd type="none" w="med" len="med"/>
+                      <a:tailEnd type="none" w="med" len="med"/>
+                    </a:lnL>
+                    <a:lnR w="12700" cap="flat" cmpd="sng" algn="ctr">
+                      <a:solidFill>
+                        <a:schemeClr val="accent3">
+                          <a:lumMod val="60000"/>
+                          <a:lumOff val="40000"/>
+                        </a:schemeClr>
+                      </a:solidFill>
+                      <a:prstDash val="solid"/>
+                      <a:round/>
+                      <a:headEnd type="none" w="med" len="med"/>
+                      <a:tailEnd type="none" w="med" len="med"/>
+                    </a:lnR>
+                    <a:lnT w="12700" cap="flat" cmpd="sng" algn="ctr">
+                      <a:noFill/>
+                      <a:prstDash val="solid"/>
+                    </a:lnT>
+                    <a:lnB w="12700" cap="flat" cmpd="sng" algn="ctr">
+                      <a:noFill/>
+                      <a:prstDash val="solid"/>
+                    </a:lnB>
+                    <a:lnTlToBr w="12700" cmpd="sng">
+                      <a:noFill/>
+                      <a:prstDash val="solid"/>
+                    </a:lnTlToBr>
+                    <a:lnBlToTr w="12700" cmpd="sng">
+                      <a:noFill/>
+                      <a:prstDash val="solid"/>
+                    </a:lnBlToTr>
+                  </a:tcPr>
+                </a:tc>
+                <a:extLst>
+                  <a:ext uri="{0D108BD9-81ED-4DB2-BD59-A6C34878D82A}">
+                    <a16:rowId xmlns:a16="http://schemas.microsoft.com/office/drawing/2014/main" val="3898512360"/>
+                  </a:ext>
+                </a:extLst>
+              </a:tr>
+              <a:tr h="365760">
+                <a:tc>
+                  <a:txBody>
+                    <a:bodyPr/>
+                    <a:lstStyle/>
+                    <a:p>
+                      <a:r>
+                        <a:rPr lang="pt-BR" sz="1800" dirty="0">
+                          <a:solidFill>
+                            <a:schemeClr val="tx1"/>
+                          </a:solidFill>
+                        </a:rPr>
+                        <a:t>-peso : </a:t>
+                      </a:r>
+                      <a:r>
+                        <a:rPr lang="pt-BR" sz="1800" dirty="0" err="1">
+                          <a:solidFill>
+                            <a:schemeClr val="tx1"/>
+                          </a:solidFill>
+                        </a:rPr>
+                        <a:t>float</a:t>
+                      </a:r>
+                      <a:endParaRPr lang="pt-BR" sz="1800" dirty="0">
+                        <a:solidFill>
+                          <a:schemeClr val="tx1"/>
+                        </a:solidFill>
+                      </a:endParaRPr>
+                    </a:p>
+                  </a:txBody>
+                  <a:tcPr>
+                    <a:lnL w="12700" cap="flat" cmpd="sng" algn="ctr">
+                      <a:solidFill>
+                        <a:schemeClr val="accent3">
+                          <a:lumMod val="60000"/>
+                          <a:lumOff val="40000"/>
+                        </a:schemeClr>
+                      </a:solidFill>
+                      <a:prstDash val="solid"/>
+                      <a:round/>
+                      <a:headEnd type="none" w="med" len="med"/>
+                      <a:tailEnd type="none" w="med" len="med"/>
+                    </a:lnL>
+                    <a:lnR w="12700" cap="flat" cmpd="sng" algn="ctr">
+                      <a:solidFill>
+                        <a:schemeClr val="accent3">
+                          <a:lumMod val="60000"/>
+                          <a:lumOff val="40000"/>
+                        </a:schemeClr>
+                      </a:solidFill>
+                      <a:prstDash val="solid"/>
+                      <a:round/>
+                      <a:headEnd type="none" w="med" len="med"/>
+                      <a:tailEnd type="none" w="med" len="med"/>
+                    </a:lnR>
+                    <a:lnT w="12700" cap="flat" cmpd="sng" algn="ctr">
+                      <a:noFill/>
+                      <a:prstDash val="solid"/>
+                    </a:lnT>
+                    <a:lnB w="12700" cap="flat" cmpd="sng" algn="ctr">
+                      <a:solidFill>
+                        <a:schemeClr val="accent3">
+                          <a:lumMod val="60000"/>
+                          <a:lumOff val="40000"/>
+                        </a:schemeClr>
+                      </a:solidFill>
+                      <a:prstDash val="solid"/>
+                      <a:round/>
+                      <a:headEnd type="none" w="med" len="med"/>
+                      <a:tailEnd type="none" w="med" len="med"/>
+                    </a:lnB>
+                    <a:lnTlToBr w="12700" cmpd="sng">
+                      <a:noFill/>
+                      <a:prstDash val="solid"/>
+                    </a:lnTlToBr>
+                    <a:lnBlToTr w="12700" cmpd="sng">
+                      <a:noFill/>
+                      <a:prstDash val="solid"/>
+                    </a:lnBlToTr>
+                  </a:tcPr>
+                </a:tc>
+                <a:extLst>
+                  <a:ext uri="{0D108BD9-81ED-4DB2-BD59-A6C34878D82A}">
+                    <a16:rowId xmlns:a16="http://schemas.microsoft.com/office/drawing/2014/main" val="2978198018"/>
+                  </a:ext>
+                </a:extLst>
+              </a:tr>
+              <a:tr h="365760">
+                <a:tc>
+                  <a:txBody>
+                    <a:bodyPr/>
+                    <a:lstStyle/>
+                    <a:p>
+                      <a:r>
+                        <a:rPr lang="pt-BR" sz="1800" dirty="0">
+                          <a:solidFill>
+                            <a:schemeClr val="tx1"/>
+                          </a:solidFill>
+                        </a:rPr>
+                        <a:t>#miar() : </a:t>
+                      </a:r>
+                      <a:r>
+                        <a:rPr lang="pt-BR" sz="1800" dirty="0" err="1">
+                          <a:solidFill>
+                            <a:schemeClr val="tx1"/>
+                          </a:solidFill>
+                        </a:rPr>
+                        <a:t>void</a:t>
+                      </a:r>
+                      <a:endParaRPr lang="pt-BR" sz="1800" dirty="0">
+                        <a:solidFill>
+                          <a:schemeClr val="tx1"/>
+                        </a:solidFill>
+                      </a:endParaRPr>
+                    </a:p>
+                  </a:txBody>
+                  <a:tcPr>
+                    <a:lnL w="12700" cap="flat" cmpd="sng" algn="ctr">
+                      <a:solidFill>
+                        <a:schemeClr val="accent3">
+                          <a:lumMod val="60000"/>
+                          <a:lumOff val="40000"/>
+                        </a:schemeClr>
+                      </a:solidFill>
+                      <a:prstDash val="solid"/>
+                      <a:round/>
+                      <a:headEnd type="none" w="med" len="med"/>
+                      <a:tailEnd type="none" w="med" len="med"/>
+                    </a:lnL>
+                    <a:lnR w="12700" cap="flat" cmpd="sng" algn="ctr">
+                      <a:solidFill>
+                        <a:schemeClr val="accent3">
+                          <a:lumMod val="60000"/>
+                          <a:lumOff val="40000"/>
+                        </a:schemeClr>
+                      </a:solidFill>
+                      <a:prstDash val="solid"/>
+                      <a:round/>
+                      <a:headEnd type="none" w="med" len="med"/>
+                      <a:tailEnd type="none" w="med" len="med"/>
+                    </a:lnR>
+                    <a:lnT w="12700" cap="flat" cmpd="sng" algn="ctr">
+                      <a:solidFill>
+                        <a:schemeClr val="accent3">
+                          <a:lumMod val="60000"/>
+                          <a:lumOff val="40000"/>
+                        </a:schemeClr>
+                      </a:solidFill>
+                      <a:prstDash val="solid"/>
+                      <a:round/>
+                      <a:headEnd type="none" w="med" len="med"/>
+                      <a:tailEnd type="none" w="med" len="med"/>
+                    </a:lnT>
+                    <a:lnB w="12700" cap="flat" cmpd="sng" algn="ctr">
+                      <a:noFill/>
+                      <a:prstDash val="solid"/>
+                    </a:lnB>
+                    <a:lnTlToBr w="12700" cmpd="sng">
+                      <a:noFill/>
+                      <a:prstDash val="solid"/>
+                    </a:lnTlToBr>
+                    <a:lnBlToTr w="12700" cmpd="sng">
+                      <a:noFill/>
+                      <a:prstDash val="solid"/>
+                    </a:lnBlToTr>
+                  </a:tcPr>
+                </a:tc>
+                <a:extLst>
+                  <a:ext uri="{0D108BD9-81ED-4DB2-BD59-A6C34878D82A}">
+                    <a16:rowId xmlns:a16="http://schemas.microsoft.com/office/drawing/2014/main" val="1545684564"/>
+                  </a:ext>
+                </a:extLst>
+              </a:tr>
+              <a:tr h="365760">
+                <a:tc>
+                  <a:txBody>
+                    <a:bodyPr/>
+                    <a:lstStyle/>
+                    <a:p>
+                      <a:r>
+                        <a:rPr lang="pt-BR" sz="1800" dirty="0">
+                          <a:solidFill>
+                            <a:schemeClr val="tx1"/>
+                          </a:solidFill>
+                        </a:rPr>
+                        <a:t>+comer() : </a:t>
+                      </a:r>
+                      <a:r>
+                        <a:rPr lang="pt-BR" sz="1800" dirty="0" err="1">
+                          <a:solidFill>
+                            <a:schemeClr val="tx1"/>
+                          </a:solidFill>
+                        </a:rPr>
+                        <a:t>void</a:t>
+                      </a:r>
+                      <a:endParaRPr lang="pt-BR" sz="1800" dirty="0">
+                        <a:solidFill>
+                          <a:schemeClr val="tx1"/>
+                        </a:solidFill>
+                      </a:endParaRPr>
+                    </a:p>
+                  </a:txBody>
+                  <a:tcPr>
+                    <a:lnL w="12700" cap="flat" cmpd="sng" algn="ctr">
+                      <a:solidFill>
+                        <a:schemeClr val="accent3">
+                          <a:lumMod val="60000"/>
+                          <a:lumOff val="40000"/>
+                        </a:schemeClr>
+                      </a:solidFill>
+                      <a:prstDash val="solid"/>
+                      <a:round/>
+                      <a:headEnd type="none" w="med" len="med"/>
+                      <a:tailEnd type="none" w="med" len="med"/>
+                    </a:lnL>
+                    <a:lnR w="12700" cap="flat" cmpd="sng" algn="ctr">
+                      <a:solidFill>
+                        <a:schemeClr val="accent3">
+                          <a:lumMod val="60000"/>
+                          <a:lumOff val="40000"/>
+                        </a:schemeClr>
+                      </a:solidFill>
+                      <a:prstDash val="solid"/>
+                      <a:round/>
+                      <a:headEnd type="none" w="med" len="med"/>
+                      <a:tailEnd type="none" w="med" len="med"/>
+                    </a:lnR>
+                    <a:lnT w="12700" cap="flat" cmpd="sng" algn="ctr">
+                      <a:noFill/>
+                      <a:prstDash val="solid"/>
+                    </a:lnT>
+                    <a:lnB w="12700" cap="flat" cmpd="sng" algn="ctr">
+                      <a:noFill/>
+                      <a:prstDash val="solid"/>
+                    </a:lnB>
+                    <a:lnTlToBr w="12700" cmpd="sng">
+                      <a:noFill/>
+                      <a:prstDash val="solid"/>
+                    </a:lnTlToBr>
+                    <a:lnBlToTr w="12700" cmpd="sng">
+                      <a:noFill/>
+                      <a:prstDash val="solid"/>
+                    </a:lnBlToTr>
+                  </a:tcPr>
+                </a:tc>
+                <a:extLst>
+                  <a:ext uri="{0D108BD9-81ED-4DB2-BD59-A6C34878D82A}">
+                    <a16:rowId xmlns:a16="http://schemas.microsoft.com/office/drawing/2014/main" val="1756189085"/>
+                  </a:ext>
+                </a:extLst>
+              </a:tr>
+              <a:tr h="0">
+                <a:tc>
+                  <a:txBody>
+                    <a:bodyPr/>
+                    <a:lstStyle/>
+                    <a:p>
+                      <a:r>
+                        <a:rPr lang="pt-BR" sz="1800" dirty="0">
+                          <a:solidFill>
+                            <a:schemeClr val="tx1"/>
+                          </a:solidFill>
+                        </a:rPr>
+                        <a:t>+dormir() : </a:t>
+                      </a:r>
+                      <a:r>
+                        <a:rPr lang="pt-BR" sz="1800" dirty="0" err="1">
+                          <a:solidFill>
+                            <a:schemeClr val="tx1"/>
+                          </a:solidFill>
+                        </a:rPr>
+                        <a:t>void</a:t>
+                      </a:r>
+                      <a:endParaRPr lang="pt-BR" sz="1800" dirty="0">
+                        <a:solidFill>
+                          <a:schemeClr val="tx1"/>
+                        </a:solidFill>
+                      </a:endParaRPr>
+                    </a:p>
+                  </a:txBody>
+                  <a:tcPr>
+                    <a:lnL w="12700" cap="flat" cmpd="sng" algn="ctr">
+                      <a:solidFill>
+                        <a:schemeClr val="accent3">
+                          <a:lumMod val="60000"/>
+                          <a:lumOff val="40000"/>
+                        </a:schemeClr>
+                      </a:solidFill>
+                      <a:prstDash val="solid"/>
+                      <a:round/>
+                      <a:headEnd type="none" w="med" len="med"/>
+                      <a:tailEnd type="none" w="med" len="med"/>
+                    </a:lnL>
+                    <a:lnR w="12700" cap="flat" cmpd="sng" algn="ctr">
+                      <a:solidFill>
+                        <a:schemeClr val="accent3">
+                          <a:lumMod val="60000"/>
+                          <a:lumOff val="40000"/>
+                        </a:schemeClr>
+                      </a:solidFill>
+                      <a:prstDash val="solid"/>
+                      <a:round/>
+                      <a:headEnd type="none" w="med" len="med"/>
+                      <a:tailEnd type="none" w="med" len="med"/>
+                    </a:lnR>
+                    <a:lnT w="12700" cap="flat" cmpd="sng" algn="ctr">
+                      <a:noFill/>
+                      <a:prstDash val="solid"/>
+                    </a:lnT>
+                    <a:lnB w="12700" cap="flat" cmpd="sng" algn="ctr">
+                      <a:solidFill>
+                        <a:schemeClr val="accent3">
+                          <a:lumMod val="60000"/>
+                          <a:lumOff val="40000"/>
+                        </a:schemeClr>
+                      </a:solidFill>
+                      <a:prstDash val="solid"/>
+                      <a:round/>
+                      <a:headEnd type="none" w="med" len="med"/>
+                      <a:tailEnd type="none" w="med" len="med"/>
+                    </a:lnB>
+                    <a:lnTlToBr w="12700" cmpd="sng">
+                      <a:noFill/>
+                      <a:prstDash val="solid"/>
+                    </a:lnTlToBr>
+                    <a:lnBlToTr w="12700" cmpd="sng">
+                      <a:noFill/>
+                      <a:prstDash val="solid"/>
+                    </a:lnBlToTr>
+                  </a:tcPr>
+                </a:tc>
+                <a:extLst>
+                  <a:ext uri="{0D108BD9-81ED-4DB2-BD59-A6C34878D82A}">
+                    <a16:rowId xmlns:a16="http://schemas.microsoft.com/office/drawing/2014/main" val="1746830580"/>
+                  </a:ext>
+                </a:extLst>
+              </a:tr>
+            </a:tbl>
+          </a:graphicData>
+        </a:graphic>
+      </p:graphicFrame>
+      <p:sp>
+        <p:nvSpPr>
+          <p:cNvPr id="6" name="Retângulo: Cantos Arredondados 5">
+            <a:extLst>
+              <a:ext uri="{FF2B5EF4-FFF2-40B4-BE49-F238E27FC236}">
+                <a16:creationId xmlns:a16="http://schemas.microsoft.com/office/drawing/2014/main" id="{41D45EC1-9C6C-3DB7-3955-4C452E37A1CB}"/>
+              </a:ext>
+            </a:extLst>
+          </p:cNvPr>
+          <p:cNvSpPr/>
+          <p:nvPr/>
+        </p:nvSpPr>
+        <p:spPr>
+          <a:xfrm>
+            <a:off x="1811800" y="2407920"/>
+            <a:ext cx="2110740" cy="3291839"/>
+          </a:xfrm>
+          <a:prstGeom prst="roundRect">
+            <a:avLst/>
+          </a:prstGeom>
+          <a:solidFill>
+            <a:srgbClr val="DA83E1"/>
+          </a:solidFill>
+          <a:ln>
+            <a:solidFill>
+              <a:srgbClr val="8A038D">
+                <a:alpha val="95000"/>
+              </a:srgbClr>
+            </a:solidFill>
+          </a:ln>
+        </p:spPr>
+        <p:style>
+          <a:lnRef idx="2">
+            <a:schemeClr val="accent1">
+              <a:shade val="15000"/>
+            </a:schemeClr>
+          </a:lnRef>
+          <a:fillRef idx="1">
+            <a:schemeClr val="accent1"/>
+          </a:fillRef>
+          <a:effectRef idx="0">
+            <a:schemeClr val="accent1"/>
+          </a:effectRef>
+          <a:fontRef idx="minor">
+            <a:schemeClr val="lt1"/>
+          </a:fontRef>
+        </p:style>
+        <p:txBody>
+          <a:bodyPr rtlCol="0" anchor="ctr"/>
+          <a:lstStyle/>
+          <a:p>
+            <a:pPr algn="ctr"/>
+            <a:r>
+              <a:rPr lang="pt-BR" b="1" dirty="0">
+                <a:solidFill>
+                  <a:schemeClr val="tx1"/>
+                </a:solidFill>
+              </a:rPr>
+              <a:t>Visibilidade</a:t>
+            </a:r>
+          </a:p>
+          <a:p>
+            <a:pPr algn="ctr"/>
+            <a:endParaRPr lang="pt-BR" dirty="0">
+              <a:solidFill>
+                <a:schemeClr val="tx1"/>
+              </a:solidFill>
+            </a:endParaRPr>
+          </a:p>
+          <a:p>
+            <a:pPr lvl="1"/>
+            <a:r>
+              <a:rPr lang="pt-BR" dirty="0">
+                <a:solidFill>
+                  <a:schemeClr val="tx1"/>
+                </a:solidFill>
+              </a:rPr>
+              <a:t>+ </a:t>
+            </a:r>
+            <a:r>
+              <a:rPr lang="pt-BR" dirty="0" err="1">
+                <a:solidFill>
+                  <a:schemeClr val="tx1"/>
+                </a:solidFill>
+              </a:rPr>
+              <a:t>Public</a:t>
+            </a:r>
+            <a:endParaRPr lang="pt-BR" dirty="0">
+              <a:solidFill>
+                <a:schemeClr val="tx1"/>
+              </a:solidFill>
+            </a:endParaRPr>
+          </a:p>
+          <a:p>
+            <a:pPr lvl="1"/>
+            <a:r>
+              <a:rPr lang="pt-BR" dirty="0">
+                <a:solidFill>
+                  <a:schemeClr val="tx1"/>
+                </a:solidFill>
+              </a:rPr>
+              <a:t>   </a:t>
+            </a:r>
+            <a:r>
+              <a:rPr lang="pt-BR" dirty="0" err="1">
+                <a:solidFill>
+                  <a:schemeClr val="tx1"/>
+                </a:solidFill>
+              </a:rPr>
+              <a:t>Friendly</a:t>
+            </a:r>
+            <a:endParaRPr lang="pt-BR" dirty="0">
+              <a:solidFill>
+                <a:schemeClr val="tx1"/>
+              </a:solidFill>
+            </a:endParaRPr>
+          </a:p>
+          <a:p>
+            <a:pPr lvl="1"/>
+            <a:r>
+              <a:rPr lang="pt-BR" dirty="0">
+                <a:solidFill>
+                  <a:schemeClr val="tx1"/>
+                </a:solidFill>
+              </a:rPr>
+              <a:t># </a:t>
+            </a:r>
+            <a:r>
+              <a:rPr lang="pt-BR" dirty="0" err="1">
+                <a:solidFill>
+                  <a:schemeClr val="tx1"/>
+                </a:solidFill>
+              </a:rPr>
+              <a:t>Protected</a:t>
+            </a:r>
+            <a:endParaRPr lang="pt-BR" dirty="0">
+              <a:solidFill>
+                <a:schemeClr val="tx1"/>
+              </a:solidFill>
+            </a:endParaRPr>
+          </a:p>
+          <a:p>
+            <a:pPr lvl="1"/>
+            <a:r>
+              <a:rPr lang="pt-BR" dirty="0">
+                <a:solidFill>
+                  <a:schemeClr val="tx1"/>
+                </a:solidFill>
+              </a:rPr>
+              <a:t>- Private</a:t>
+            </a:r>
+          </a:p>
+        </p:txBody>
+      </p:sp>
+      <p:cxnSp>
+        <p:nvCxnSpPr>
+          <p:cNvPr id="8" name="Conector de Seta Reta 7">
+            <a:extLst>
+              <a:ext uri="{FF2B5EF4-FFF2-40B4-BE49-F238E27FC236}">
+                <a16:creationId xmlns:a16="http://schemas.microsoft.com/office/drawing/2014/main" id="{489343CF-7A7A-3614-4817-408D55D81335}"/>
+              </a:ext>
+            </a:extLst>
+          </p:cNvPr>
+          <p:cNvCxnSpPr>
+            <a:cxnSpLocks/>
+            <a:stCxn id="6" idx="3"/>
+            <a:endCxn id="5" idx="1"/>
+          </p:cNvCxnSpPr>
+          <p:nvPr/>
+        </p:nvCxnSpPr>
+        <p:spPr>
+          <a:xfrm>
+            <a:off x="3922540" y="4053840"/>
+            <a:ext cx="913355" cy="0"/>
+          </a:xfrm>
+          <a:prstGeom prst="straightConnector1">
+            <a:avLst/>
+          </a:prstGeom>
+          <a:ln w="25400">
+            <a:solidFill>
+              <a:srgbClr val="8A038D"/>
+            </a:solidFill>
+            <a:tailEnd type="triangle"/>
+          </a:ln>
+        </p:spPr>
+        <p:style>
+          <a:lnRef idx="1">
+            <a:schemeClr val="dk1"/>
+          </a:lnRef>
+          <a:fillRef idx="0">
+            <a:schemeClr val="dk1"/>
+          </a:fillRef>
+          <a:effectRef idx="0">
+            <a:schemeClr val="dk1"/>
+          </a:effectRef>
+          <a:fontRef idx="minor">
+            <a:schemeClr val="tx1"/>
+          </a:fontRef>
+        </p:style>
+      </p:cxnSp>
+      <p:sp>
+        <p:nvSpPr>
+          <p:cNvPr id="10" name="Retângulo: Cantos Arredondados 9">
+            <a:extLst>
+              <a:ext uri="{FF2B5EF4-FFF2-40B4-BE49-F238E27FC236}">
+                <a16:creationId xmlns:a16="http://schemas.microsoft.com/office/drawing/2014/main" id="{E2EBBAA5-E0F8-8CE9-6D36-09708359671F}"/>
+              </a:ext>
+            </a:extLst>
+          </p:cNvPr>
+          <p:cNvSpPr/>
+          <p:nvPr/>
+        </p:nvSpPr>
+        <p:spPr>
+          <a:xfrm>
+            <a:off x="8353865" y="2407920"/>
+            <a:ext cx="1828800" cy="727149"/>
+          </a:xfrm>
+          <a:prstGeom prst="roundRect">
+            <a:avLst/>
+          </a:prstGeom>
+          <a:ln>
+            <a:solidFill>
+              <a:schemeClr val="accent3">
+                <a:lumMod val="75000"/>
+              </a:schemeClr>
+            </a:solidFill>
+          </a:ln>
+        </p:spPr>
+        <p:style>
+          <a:lnRef idx="3">
+            <a:schemeClr val="lt1"/>
+          </a:lnRef>
+          <a:fillRef idx="1">
+            <a:schemeClr val="accent3"/>
+          </a:fillRef>
+          <a:effectRef idx="1">
+            <a:schemeClr val="accent3"/>
+          </a:effectRef>
+          <a:fontRef idx="minor">
+            <a:schemeClr val="lt1"/>
+          </a:fontRef>
+        </p:style>
+        <p:txBody>
+          <a:bodyPr rtlCol="0" anchor="ctr"/>
+          <a:lstStyle/>
+          <a:p>
+            <a:pPr algn="ctr"/>
+            <a:r>
+              <a:rPr lang="pt-BR" dirty="0">
+                <a:solidFill>
+                  <a:schemeClr val="tx1"/>
+                </a:solidFill>
+              </a:rPr>
+              <a:t>Nome da Classe</a:t>
+            </a:r>
+          </a:p>
+        </p:txBody>
+      </p:sp>
+      <p:sp>
+        <p:nvSpPr>
+          <p:cNvPr id="11" name="Retângulo: Cantos Arredondados 10">
+            <a:extLst>
+              <a:ext uri="{FF2B5EF4-FFF2-40B4-BE49-F238E27FC236}">
+                <a16:creationId xmlns:a16="http://schemas.microsoft.com/office/drawing/2014/main" id="{7F7E9D16-3760-B3FA-49CE-B021455AEA0B}"/>
+              </a:ext>
+            </a:extLst>
+          </p:cNvPr>
+          <p:cNvSpPr/>
+          <p:nvPr/>
+        </p:nvSpPr>
+        <p:spPr>
+          <a:xfrm>
+            <a:off x="8353865" y="3695433"/>
+            <a:ext cx="1828800" cy="727149"/>
+          </a:xfrm>
+          <a:prstGeom prst="roundRect">
+            <a:avLst/>
+          </a:prstGeom>
+          <a:ln>
+            <a:solidFill>
+              <a:schemeClr val="accent3">
+                <a:lumMod val="75000"/>
+              </a:schemeClr>
+            </a:solidFill>
+          </a:ln>
+        </p:spPr>
+        <p:style>
+          <a:lnRef idx="3">
+            <a:schemeClr val="lt1"/>
+          </a:lnRef>
+          <a:fillRef idx="1">
+            <a:schemeClr val="accent3"/>
+          </a:fillRef>
+          <a:effectRef idx="1">
+            <a:schemeClr val="accent3"/>
+          </a:effectRef>
+          <a:fontRef idx="minor">
+            <a:schemeClr val="lt1"/>
+          </a:fontRef>
+        </p:style>
+        <p:txBody>
+          <a:bodyPr rtlCol="0" anchor="ctr"/>
+          <a:lstStyle/>
+          <a:p>
+            <a:pPr algn="ctr"/>
+            <a:r>
+              <a:rPr lang="pt-BR" dirty="0">
+                <a:solidFill>
+                  <a:schemeClr val="tx1"/>
+                </a:solidFill>
+              </a:rPr>
+              <a:t>Atributos (características)</a:t>
+            </a:r>
+          </a:p>
+        </p:txBody>
+      </p:sp>
+      <p:sp>
+        <p:nvSpPr>
+          <p:cNvPr id="12" name="Retângulo: Cantos Arredondados 11">
+            <a:extLst>
+              <a:ext uri="{FF2B5EF4-FFF2-40B4-BE49-F238E27FC236}">
+                <a16:creationId xmlns:a16="http://schemas.microsoft.com/office/drawing/2014/main" id="{3356D29A-F08E-98A1-DADD-92B66EDCE510}"/>
+              </a:ext>
+            </a:extLst>
+          </p:cNvPr>
+          <p:cNvSpPr/>
+          <p:nvPr/>
+        </p:nvSpPr>
+        <p:spPr>
+          <a:xfrm>
+            <a:off x="8353865" y="4972610"/>
+            <a:ext cx="1828800" cy="727149"/>
+          </a:xfrm>
+          <a:prstGeom prst="roundRect">
+            <a:avLst/>
+          </a:prstGeom>
+          <a:ln>
+            <a:solidFill>
+              <a:schemeClr val="accent3">
+                <a:lumMod val="75000"/>
+              </a:schemeClr>
+            </a:solidFill>
+          </a:ln>
+        </p:spPr>
+        <p:style>
+          <a:lnRef idx="3">
+            <a:schemeClr val="lt1"/>
+          </a:lnRef>
+          <a:fillRef idx="1">
+            <a:schemeClr val="accent3"/>
+          </a:fillRef>
+          <a:effectRef idx="1">
+            <a:schemeClr val="accent3"/>
+          </a:effectRef>
+          <a:fontRef idx="minor">
+            <a:schemeClr val="lt1"/>
+          </a:fontRef>
+        </p:style>
+        <p:txBody>
+          <a:bodyPr rtlCol="0" anchor="ctr"/>
+          <a:lstStyle/>
+          <a:p>
+            <a:pPr algn="ctr"/>
+            <a:r>
+              <a:rPr lang="pt-BR" dirty="0">
+                <a:solidFill>
+                  <a:schemeClr val="tx1"/>
+                </a:solidFill>
+              </a:rPr>
+              <a:t>Métodos (ações)</a:t>
+            </a:r>
+          </a:p>
+        </p:txBody>
+      </p:sp>
+      <p:cxnSp>
+        <p:nvCxnSpPr>
+          <p:cNvPr id="15" name="Conector de Seta Reta 14">
+            <a:extLst>
+              <a:ext uri="{FF2B5EF4-FFF2-40B4-BE49-F238E27FC236}">
+                <a16:creationId xmlns:a16="http://schemas.microsoft.com/office/drawing/2014/main" id="{68C79822-8422-87CC-8174-0979D573F68A}"/>
+              </a:ext>
+            </a:extLst>
+          </p:cNvPr>
+          <p:cNvCxnSpPr>
+            <a:cxnSpLocks/>
+            <a:stCxn id="10" idx="1"/>
+          </p:cNvCxnSpPr>
+          <p:nvPr/>
+        </p:nvCxnSpPr>
+        <p:spPr>
+          <a:xfrm flipH="1" flipV="1">
+            <a:off x="6947095" y="2771494"/>
+            <a:ext cx="1406770" cy="1"/>
+          </a:xfrm>
+          <a:prstGeom prst="straightConnector1">
+            <a:avLst/>
+          </a:prstGeom>
+          <a:ln w="38100">
+            <a:solidFill>
+              <a:schemeClr val="accent3">
+                <a:lumMod val="75000"/>
+              </a:schemeClr>
+            </a:solidFill>
+            <a:tailEnd type="triangle"/>
+          </a:ln>
+        </p:spPr>
+        <p:style>
+          <a:lnRef idx="1">
+            <a:schemeClr val="accent3"/>
+          </a:lnRef>
+          <a:fillRef idx="0">
+            <a:schemeClr val="accent3"/>
+          </a:fillRef>
+          <a:effectRef idx="0">
+            <a:schemeClr val="accent3"/>
+          </a:effectRef>
+          <a:fontRef idx="minor">
+            <a:schemeClr val="tx1"/>
+          </a:fontRef>
+        </p:style>
+      </p:cxnSp>
+      <p:cxnSp>
+        <p:nvCxnSpPr>
+          <p:cNvPr id="25" name="Conector de Seta Reta 24">
+            <a:extLst>
+              <a:ext uri="{FF2B5EF4-FFF2-40B4-BE49-F238E27FC236}">
+                <a16:creationId xmlns:a16="http://schemas.microsoft.com/office/drawing/2014/main" id="{CAD80378-41F8-1F69-6ED1-E6068DBDEDB7}"/>
+              </a:ext>
+            </a:extLst>
+          </p:cNvPr>
+          <p:cNvCxnSpPr>
+            <a:cxnSpLocks/>
+          </p:cNvCxnSpPr>
+          <p:nvPr/>
+        </p:nvCxnSpPr>
+        <p:spPr>
+          <a:xfrm flipH="1" flipV="1">
+            <a:off x="6947095" y="4124018"/>
+            <a:ext cx="1406770" cy="1"/>
+          </a:xfrm>
+          <a:prstGeom prst="straightConnector1">
+            <a:avLst/>
+          </a:prstGeom>
+          <a:ln w="38100">
+            <a:solidFill>
+              <a:schemeClr val="accent3">
+                <a:lumMod val="75000"/>
+              </a:schemeClr>
+            </a:solidFill>
+            <a:tailEnd type="triangle"/>
+          </a:ln>
+        </p:spPr>
+        <p:style>
+          <a:lnRef idx="1">
+            <a:schemeClr val="accent3"/>
+          </a:lnRef>
+          <a:fillRef idx="0">
+            <a:schemeClr val="accent3"/>
+          </a:fillRef>
+          <a:effectRef idx="0">
+            <a:schemeClr val="accent3"/>
+          </a:effectRef>
+          <a:fontRef idx="minor">
+            <a:schemeClr val="tx1"/>
+          </a:fontRef>
+        </p:style>
+      </p:cxnSp>
+      <p:cxnSp>
+        <p:nvCxnSpPr>
+          <p:cNvPr id="26" name="Conector de Seta Reta 25">
+            <a:extLst>
+              <a:ext uri="{FF2B5EF4-FFF2-40B4-BE49-F238E27FC236}">
+                <a16:creationId xmlns:a16="http://schemas.microsoft.com/office/drawing/2014/main" id="{010D8850-FEC1-BB4B-D84A-D29801C99D94}"/>
+              </a:ext>
+            </a:extLst>
+          </p:cNvPr>
+          <p:cNvCxnSpPr>
+            <a:cxnSpLocks/>
+          </p:cNvCxnSpPr>
+          <p:nvPr/>
+        </p:nvCxnSpPr>
+        <p:spPr>
+          <a:xfrm flipH="1" flipV="1">
+            <a:off x="6947095" y="5336183"/>
+            <a:ext cx="1406770" cy="1"/>
+          </a:xfrm>
+          <a:prstGeom prst="straightConnector1">
+            <a:avLst/>
+          </a:prstGeom>
+          <a:ln w="38100">
+            <a:solidFill>
+              <a:schemeClr val="accent3">
+                <a:lumMod val="75000"/>
+              </a:schemeClr>
+            </a:solidFill>
+            <a:tailEnd type="triangle"/>
+          </a:ln>
+        </p:spPr>
+        <p:style>
+          <a:lnRef idx="1">
+            <a:schemeClr val="accent3"/>
+          </a:lnRef>
+          <a:fillRef idx="0">
+            <a:schemeClr val="accent3"/>
+          </a:fillRef>
+          <a:effectRef idx="0">
+            <a:schemeClr val="accent3"/>
+          </a:effectRef>
+          <a:fontRef idx="minor">
+            <a:schemeClr val="tx1"/>
+          </a:fontRef>
+        </p:style>
+      </p:cxnSp>
+      <p:graphicFrame>
+        <p:nvGraphicFramePr>
+          <p:cNvPr id="28" name="Tabela 27">
+            <a:extLst>
+              <a:ext uri="{FF2B5EF4-FFF2-40B4-BE49-F238E27FC236}">
+                <a16:creationId xmlns:a16="http://schemas.microsoft.com/office/drawing/2014/main" id="{E1DA1975-1488-1700-44FE-5740FAE10445}"/>
+              </a:ext>
+            </a:extLst>
+          </p:cNvPr>
+          <p:cNvGraphicFramePr>
+            <a:graphicFrameLocks noGrp="1"/>
+          </p:cNvGraphicFramePr>
+          <p:nvPr>
+            <p:extLst>
+              <p:ext uri="{D42A27DB-BD31-4B8C-83A1-F6EECF244321}">
+                <p14:modId xmlns:p14="http://schemas.microsoft.com/office/powerpoint/2010/main" val="2668674467"/>
+              </p:ext>
+            </p:extLst>
+          </p:nvPr>
+        </p:nvGraphicFramePr>
+        <p:xfrm>
+          <a:off x="4840710" y="2392679"/>
+          <a:ext cx="2103748" cy="3307080"/>
+        </p:xfrm>
+        <a:graphic>
+          <a:graphicData uri="http://schemas.openxmlformats.org/drawingml/2006/table">
+            <a:tbl>
+              <a:tblPr/>
+              <a:tblGrid>
+                <a:gridCol w="2103748">
+                  <a:extLst>
+                    <a:ext uri="{9D8B030D-6E8A-4147-A177-3AD203B41FA5}">
+                      <a16:colId xmlns:a16="http://schemas.microsoft.com/office/drawing/2014/main" val="108378011"/>
+                    </a:ext>
+                  </a:extLst>
+                </a:gridCol>
+              </a:tblGrid>
+              <a:tr h="3307080">
+                <a:tc>
+                  <a:txBody>
+                    <a:bodyPr/>
+                    <a:lstStyle/>
+                    <a:p>
+                      <a:endParaRPr lang="pt-BR" dirty="0"/>
+                    </a:p>
+                  </a:txBody>
+                  <a:tcPr>
+                    <a:lnL w="38100" cmpd="sng">
+                      <a:solidFill>
+                        <a:schemeClr val="accent3">
+                          <a:lumMod val="75000"/>
+                        </a:schemeClr>
+                      </a:solidFill>
+                      <a:prstDash val="solid"/>
+                    </a:lnL>
+                    <a:lnR w="38100" cmpd="sng">
+                      <a:solidFill>
+                        <a:schemeClr val="accent3">
+                          <a:lumMod val="75000"/>
+                        </a:schemeClr>
+                      </a:solidFill>
+                      <a:prstDash val="solid"/>
+                    </a:lnR>
+                    <a:lnT w="38100" cmpd="sng">
+                      <a:solidFill>
+                        <a:schemeClr val="accent3">
+                          <a:lumMod val="75000"/>
+                        </a:schemeClr>
+                      </a:solidFill>
+                      <a:prstDash val="solid"/>
+                    </a:lnT>
+                    <a:lnB w="38100" cmpd="sng">
+                      <a:solidFill>
+                        <a:schemeClr val="accent3">
+                          <a:lumMod val="75000"/>
+                        </a:schemeClr>
+                      </a:solidFill>
+                      <a:prstDash val="solid"/>
+                    </a:lnB>
+                  </a:tcPr>
+                </a:tc>
+                <a:extLst>
+                  <a:ext uri="{0D108BD9-81ED-4DB2-BD59-A6C34878D82A}">
+                    <a16:rowId xmlns:a16="http://schemas.microsoft.com/office/drawing/2014/main" val="2059867983"/>
+                  </a:ext>
+                </a:extLst>
+              </a:tr>
+            </a:tbl>
+          </a:graphicData>
+        </a:graphic>
+      </p:graphicFrame>
+      <p:graphicFrame>
+        <p:nvGraphicFramePr>
+          <p:cNvPr id="29" name="Tabela 28">
+            <a:extLst>
+              <a:ext uri="{FF2B5EF4-FFF2-40B4-BE49-F238E27FC236}">
+                <a16:creationId xmlns:a16="http://schemas.microsoft.com/office/drawing/2014/main" id="{41A4448D-7016-2566-845E-E0818A22BF57}"/>
+              </a:ext>
+            </a:extLst>
+          </p:cNvPr>
+          <p:cNvGraphicFramePr>
+            <a:graphicFrameLocks noGrp="1"/>
+          </p:cNvGraphicFramePr>
+          <p:nvPr>
+            <p:extLst>
+              <p:ext uri="{D42A27DB-BD31-4B8C-83A1-F6EECF244321}">
+                <p14:modId xmlns:p14="http://schemas.microsoft.com/office/powerpoint/2010/main" val="598082319"/>
+              </p:ext>
+            </p:extLst>
+          </p:nvPr>
+        </p:nvGraphicFramePr>
+        <p:xfrm>
+          <a:off x="4831080" y="2407920"/>
+          <a:ext cx="2110740" cy="365760"/>
+        </p:xfrm>
+        <a:graphic>
+          <a:graphicData uri="http://schemas.openxmlformats.org/drawingml/2006/table">
+            <a:tbl>
+              <a:tblPr/>
+              <a:tblGrid>
+                <a:gridCol w="2110740">
+                  <a:extLst>
+                    <a:ext uri="{9D8B030D-6E8A-4147-A177-3AD203B41FA5}">
+                      <a16:colId xmlns:a16="http://schemas.microsoft.com/office/drawing/2014/main" val="108378011"/>
+                    </a:ext>
+                  </a:extLst>
+                </a:gridCol>
+              </a:tblGrid>
+              <a:tr h="363574">
+                <a:tc>
+                  <a:txBody>
+                    <a:bodyPr/>
+                    <a:lstStyle/>
+                    <a:p>
+                      <a:endParaRPr lang="pt-BR" dirty="0"/>
+                    </a:p>
+                  </a:txBody>
+                  <a:tcPr>
+                    <a:lnL w="38100" cmpd="sng">
+                      <a:solidFill>
+                        <a:schemeClr val="accent3">
+                          <a:lumMod val="75000"/>
+                        </a:schemeClr>
+                      </a:solidFill>
+                      <a:prstDash val="solid"/>
+                    </a:lnL>
+                    <a:lnR w="38100" cmpd="sng">
+                      <a:solidFill>
+                        <a:schemeClr val="accent3">
+                          <a:lumMod val="75000"/>
+                        </a:schemeClr>
+                      </a:solidFill>
+                      <a:prstDash val="solid"/>
+                    </a:lnR>
+                    <a:lnT w="38100" cmpd="sng">
+                      <a:solidFill>
+                        <a:schemeClr val="accent3">
+                          <a:lumMod val="75000"/>
+                        </a:schemeClr>
+                      </a:solidFill>
+                      <a:prstDash val="solid"/>
+                    </a:lnT>
+                    <a:lnB w="38100" cmpd="sng">
+                      <a:solidFill>
+                        <a:schemeClr val="accent3">
+                          <a:lumMod val="75000"/>
+                        </a:schemeClr>
+                      </a:solidFill>
+                      <a:prstDash val="solid"/>
+                    </a:lnB>
+                  </a:tcPr>
+                </a:tc>
+                <a:extLst>
+                  <a:ext uri="{0D108BD9-81ED-4DB2-BD59-A6C34878D82A}">
+                    <a16:rowId xmlns:a16="http://schemas.microsoft.com/office/drawing/2014/main" val="2059867983"/>
+                  </a:ext>
+                </a:extLst>
+              </a:tr>
+            </a:tbl>
+          </a:graphicData>
+        </a:graphic>
+      </p:graphicFrame>
+      <p:graphicFrame>
+        <p:nvGraphicFramePr>
+          <p:cNvPr id="30" name="Tabela 29">
+            <a:extLst>
+              <a:ext uri="{FF2B5EF4-FFF2-40B4-BE49-F238E27FC236}">
+                <a16:creationId xmlns:a16="http://schemas.microsoft.com/office/drawing/2014/main" id="{72B413E5-6E17-58A0-E8C6-CFAEABA80235}"/>
+              </a:ext>
+            </a:extLst>
+          </p:cNvPr>
+          <p:cNvGraphicFramePr>
+            <a:graphicFrameLocks noGrp="1"/>
+          </p:cNvGraphicFramePr>
+          <p:nvPr>
+            <p:extLst>
+              <p:ext uri="{D42A27DB-BD31-4B8C-83A1-F6EECF244321}">
+                <p14:modId xmlns:p14="http://schemas.microsoft.com/office/powerpoint/2010/main" val="2781908628"/>
+              </p:ext>
+            </p:extLst>
+          </p:nvPr>
+        </p:nvGraphicFramePr>
+        <p:xfrm>
+          <a:off x="4838532" y="4606715"/>
+          <a:ext cx="2095835" cy="1083732"/>
+        </p:xfrm>
+        <a:graphic>
+          <a:graphicData uri="http://schemas.openxmlformats.org/drawingml/2006/table">
+            <a:tbl>
+              <a:tblPr/>
+              <a:tblGrid>
+                <a:gridCol w="2095835">
+                  <a:extLst>
+                    <a:ext uri="{9D8B030D-6E8A-4147-A177-3AD203B41FA5}">
+                      <a16:colId xmlns:a16="http://schemas.microsoft.com/office/drawing/2014/main" val="108378011"/>
+                    </a:ext>
+                  </a:extLst>
+                </a:gridCol>
+              </a:tblGrid>
+              <a:tr h="1083732">
+                <a:tc>
+                  <a:txBody>
+                    <a:bodyPr/>
+                    <a:lstStyle/>
+                    <a:p>
+                      <a:endParaRPr lang="pt-BR" dirty="0"/>
+                    </a:p>
+                  </a:txBody>
+                  <a:tcPr>
+                    <a:lnL w="38100" cmpd="sng">
+                      <a:solidFill>
+                        <a:schemeClr val="accent3">
+                          <a:lumMod val="75000"/>
+                        </a:schemeClr>
+                      </a:solidFill>
+                      <a:prstDash val="solid"/>
+                    </a:lnL>
+                    <a:lnR w="38100" cmpd="sng">
+                      <a:solidFill>
+                        <a:schemeClr val="accent3">
+                          <a:lumMod val="75000"/>
+                        </a:schemeClr>
+                      </a:solidFill>
+                      <a:prstDash val="solid"/>
+                    </a:lnR>
+                    <a:lnT w="38100" cmpd="sng">
+                      <a:solidFill>
+                        <a:schemeClr val="accent3">
+                          <a:lumMod val="75000"/>
+                        </a:schemeClr>
+                      </a:solidFill>
+                      <a:prstDash val="solid"/>
+                    </a:lnT>
+                    <a:lnB w="38100" cmpd="sng">
+                      <a:solidFill>
+                        <a:schemeClr val="accent3">
+                          <a:lumMod val="75000"/>
+                        </a:schemeClr>
+                      </a:solidFill>
+                      <a:prstDash val="solid"/>
+                    </a:lnB>
+                  </a:tcPr>
+                </a:tc>
+                <a:extLst>
+                  <a:ext uri="{0D108BD9-81ED-4DB2-BD59-A6C34878D82A}">
+                    <a16:rowId xmlns:a16="http://schemas.microsoft.com/office/drawing/2014/main" val="2059867983"/>
+                  </a:ext>
+                </a:extLst>
+              </a:tr>
+            </a:tbl>
+          </a:graphicData>
+        </a:graphic>
+      </p:graphicFrame>
+    </p:spTree>
+    <p:extLst>
+      <p:ext uri="{BB962C8B-B14F-4D97-AF65-F5344CB8AC3E}">
+        <p14:creationId xmlns:p14="http://schemas.microsoft.com/office/powerpoint/2010/main" val="2586541965"/>
       </p:ext>
     </p:extLst>
   </p:cSld>

</xml_diff>

<commit_message>
Terminando aula de POO
</commit_message>
<xml_diff>
--- a/Euripedes Simões de Paula/Java/Programação Orientada a Objetos/Programação Orientada a Objetos.pptx
+++ b/Euripedes Simões de Paula/Java/Programação Orientada a Objetos/Programação Orientada a Objetos.pptx
@@ -16,6 +16,21 @@
     <p:sldId id="264" r:id="rId10"/>
     <p:sldId id="265" r:id="rId11"/>
     <p:sldId id="266" r:id="rId12"/>
+    <p:sldId id="267" r:id="rId13"/>
+    <p:sldId id="268" r:id="rId14"/>
+    <p:sldId id="269" r:id="rId15"/>
+    <p:sldId id="270" r:id="rId16"/>
+    <p:sldId id="271" r:id="rId17"/>
+    <p:sldId id="272" r:id="rId18"/>
+    <p:sldId id="273" r:id="rId19"/>
+    <p:sldId id="274" r:id="rId20"/>
+    <p:sldId id="275" r:id="rId21"/>
+    <p:sldId id="277" r:id="rId22"/>
+    <p:sldId id="276" r:id="rId23"/>
+    <p:sldId id="278" r:id="rId24"/>
+    <p:sldId id="279" r:id="rId25"/>
+    <p:sldId id="280" r:id="rId26"/>
+    <p:sldId id="281" r:id="rId27"/>
   </p:sldIdLst>
   <p:sldSz cx="12192000" cy="6858000"/>
   <p:notesSz cx="6858000" cy="9144000"/>
@@ -114,6 +129,11 @@
       </a:defRPr>
     </a:lvl9pPr>
   </p:defaultTextStyle>
+  <p:extLst>
+    <p:ext uri="{EFAFB233-063F-42B5-8137-9DF3F51BA10A}">
+      <p15:sldGuideLst xmlns:p15="http://schemas.microsoft.com/office/powerpoint/2012/main"/>
+    </p:ext>
+  </p:extLst>
 </p:presentation>
 </file>
 
@@ -345,7 +365,7 @@
           <a:p>
             <a:fld id="{862F39DC-7B80-4172-ABD1-2F1DD52FB1DC}" type="datetimeFigureOut">
               <a:rPr lang="pt-BR" smtClean="0"/>
-              <a:t>28/04/2024</a:t>
+              <a:t>29/04/2024</a:t>
             </a:fld>
             <a:endParaRPr lang="pt-BR"/>
           </a:p>
@@ -553,7 +573,7 @@
           <a:p>
             <a:fld id="{862F39DC-7B80-4172-ABD1-2F1DD52FB1DC}" type="datetimeFigureOut">
               <a:rPr lang="pt-BR" smtClean="0"/>
-              <a:t>28/04/2024</a:t>
+              <a:t>29/04/2024</a:t>
             </a:fld>
             <a:endParaRPr lang="pt-BR"/>
           </a:p>
@@ -811,7 +831,7 @@
           <a:p>
             <a:fld id="{862F39DC-7B80-4172-ABD1-2F1DD52FB1DC}" type="datetimeFigureOut">
               <a:rPr lang="pt-BR" smtClean="0"/>
-              <a:t>28/04/2024</a:t>
+              <a:t>29/04/2024</a:t>
             </a:fld>
             <a:endParaRPr lang="pt-BR"/>
           </a:p>
@@ -981,7 +1001,7 @@
           <a:p>
             <a:fld id="{862F39DC-7B80-4172-ABD1-2F1DD52FB1DC}" type="datetimeFigureOut">
               <a:rPr lang="pt-BR" smtClean="0"/>
-              <a:t>28/04/2024</a:t>
+              <a:t>29/04/2024</a:t>
             </a:fld>
             <a:endParaRPr lang="pt-BR"/>
           </a:p>
@@ -1318,7 +1338,7 @@
           <a:p>
             <a:fld id="{862F39DC-7B80-4172-ABD1-2F1DD52FB1DC}" type="datetimeFigureOut">
               <a:rPr lang="pt-BR" smtClean="0"/>
-              <a:t>28/04/2024</a:t>
+              <a:t>29/04/2024</a:t>
             </a:fld>
             <a:endParaRPr lang="pt-BR"/>
           </a:p>
@@ -1593,7 +1613,7 @@
           <a:p>
             <a:fld id="{862F39DC-7B80-4172-ABD1-2F1DD52FB1DC}" type="datetimeFigureOut">
               <a:rPr lang="pt-BR" smtClean="0"/>
-              <a:t>28/04/2024</a:t>
+              <a:t>29/04/2024</a:t>
             </a:fld>
             <a:endParaRPr lang="pt-BR"/>
           </a:p>
@@ -1972,7 +1992,7 @@
           <a:p>
             <a:fld id="{862F39DC-7B80-4172-ABD1-2F1DD52FB1DC}" type="datetimeFigureOut">
               <a:rPr lang="pt-BR" smtClean="0"/>
-              <a:t>28/04/2024</a:t>
+              <a:t>29/04/2024</a:t>
             </a:fld>
             <a:endParaRPr lang="pt-BR"/>
           </a:p>
@@ -2090,7 +2110,7 @@
           <a:p>
             <a:fld id="{862F39DC-7B80-4172-ABD1-2F1DD52FB1DC}" type="datetimeFigureOut">
               <a:rPr lang="pt-BR" smtClean="0"/>
-              <a:t>28/04/2024</a:t>
+              <a:t>29/04/2024</a:t>
             </a:fld>
             <a:endParaRPr lang="pt-BR"/>
           </a:p>
@@ -2263,7 +2283,7 @@
           <a:p>
             <a:fld id="{862F39DC-7B80-4172-ABD1-2F1DD52FB1DC}" type="datetimeFigureOut">
               <a:rPr lang="pt-BR" smtClean="0"/>
-              <a:t>28/04/2024</a:t>
+              <a:t>29/04/2024</a:t>
             </a:fld>
             <a:endParaRPr lang="pt-BR"/>
           </a:p>
@@ -2619,7 +2639,7 @@
           <a:p>
             <a:fld id="{862F39DC-7B80-4172-ABD1-2F1DD52FB1DC}" type="datetimeFigureOut">
               <a:rPr lang="pt-BR" smtClean="0"/>
-              <a:t>28/04/2024</a:t>
+              <a:t>29/04/2024</a:t>
             </a:fld>
             <a:endParaRPr lang="pt-BR"/>
           </a:p>
@@ -2998,7 +3018,7 @@
           <a:p>
             <a:fld id="{862F39DC-7B80-4172-ABD1-2F1DD52FB1DC}" type="datetimeFigureOut">
               <a:rPr lang="pt-BR" smtClean="0"/>
-              <a:t>28/04/2024</a:t>
+              <a:t>29/04/2024</a:t>
             </a:fld>
             <a:endParaRPr lang="pt-BR"/>
           </a:p>
@@ -3287,7 +3307,7 @@
           <a:p>
             <a:fld id="{862F39DC-7B80-4172-ABD1-2F1DD52FB1DC}" type="datetimeFigureOut">
               <a:rPr lang="pt-BR" smtClean="0"/>
-              <a:t>28/04/2024</a:t>
+              <a:t>29/04/2024</a:t>
             </a:fld>
             <a:endParaRPr lang="pt-BR"/>
           </a:p>
@@ -3858,7 +3878,7 @@
         <p:spPr/>
         <p:txBody>
           <a:bodyPr>
-            <a:normAutofit fontScale="85000" lnSpcReduction="20000"/>
+            <a:normAutofit/>
           </a:bodyPr>
           <a:lstStyle/>
           <a:p>
@@ -3871,12 +3891,6 @@
             <a:r>
               <a:rPr lang="pt-BR" dirty="0"/>
               <a:t>Classes.</a:t>
-            </a:r>
-          </a:p>
-          <a:p>
-            <a:r>
-              <a:rPr lang="pt-BR" dirty="0"/>
-              <a:t>Encapsulamento.</a:t>
             </a:r>
           </a:p>
         </p:txBody>
@@ -4146,13 +4160,8 @@
                     <a:p>
                       <a:r>
                         <a:rPr lang="pt-BR" sz="1400" dirty="0"/>
-                        <a:t>- numero : </a:t>
+                        <a:t>- numero : int</a:t>
                       </a:r>
-                      <a:r>
-                        <a:rPr lang="pt-BR" sz="1400" dirty="0" err="1"/>
-                        <a:t>int</a:t>
-                      </a:r>
-                      <a:endParaRPr lang="pt-BR" sz="1400" dirty="0"/>
                     </a:p>
                   </a:txBody>
                   <a:tcPr>
@@ -4215,13 +4224,8 @@
                     <a:p>
                       <a:r>
                         <a:rPr lang="pt-BR" sz="1400" dirty="0"/>
-                        <a:t>- agencia : </a:t>
+                        <a:t>- agencia : int</a:t>
                       </a:r>
-                      <a:r>
-                        <a:rPr lang="pt-BR" sz="1400" dirty="0" err="1"/>
-                        <a:t>int</a:t>
-                      </a:r>
-                      <a:endParaRPr lang="pt-BR" sz="1400" dirty="0"/>
                     </a:p>
                   </a:txBody>
                   <a:tcPr>
@@ -4278,13 +4282,8 @@
                     <a:p>
                       <a:r>
                         <a:rPr lang="pt-BR" sz="1400" dirty="0"/>
-                        <a:t>- tipo : </a:t>
+                        <a:t>- tipo : int</a:t>
                       </a:r>
-                      <a:r>
-                        <a:rPr lang="pt-BR" sz="1400" dirty="0" err="1"/>
-                        <a:t>int</a:t>
-                      </a:r>
-                      <a:endParaRPr lang="pt-BR" sz="1400" dirty="0"/>
                     </a:p>
                   </a:txBody>
                   <a:tcPr>
@@ -4341,15 +4340,7 @@
                     <a:p>
                       <a:r>
                         <a:rPr lang="pt-BR" sz="1400" dirty="0"/>
-                        <a:t>- titular : </a:t>
-                      </a:r>
-                      <a:r>
-                        <a:rPr lang="pt-BR" sz="1400" dirty="0" err="1"/>
-                        <a:t>String</a:t>
-                      </a:r>
-                      <a:r>
-                        <a:rPr lang="pt-BR" sz="1400" dirty="0"/>
-                        <a:t> </a:t>
+                        <a:t>- titular : String </a:t>
                       </a:r>
                     </a:p>
                   </a:txBody>
@@ -4407,13 +4398,8 @@
                     <a:p>
                       <a:r>
                         <a:rPr lang="pt-BR" sz="1400" dirty="0"/>
-                        <a:t>- saldo : </a:t>
+                        <a:t>- saldo : float</a:t>
                       </a:r>
-                      <a:r>
-                        <a:rPr lang="pt-BR" sz="1400" dirty="0" err="1"/>
-                        <a:t>float</a:t>
-                      </a:r>
-                      <a:endParaRPr lang="pt-BR" sz="1400" dirty="0"/>
                     </a:p>
                   </a:txBody>
                   <a:tcPr>
@@ -4476,15 +4462,7 @@
                     <a:p>
                       <a:r>
                         <a:rPr lang="pt-BR" sz="1400" dirty="0"/>
-                        <a:t>+</a:t>
-                      </a:r>
-                      <a:r>
-                        <a:rPr lang="pt-BR" sz="1400" dirty="0" err="1"/>
-                        <a:t>int</a:t>
-                      </a:r>
-                      <a:r>
-                        <a:rPr lang="pt-BR" sz="1400" dirty="0"/>
-                        <a:t> </a:t>
+                        <a:t>+int </a:t>
                       </a:r>
                       <a:r>
                         <a:rPr lang="pt-BR" sz="1400" dirty="0" err="1"/>
@@ -4556,15 +4534,7 @@
                     <a:p>
                       <a:r>
                         <a:rPr lang="pt-BR" sz="1400" dirty="0"/>
-                        <a:t>+</a:t>
-                      </a:r>
-                      <a:r>
-                        <a:rPr lang="pt-BR" sz="1400" dirty="0" err="1"/>
-                        <a:t>int</a:t>
-                      </a:r>
-                      <a:r>
-                        <a:rPr lang="pt-BR" sz="1400" dirty="0"/>
-                        <a:t> </a:t>
+                        <a:t>+int </a:t>
                       </a:r>
                       <a:r>
                         <a:rPr lang="pt-BR" sz="1400" dirty="0" err="1"/>
@@ -4630,15 +4600,7 @@
                     <a:p>
                       <a:r>
                         <a:rPr lang="pt-BR" sz="1400" dirty="0"/>
-                        <a:t>+</a:t>
-                      </a:r>
-                      <a:r>
-                        <a:rPr lang="pt-BR" sz="1400" dirty="0" err="1"/>
-                        <a:t>int</a:t>
-                      </a:r>
-                      <a:r>
-                        <a:rPr lang="pt-BR" sz="1400" dirty="0"/>
-                        <a:t> </a:t>
+                        <a:t>+int </a:t>
                       </a:r>
                       <a:r>
                         <a:rPr lang="pt-BR" sz="1400" dirty="0" err="1"/>
@@ -4704,15 +4666,7 @@
                     <a:p>
                       <a:r>
                         <a:rPr lang="pt-BR" sz="1400" dirty="0"/>
-                        <a:t>+</a:t>
-                      </a:r>
-                      <a:r>
-                        <a:rPr lang="pt-BR" sz="1400" dirty="0" err="1"/>
-                        <a:t>String</a:t>
-                      </a:r>
-                      <a:r>
-                        <a:rPr lang="pt-BR" sz="1400" dirty="0"/>
-                        <a:t> </a:t>
+                        <a:t>+String </a:t>
                       </a:r>
                       <a:r>
                         <a:rPr lang="pt-BR" sz="1400" dirty="0" err="1"/>
@@ -4778,15 +4732,7 @@
                     <a:p>
                       <a:r>
                         <a:rPr lang="pt-BR" sz="1400" dirty="0"/>
-                        <a:t>+</a:t>
-                      </a:r>
-                      <a:r>
-                        <a:rPr lang="pt-BR" sz="1400" dirty="0" err="1"/>
-                        <a:t>float</a:t>
-                      </a:r>
-                      <a:r>
-                        <a:rPr lang="pt-BR" sz="1400" dirty="0"/>
-                        <a:t> </a:t>
+                        <a:t>+float </a:t>
                       </a:r>
                       <a:r>
                         <a:rPr lang="pt-BR" sz="1400" dirty="0" err="1"/>
@@ -4852,15 +4798,7 @@
                     <a:p>
                       <a:r>
                         <a:rPr lang="pt-BR" sz="1400" dirty="0"/>
-                        <a:t>+</a:t>
-                      </a:r>
-                      <a:r>
-                        <a:rPr lang="pt-BR" sz="1400" dirty="0" err="1"/>
-                        <a:t>void</a:t>
-                      </a:r>
-                      <a:r>
-                        <a:rPr lang="pt-BR" sz="1400" dirty="0"/>
-                        <a:t> </a:t>
+                        <a:t>+void </a:t>
                       </a:r>
                       <a:r>
                         <a:rPr lang="pt-BR" sz="1400" dirty="0" err="1"/>
@@ -4868,15 +4806,7 @@
                       </a:r>
                       <a:r>
                         <a:rPr lang="pt-BR" sz="1400" dirty="0"/>
-                        <a:t>(</a:t>
-                      </a:r>
-                      <a:r>
-                        <a:rPr lang="pt-BR" sz="1400" dirty="0" err="1"/>
-                        <a:t>int</a:t>
-                      </a:r>
-                      <a:r>
-                        <a:rPr lang="pt-BR" sz="1400" dirty="0"/>
-                        <a:t> numero)</a:t>
+                        <a:t>(int numero)</a:t>
                       </a:r>
                     </a:p>
                   </a:txBody>
@@ -4934,15 +4864,7 @@
                     <a:p>
                       <a:r>
                         <a:rPr lang="pt-BR" sz="1400" dirty="0"/>
-                        <a:t>+</a:t>
-                      </a:r>
-                      <a:r>
-                        <a:rPr lang="pt-BR" sz="1400" dirty="0" err="1"/>
-                        <a:t>void</a:t>
-                      </a:r>
-                      <a:r>
-                        <a:rPr lang="pt-BR" sz="1400" dirty="0"/>
-                        <a:t> </a:t>
+                        <a:t>+void </a:t>
                       </a:r>
                       <a:r>
                         <a:rPr lang="pt-BR" sz="1400" dirty="0" err="1"/>
@@ -4950,15 +4872,7 @@
                       </a:r>
                       <a:r>
                         <a:rPr lang="pt-BR" sz="1400" dirty="0"/>
-                        <a:t>(</a:t>
-                      </a:r>
-                      <a:r>
-                        <a:rPr lang="pt-BR" sz="1400" dirty="0" err="1"/>
-                        <a:t>int</a:t>
-                      </a:r>
-                      <a:r>
-                        <a:rPr lang="pt-BR" sz="1400" dirty="0"/>
-                        <a:t> agencia)</a:t>
+                        <a:t>(int agencia)</a:t>
                       </a:r>
                     </a:p>
                   </a:txBody>
@@ -5016,15 +4930,7 @@
                     <a:p>
                       <a:r>
                         <a:rPr lang="pt-BR" sz="1400" dirty="0"/>
-                        <a:t>+</a:t>
-                      </a:r>
-                      <a:r>
-                        <a:rPr lang="pt-BR" sz="1400" dirty="0" err="1"/>
-                        <a:t>void</a:t>
-                      </a:r>
-                      <a:r>
-                        <a:rPr lang="pt-BR" sz="1400" dirty="0"/>
-                        <a:t> </a:t>
+                        <a:t>+void </a:t>
                       </a:r>
                       <a:r>
                         <a:rPr lang="pt-BR" sz="1400" dirty="0" err="1"/>
@@ -5032,15 +4938,7 @@
                       </a:r>
                       <a:r>
                         <a:rPr lang="pt-BR" sz="1400" dirty="0"/>
-                        <a:t>(</a:t>
-                      </a:r>
-                      <a:r>
-                        <a:rPr lang="pt-BR" sz="1400" dirty="0" err="1"/>
-                        <a:t>int</a:t>
-                      </a:r>
-                      <a:r>
-                        <a:rPr lang="pt-BR" sz="1400" dirty="0"/>
-                        <a:t> tipo)</a:t>
+                        <a:t>(int tipo)</a:t>
                       </a:r>
                     </a:p>
                   </a:txBody>
@@ -5098,15 +4996,7 @@
                     <a:p>
                       <a:r>
                         <a:rPr lang="pt-BR" sz="1400" dirty="0"/>
-                        <a:t>+</a:t>
-                      </a:r>
-                      <a:r>
-                        <a:rPr lang="pt-BR" sz="1400" dirty="0" err="1"/>
-                        <a:t>void</a:t>
-                      </a:r>
-                      <a:r>
-                        <a:rPr lang="pt-BR" sz="1400" dirty="0"/>
-                        <a:t> </a:t>
+                        <a:t>+void </a:t>
                       </a:r>
                       <a:r>
                         <a:rPr lang="pt-BR" sz="1400" dirty="0" err="1"/>
@@ -5114,15 +5004,7 @@
                       </a:r>
                       <a:r>
                         <a:rPr lang="pt-BR" sz="1400" dirty="0"/>
-                        <a:t>(</a:t>
-                      </a:r>
-                      <a:r>
-                        <a:rPr lang="pt-BR" sz="1400" dirty="0" err="1"/>
-                        <a:t>String</a:t>
-                      </a:r>
-                      <a:r>
-                        <a:rPr lang="pt-BR" sz="1400" dirty="0"/>
-                        <a:t> titular)</a:t>
+                        <a:t>(String titular)</a:t>
                       </a:r>
                     </a:p>
                   </a:txBody>
@@ -5180,15 +5062,7 @@
                     <a:p>
                       <a:r>
                         <a:rPr lang="pt-BR" sz="1400" dirty="0"/>
-                        <a:t>+</a:t>
-                      </a:r>
-                      <a:r>
-                        <a:rPr lang="pt-BR" sz="1400" dirty="0" err="1"/>
-                        <a:t>void</a:t>
-                      </a:r>
-                      <a:r>
-                        <a:rPr lang="pt-BR" sz="1400" dirty="0"/>
-                        <a:t> </a:t>
+                        <a:t>+void </a:t>
                       </a:r>
                       <a:r>
                         <a:rPr lang="pt-BR" sz="1400" dirty="0" err="1"/>
@@ -5196,15 +5070,7 @@
                       </a:r>
                       <a:r>
                         <a:rPr lang="pt-BR" sz="1400" dirty="0"/>
-                        <a:t>(</a:t>
-                      </a:r>
-                      <a:r>
-                        <a:rPr lang="pt-BR" sz="1400" dirty="0" err="1"/>
-                        <a:t>float</a:t>
-                      </a:r>
-                      <a:r>
-                        <a:rPr lang="pt-BR" sz="1400" dirty="0"/>
-                        <a:t> saldo)</a:t>
+                        <a:t>(float saldo)</a:t>
                       </a:r>
                     </a:p>
                   </a:txBody>
@@ -5270,15 +5136,7 @@
                       </a:r>
                       <a:r>
                         <a:rPr lang="pt-BR" sz="1400" dirty="0"/>
-                        <a:t> saque(</a:t>
-                      </a:r>
-                      <a:r>
-                        <a:rPr lang="pt-BR" sz="1400" dirty="0" err="1"/>
-                        <a:t>float</a:t>
-                      </a:r>
-                      <a:r>
-                        <a:rPr lang="pt-BR" sz="1400" dirty="0"/>
-                        <a:t> valor)</a:t>
+                        <a:t> saque(float valor)</a:t>
                       </a:r>
                     </a:p>
                   </a:txBody>
@@ -5336,15 +5194,7 @@
                     <a:p>
                       <a:r>
                         <a:rPr lang="pt-BR" sz="1400" dirty="0"/>
-                        <a:t>+</a:t>
-                      </a:r>
-                      <a:r>
-                        <a:rPr lang="pt-BR" sz="1400" dirty="0" err="1"/>
-                        <a:t>void</a:t>
-                      </a:r>
-                      <a:r>
-                        <a:rPr lang="pt-BR" sz="1400" dirty="0"/>
-                        <a:t> visualizar()</a:t>
+                        <a:t>+void visualizar()</a:t>
                       </a:r>
                     </a:p>
                   </a:txBody>
@@ -5471,13 +5321,8 @@
                     <a:p>
                       <a:r>
                         <a:rPr lang="pt-BR" sz="1200" dirty="0"/>
-                        <a:t>-id  </a:t>
+                        <a:t>-id  int</a:t>
                       </a:r>
-                      <a:r>
-                        <a:rPr lang="pt-BR" sz="1200" dirty="0" err="1"/>
-                        <a:t>int</a:t>
-                      </a:r>
-                      <a:endParaRPr lang="pt-BR" sz="1200" dirty="0"/>
                     </a:p>
                   </a:txBody>
                   <a:tcPr/>
@@ -5496,13 +5341,8 @@
                     <a:p>
                       <a:r>
                         <a:rPr lang="pt-BR" sz="1200" dirty="0"/>
-                        <a:t>-nome : </a:t>
+                        <a:t>-nome : String</a:t>
                       </a:r>
-                      <a:r>
-                        <a:rPr lang="pt-BR" sz="1200" dirty="0" err="1"/>
-                        <a:t>String</a:t>
-                      </a:r>
-                      <a:endParaRPr lang="pt-BR" sz="1200" dirty="0"/>
                     </a:p>
                   </a:txBody>
                   <a:tcPr/>
@@ -5529,13 +5369,8 @@
                       </a:r>
                       <a:r>
                         <a:rPr lang="pt-BR" sz="1200" dirty="0"/>
-                        <a:t> : </a:t>
+                        <a:t> : String</a:t>
                       </a:r>
-                      <a:r>
-                        <a:rPr lang="pt-BR" sz="1200" dirty="0" err="1"/>
-                        <a:t>String</a:t>
-                      </a:r>
-                      <a:endParaRPr lang="pt-BR" sz="1200" dirty="0"/>
                     </a:p>
                   </a:txBody>
                   <a:tcPr/>
@@ -5554,13 +5389,8 @@
                     <a:p>
                       <a:r>
                         <a:rPr lang="pt-BR" sz="1200" dirty="0"/>
-                        <a:t>-idade : </a:t>
+                        <a:t>-idade : int</a:t>
                       </a:r>
-                      <a:r>
-                        <a:rPr lang="pt-BR" sz="1200" dirty="0" err="1"/>
-                        <a:t>int</a:t>
-                      </a:r>
-                      <a:endParaRPr lang="pt-BR" sz="1200" dirty="0"/>
                     </a:p>
                   </a:txBody>
                   <a:tcPr/>
@@ -5579,13 +5409,8 @@
                     <a:p>
                       <a:r>
                         <a:rPr lang="pt-BR" sz="1200" dirty="0"/>
-                        <a:t>-peso : </a:t>
+                        <a:t>-peso : float</a:t>
                       </a:r>
-                      <a:r>
-                        <a:rPr lang="pt-BR" sz="1200" dirty="0" err="1"/>
-                        <a:t>float</a:t>
-                      </a:r>
-                      <a:endParaRPr lang="pt-BR" sz="1200" dirty="0"/>
                     </a:p>
                   </a:txBody>
                   <a:tcPr/>
@@ -5604,13 +5429,8 @@
                     <a:p>
                       <a:r>
                         <a:rPr lang="pt-BR" sz="1200" dirty="0"/>
-                        <a:t>#miar() : </a:t>
+                        <a:t>#miar() : void</a:t>
                       </a:r>
-                      <a:r>
-                        <a:rPr lang="pt-BR" sz="1200" dirty="0" err="1"/>
-                        <a:t>void</a:t>
-                      </a:r>
-                      <a:endParaRPr lang="pt-BR" sz="1200" dirty="0"/>
                     </a:p>
                   </a:txBody>
                   <a:tcPr/>
@@ -5629,13 +5449,8 @@
                     <a:p>
                       <a:r>
                         <a:rPr lang="pt-BR" sz="1200" dirty="0"/>
-                        <a:t>+comer() : </a:t>
+                        <a:t>+comer() : void</a:t>
                       </a:r>
-                      <a:r>
-                        <a:rPr lang="pt-BR" sz="1200" dirty="0" err="1"/>
-                        <a:t>void</a:t>
-                      </a:r>
-                      <a:endParaRPr lang="pt-BR" sz="1200" dirty="0"/>
                     </a:p>
                   </a:txBody>
                   <a:tcPr/>
@@ -5654,13 +5469,8 @@
                     <a:p>
                       <a:r>
                         <a:rPr lang="pt-BR" sz="1200" dirty="0"/>
-                        <a:t>+dormir() : </a:t>
+                        <a:t>+dormir() : void</a:t>
                       </a:r>
-                      <a:r>
-                        <a:rPr lang="pt-BR" sz="1200" dirty="0" err="1"/>
-                        <a:t>void</a:t>
-                      </a:r>
-                      <a:endParaRPr lang="pt-BR" sz="1200" dirty="0"/>
                     </a:p>
                   </a:txBody>
                   <a:tcPr/>
@@ -5730,13 +5540,8 @@
             <a:pPr algn="ctr"/>
             <a:r>
               <a:rPr lang="pt-BR" sz="1400" dirty="0"/>
-              <a:t>+ </a:t>
-            </a:r>
-            <a:r>
-              <a:rPr lang="pt-BR" sz="1400" dirty="0" err="1"/>
-              <a:t>Public</a:t>
-            </a:r>
-            <a:endParaRPr lang="pt-BR" sz="1400" dirty="0"/>
+              <a:t>+ Public</a:t>
+            </a:r>
           </a:p>
           <a:p>
             <a:pPr algn="ctr"/>
@@ -5972,21 +5777,8 @@
                             <a:schemeClr val="tx1"/>
                           </a:solidFill>
                         </a:rPr>
-                        <a:t>-id  </a:t>
+                        <a:t>-id  int</a:t>
                       </a:r>
-                      <a:r>
-                        <a:rPr lang="pt-BR" sz="1800" dirty="0" err="1">
-                          <a:solidFill>
-                            <a:schemeClr val="tx1"/>
-                          </a:solidFill>
-                        </a:rPr>
-                        <a:t>int</a:t>
-                      </a:r>
-                      <a:endParaRPr lang="pt-BR" sz="1800" dirty="0">
-                        <a:solidFill>
-                          <a:schemeClr val="tx1"/>
-                        </a:solidFill>
-                      </a:endParaRPr>
                     </a:p>
                   </a:txBody>
                   <a:tcPr>
@@ -6050,21 +5842,8 @@
                             <a:schemeClr val="tx1"/>
                           </a:solidFill>
                         </a:rPr>
-                        <a:t>-nome : </a:t>
+                        <a:t>-nome : String</a:t>
                       </a:r>
-                      <a:r>
-                        <a:rPr lang="pt-BR" sz="1800" dirty="0" err="1">
-                          <a:solidFill>
-                            <a:schemeClr val="tx1"/>
-                          </a:solidFill>
-                        </a:rPr>
-                        <a:t>String</a:t>
-                      </a:r>
-                      <a:endParaRPr lang="pt-BR" sz="1800" dirty="0">
-                        <a:solidFill>
-                          <a:schemeClr val="tx1"/>
-                        </a:solidFill>
-                      </a:endParaRPr>
                     </a:p>
                   </a:txBody>
                   <a:tcPr>
@@ -6144,21 +5923,8 @@
                             <a:schemeClr val="tx1"/>
                           </a:solidFill>
                         </a:rPr>
-                        <a:t> : </a:t>
+                        <a:t> : String</a:t>
                       </a:r>
-                      <a:r>
-                        <a:rPr lang="pt-BR" sz="1800" dirty="0" err="1">
-                          <a:solidFill>
-                            <a:schemeClr val="tx1"/>
-                          </a:solidFill>
-                        </a:rPr>
-                        <a:t>String</a:t>
-                      </a:r>
-                      <a:endParaRPr lang="pt-BR" sz="1800" dirty="0">
-                        <a:solidFill>
-                          <a:schemeClr val="tx1"/>
-                        </a:solidFill>
-                      </a:endParaRPr>
                     </a:p>
                   </a:txBody>
                   <a:tcPr>
@@ -6222,21 +5988,8 @@
                             <a:schemeClr val="tx1"/>
                           </a:solidFill>
                         </a:rPr>
-                        <a:t>-idade : </a:t>
+                        <a:t>-idade : int</a:t>
                       </a:r>
-                      <a:r>
-                        <a:rPr lang="pt-BR" sz="1800" dirty="0" err="1">
-                          <a:solidFill>
-                            <a:schemeClr val="tx1"/>
-                          </a:solidFill>
-                        </a:rPr>
-                        <a:t>int</a:t>
-                      </a:r>
-                      <a:endParaRPr lang="pt-BR" sz="1800" dirty="0">
-                        <a:solidFill>
-                          <a:schemeClr val="tx1"/>
-                        </a:solidFill>
-                      </a:endParaRPr>
                     </a:p>
                   </a:txBody>
                   <a:tcPr>
@@ -6300,21 +6053,8 @@
                             <a:schemeClr val="tx1"/>
                           </a:solidFill>
                         </a:rPr>
-                        <a:t>-peso : </a:t>
+                        <a:t>-peso : float</a:t>
                       </a:r>
-                      <a:r>
-                        <a:rPr lang="pt-BR" sz="1800" dirty="0" err="1">
-                          <a:solidFill>
-                            <a:schemeClr val="tx1"/>
-                          </a:solidFill>
-                        </a:rPr>
-                        <a:t>float</a:t>
-                      </a:r>
-                      <a:endParaRPr lang="pt-BR" sz="1800" dirty="0">
-                        <a:solidFill>
-                          <a:schemeClr val="tx1"/>
-                        </a:solidFill>
-                      </a:endParaRPr>
                     </a:p>
                   </a:txBody>
                   <a:tcPr>
@@ -6386,21 +6126,8 @@
                             <a:schemeClr val="tx1"/>
                           </a:solidFill>
                         </a:rPr>
-                        <a:t>#miar() : </a:t>
+                        <a:t>#miar() : void</a:t>
                       </a:r>
-                      <a:r>
-                        <a:rPr lang="pt-BR" sz="1800" dirty="0" err="1">
-                          <a:solidFill>
-                            <a:schemeClr val="tx1"/>
-                          </a:solidFill>
-                        </a:rPr>
-                        <a:t>void</a:t>
-                      </a:r>
-                      <a:endParaRPr lang="pt-BR" sz="1800" dirty="0">
-                        <a:solidFill>
-                          <a:schemeClr val="tx1"/>
-                        </a:solidFill>
-                      </a:endParaRPr>
                     </a:p>
                   </a:txBody>
                   <a:tcPr>
@@ -6472,21 +6199,8 @@
                             <a:schemeClr val="tx1"/>
                           </a:solidFill>
                         </a:rPr>
-                        <a:t>+comer() : </a:t>
+                        <a:t>+comer() : void</a:t>
                       </a:r>
-                      <a:r>
-                        <a:rPr lang="pt-BR" sz="1800" dirty="0" err="1">
-                          <a:solidFill>
-                            <a:schemeClr val="tx1"/>
-                          </a:solidFill>
-                        </a:rPr>
-                        <a:t>void</a:t>
-                      </a:r>
-                      <a:endParaRPr lang="pt-BR" sz="1800" dirty="0">
-                        <a:solidFill>
-                          <a:schemeClr val="tx1"/>
-                        </a:solidFill>
-                      </a:endParaRPr>
                     </a:p>
                   </a:txBody>
                   <a:tcPr>
@@ -6550,21 +6264,8 @@
                             <a:schemeClr val="tx1"/>
                           </a:solidFill>
                         </a:rPr>
-                        <a:t>+dormir() : </a:t>
+                        <a:t>+dormir() : void</a:t>
                       </a:r>
-                      <a:r>
-                        <a:rPr lang="pt-BR" sz="1800" dirty="0" err="1">
-                          <a:solidFill>
-                            <a:schemeClr val="tx1"/>
-                          </a:solidFill>
-                        </a:rPr>
-                        <a:t>void</a:t>
-                      </a:r>
-                      <a:endParaRPr lang="pt-BR" sz="1800" dirty="0">
-                        <a:solidFill>
-                          <a:schemeClr val="tx1"/>
-                        </a:solidFill>
-                      </a:endParaRPr>
                     </a:p>
                   </a:txBody>
                   <a:tcPr>
@@ -6705,21 +6406,8 @@
                   <a:schemeClr val="tx1"/>
                 </a:solidFill>
               </a:rPr>
-              <a:t>+ </a:t>
-            </a:r>
-            <a:r>
-              <a:rPr lang="pt-BR" dirty="0" err="1">
-                <a:solidFill>
-                  <a:schemeClr val="tx1"/>
-                </a:solidFill>
-              </a:rPr>
-              <a:t>Public</a:t>
-            </a:r>
-            <a:endParaRPr lang="pt-BR" dirty="0">
-              <a:solidFill>
-                <a:schemeClr val="tx1"/>
-              </a:solidFill>
-            </a:endParaRPr>
+              <a:t>+ Public</a:t>
+            </a:r>
           </a:p>
           <a:p>
             <a:pPr lvl="1"/>
@@ -6729,21 +6417,8 @@
                   <a:schemeClr val="tx1"/>
                 </a:solidFill>
               </a:rPr>
-              <a:t>   </a:t>
-            </a:r>
-            <a:r>
-              <a:rPr lang="pt-BR" dirty="0" err="1">
-                <a:solidFill>
-                  <a:schemeClr val="tx1"/>
-                </a:solidFill>
-              </a:rPr>
-              <a:t>Friendly</a:t>
-            </a:r>
-            <a:endParaRPr lang="pt-BR" dirty="0">
-              <a:solidFill>
-                <a:schemeClr val="tx1"/>
-              </a:solidFill>
-            </a:endParaRPr>
+              <a:t>   Default</a:t>
+            </a:r>
           </a:p>
           <a:p>
             <a:pPr lvl="1"/>
@@ -7427,6 +7102,2017 @@
 </p:sld>
 </file>
 
+<file path=ppt/slides/slide12.xml><?xml version="1.0" encoding="utf-8"?>
+<p:sld xmlns:a="http://schemas.openxmlformats.org/drawingml/2006/main" xmlns:r="http://schemas.openxmlformats.org/officeDocument/2006/relationships" xmlns:p="http://schemas.openxmlformats.org/presentationml/2006/main">
+  <p:cSld>
+    <p:spTree>
+      <p:nvGrpSpPr>
+        <p:cNvPr id="1" name=""/>
+        <p:cNvGrpSpPr/>
+        <p:nvPr/>
+      </p:nvGrpSpPr>
+      <p:grpSpPr>
+        <a:xfrm>
+          <a:off x="0" y="0"/>
+          <a:ext cx="0" cy="0"/>
+          <a:chOff x="0" y="0"/>
+          <a:chExt cx="0" cy="0"/>
+        </a:xfrm>
+      </p:grpSpPr>
+      <p:sp>
+        <p:nvSpPr>
+          <p:cNvPr id="2" name="Título 1">
+            <a:extLst>
+              <a:ext uri="{FF2B5EF4-FFF2-40B4-BE49-F238E27FC236}">
+                <a16:creationId xmlns:a16="http://schemas.microsoft.com/office/drawing/2014/main" id="{DFA4C97B-A4B4-FF8B-2726-264C74B961DD}"/>
+              </a:ext>
+            </a:extLst>
+          </p:cNvPr>
+          <p:cNvSpPr>
+            <a:spLocks noGrp="1"/>
+          </p:cNvSpPr>
+          <p:nvPr>
+            <p:ph type="title"/>
+          </p:nvPr>
+        </p:nvSpPr>
+        <p:spPr/>
+        <p:txBody>
+          <a:bodyPr/>
+          <a:lstStyle/>
+          <a:p>
+            <a:r>
+              <a:rPr lang="pt-BR" dirty="0"/>
+              <a:t>CLASSES</a:t>
+            </a:r>
+            <a:br>
+              <a:rPr lang="pt-BR" dirty="0"/>
+            </a:br>
+            <a:r>
+              <a:rPr lang="pt-BR" sz="2400" dirty="0"/>
+              <a:t>MODIFICADORES</a:t>
+            </a:r>
+          </a:p>
+        </p:txBody>
+      </p:sp>
+      <p:sp>
+        <p:nvSpPr>
+          <p:cNvPr id="3" name="Espaço Reservado para Conteúdo 2">
+            <a:extLst>
+              <a:ext uri="{FF2B5EF4-FFF2-40B4-BE49-F238E27FC236}">
+                <a16:creationId xmlns:a16="http://schemas.microsoft.com/office/drawing/2014/main" id="{69FCF1EF-6B42-806B-1C74-12D36B66A7D4}"/>
+              </a:ext>
+            </a:extLst>
+          </p:cNvPr>
+          <p:cNvSpPr>
+            <a:spLocks noGrp="1"/>
+          </p:cNvSpPr>
+          <p:nvPr>
+            <p:ph idx="1"/>
+          </p:nvPr>
+        </p:nvSpPr>
+        <p:spPr>
+          <a:xfrm>
+            <a:off x="1097278" y="1845734"/>
+            <a:ext cx="10058399" cy="4023360"/>
+          </a:xfrm>
+        </p:spPr>
+        <p:txBody>
+          <a:bodyPr>
+            <a:normAutofit/>
+          </a:bodyPr>
+          <a:lstStyle/>
+          <a:p>
+            <a:r>
+              <a:rPr lang="pt-BR" dirty="0"/>
+              <a:t>Os modificadores são palavras chaves usadas para controlar a visibilidade de membros de uma classe, como atributos e métodos.</a:t>
+            </a:r>
+          </a:p>
+          <a:p>
+            <a:r>
+              <a:rPr lang="pt-BR" dirty="0"/>
+              <a:t>Veremos o que significam os modificadores para as Classes, Métodos e Atributos.</a:t>
+            </a:r>
+          </a:p>
+          <a:p>
+            <a:r>
+              <a:rPr lang="pt-BR" dirty="0"/>
+              <a:t>Para as Classes, temos dois modificadores:</a:t>
+            </a:r>
+          </a:p>
+          <a:p>
+            <a:pPr lvl="1"/>
+            <a:r>
+              <a:rPr lang="pt-BR" b="1" dirty="0" err="1"/>
+              <a:t>Friendly</a:t>
+            </a:r>
+            <a:r>
+              <a:rPr lang="pt-BR" dirty="0"/>
+              <a:t>: é um modificador padrão, identificado pela ausência de modificadores, e permite o acesso a outras Classes.</a:t>
+            </a:r>
+          </a:p>
+          <a:p>
+            <a:pPr lvl="1"/>
+            <a:r>
+              <a:rPr lang="pt-BR" b="1" dirty="0"/>
+              <a:t>Public</a:t>
+            </a:r>
+            <a:r>
+              <a:rPr lang="pt-BR" dirty="0"/>
+              <a:t>: pode ser acessada por outras classes em qualquer pacote.</a:t>
+            </a:r>
+            <a:endParaRPr lang="pt-BR" b="1" dirty="0"/>
+          </a:p>
+          <a:p>
+            <a:r>
+              <a:rPr lang="pt-BR" b="1" dirty="0"/>
+              <a:t>importante</a:t>
+            </a:r>
+            <a:r>
+              <a:rPr lang="pt-BR" dirty="0"/>
+              <a:t>: Os modificadores não podem ser combinados.</a:t>
+            </a:r>
+          </a:p>
+          <a:p>
+            <a:endParaRPr lang="pt-BR" dirty="0"/>
+          </a:p>
+          <a:p>
+            <a:endParaRPr lang="pt-BR" dirty="0"/>
+          </a:p>
+        </p:txBody>
+      </p:sp>
+    </p:spTree>
+    <p:extLst>
+      <p:ext uri="{BB962C8B-B14F-4D97-AF65-F5344CB8AC3E}">
+        <p14:creationId xmlns:p14="http://schemas.microsoft.com/office/powerpoint/2010/main" val="778260419"/>
+      </p:ext>
+    </p:extLst>
+  </p:cSld>
+  <p:clrMapOvr>
+    <a:masterClrMapping/>
+  </p:clrMapOvr>
+</p:sld>
+</file>
+
+<file path=ppt/slides/slide13.xml><?xml version="1.0" encoding="utf-8"?>
+<p:sld xmlns:a="http://schemas.openxmlformats.org/drawingml/2006/main" xmlns:r="http://schemas.openxmlformats.org/officeDocument/2006/relationships" xmlns:p="http://schemas.openxmlformats.org/presentationml/2006/main">
+  <p:cSld>
+    <p:spTree>
+      <p:nvGrpSpPr>
+        <p:cNvPr id="1" name=""/>
+        <p:cNvGrpSpPr/>
+        <p:nvPr/>
+      </p:nvGrpSpPr>
+      <p:grpSpPr>
+        <a:xfrm>
+          <a:off x="0" y="0"/>
+          <a:ext cx="0" cy="0"/>
+          <a:chOff x="0" y="0"/>
+          <a:chExt cx="0" cy="0"/>
+        </a:xfrm>
+      </p:grpSpPr>
+      <p:sp>
+        <p:nvSpPr>
+          <p:cNvPr id="2" name="Título 1">
+            <a:extLst>
+              <a:ext uri="{FF2B5EF4-FFF2-40B4-BE49-F238E27FC236}">
+                <a16:creationId xmlns:a16="http://schemas.microsoft.com/office/drawing/2014/main" id="{DFA4C97B-A4B4-FF8B-2726-264C74B961DD}"/>
+              </a:ext>
+            </a:extLst>
+          </p:cNvPr>
+          <p:cNvSpPr>
+            <a:spLocks noGrp="1"/>
+          </p:cNvSpPr>
+          <p:nvPr>
+            <p:ph type="title"/>
+          </p:nvPr>
+        </p:nvSpPr>
+        <p:spPr/>
+        <p:txBody>
+          <a:bodyPr/>
+          <a:lstStyle/>
+          <a:p>
+            <a:r>
+              <a:rPr lang="pt-BR" dirty="0"/>
+              <a:t>CLASSES</a:t>
+            </a:r>
+            <a:br>
+              <a:rPr lang="pt-BR" dirty="0"/>
+            </a:br>
+            <a:r>
+              <a:rPr lang="pt-BR" sz="2400" dirty="0"/>
+              <a:t>MODIFICADORES</a:t>
+            </a:r>
+          </a:p>
+        </p:txBody>
+      </p:sp>
+      <p:sp>
+        <p:nvSpPr>
+          <p:cNvPr id="3" name="Espaço Reservado para Conteúdo 2">
+            <a:extLst>
+              <a:ext uri="{FF2B5EF4-FFF2-40B4-BE49-F238E27FC236}">
+                <a16:creationId xmlns:a16="http://schemas.microsoft.com/office/drawing/2014/main" id="{69FCF1EF-6B42-806B-1C74-12D36B66A7D4}"/>
+              </a:ext>
+            </a:extLst>
+          </p:cNvPr>
+          <p:cNvSpPr>
+            <a:spLocks noGrp="1"/>
+          </p:cNvSpPr>
+          <p:nvPr>
+            <p:ph idx="1"/>
+          </p:nvPr>
+        </p:nvSpPr>
+        <p:spPr>
+          <a:xfrm>
+            <a:off x="1097278" y="1845734"/>
+            <a:ext cx="10058399" cy="4023360"/>
+          </a:xfrm>
+        </p:spPr>
+        <p:txBody>
+          <a:bodyPr>
+            <a:normAutofit/>
+          </a:bodyPr>
+          <a:lstStyle/>
+          <a:p>
+            <a:r>
+              <a:rPr lang="pt-BR" dirty="0"/>
+              <a:t>Os métodos e atributos possuem 4 modificadores de acesso: Padrão, Public, </a:t>
+            </a:r>
+            <a:r>
+              <a:rPr lang="pt-BR" dirty="0" err="1"/>
+              <a:t>Protected</a:t>
+            </a:r>
+            <a:r>
+              <a:rPr lang="pt-BR" dirty="0"/>
+              <a:t>, Private.</a:t>
+            </a:r>
+          </a:p>
+          <a:p>
+            <a:r>
+              <a:rPr lang="pt-BR" b="1" dirty="0"/>
+              <a:t>Padrão</a:t>
+            </a:r>
+            <a:r>
+              <a:rPr lang="pt-BR" dirty="0"/>
+              <a:t>: permite o acesso das Classes que pertencem ao mesmo pacote, e é identificado pela ausência de modificadores.</a:t>
+            </a:r>
+            <a:endParaRPr lang="pt-BR" b="1" dirty="0"/>
+          </a:p>
+          <a:p>
+            <a:r>
+              <a:rPr lang="pt-BR" b="1" dirty="0"/>
+              <a:t>Public</a:t>
+            </a:r>
+            <a:r>
+              <a:rPr lang="pt-BR" dirty="0"/>
+              <a:t>: permite o acesso de qualquer Classe dentro de qualquer pacote. Só é possível acessar um método se haver aceso a Classe Pulica. Sua UML é “+”</a:t>
+            </a:r>
+            <a:endParaRPr lang="pt-BR" b="1" dirty="0"/>
+          </a:p>
+          <a:p>
+            <a:r>
+              <a:rPr lang="pt-BR" b="1" dirty="0" err="1"/>
+              <a:t>Protected</a:t>
+            </a:r>
+            <a:r>
+              <a:rPr lang="pt-BR" dirty="0"/>
+              <a:t>: pode ser chamado por todas as classes que compõem um pacote. Pode ser acessado por classes </a:t>
+            </a:r>
+            <a:r>
+              <a:rPr lang="pt-BR" dirty="0" err="1"/>
+              <a:t>decendentes</a:t>
+            </a:r>
+            <a:r>
+              <a:rPr lang="pt-BR" dirty="0"/>
+              <a:t>, por meio de pacotes e herança. Sua UML é “#”</a:t>
+            </a:r>
+          </a:p>
+          <a:p>
+            <a:r>
+              <a:rPr lang="pt-BR" b="1" dirty="0"/>
+              <a:t>Private</a:t>
+            </a:r>
+            <a:r>
+              <a:rPr lang="pt-BR" dirty="0"/>
+              <a:t>: possui acesso restrito, onde somente a classe que o definiu tem acesso. O método só pode ser acessado dentro da classe que o definiu. Sua UML é “-”.</a:t>
+            </a:r>
+            <a:endParaRPr lang="pt-BR" b="1" dirty="0"/>
+          </a:p>
+          <a:p>
+            <a:r>
+              <a:rPr lang="pt-BR" b="1" dirty="0"/>
+              <a:t>Importante</a:t>
+            </a:r>
+            <a:r>
+              <a:rPr lang="pt-BR" dirty="0"/>
+              <a:t>: os modificadores não podem ser combinados.</a:t>
+            </a:r>
+            <a:endParaRPr lang="pt-BR" b="1" dirty="0"/>
+          </a:p>
+          <a:p>
+            <a:endParaRPr lang="pt-BR" dirty="0"/>
+          </a:p>
+          <a:p>
+            <a:endParaRPr lang="pt-BR" dirty="0"/>
+          </a:p>
+        </p:txBody>
+      </p:sp>
+    </p:spTree>
+    <p:extLst>
+      <p:ext uri="{BB962C8B-B14F-4D97-AF65-F5344CB8AC3E}">
+        <p14:creationId xmlns:p14="http://schemas.microsoft.com/office/powerpoint/2010/main" val="1007691070"/>
+      </p:ext>
+    </p:extLst>
+  </p:cSld>
+  <p:clrMapOvr>
+    <a:masterClrMapping/>
+  </p:clrMapOvr>
+</p:sld>
+</file>
+
+<file path=ppt/slides/slide14.xml><?xml version="1.0" encoding="utf-8"?>
+<p:sld xmlns:a="http://schemas.openxmlformats.org/drawingml/2006/main" xmlns:r="http://schemas.openxmlformats.org/officeDocument/2006/relationships" xmlns:p="http://schemas.openxmlformats.org/presentationml/2006/main">
+  <p:cSld>
+    <p:spTree>
+      <p:nvGrpSpPr>
+        <p:cNvPr id="1" name=""/>
+        <p:cNvGrpSpPr/>
+        <p:nvPr/>
+      </p:nvGrpSpPr>
+      <p:grpSpPr>
+        <a:xfrm>
+          <a:off x="0" y="0"/>
+          <a:ext cx="0" cy="0"/>
+          <a:chOff x="0" y="0"/>
+          <a:chExt cx="0" cy="0"/>
+        </a:xfrm>
+      </p:grpSpPr>
+      <p:sp>
+        <p:nvSpPr>
+          <p:cNvPr id="2" name="Título 1">
+            <a:extLst>
+              <a:ext uri="{FF2B5EF4-FFF2-40B4-BE49-F238E27FC236}">
+                <a16:creationId xmlns:a16="http://schemas.microsoft.com/office/drawing/2014/main" id="{DFA4C97B-A4B4-FF8B-2726-264C74B961DD}"/>
+              </a:ext>
+            </a:extLst>
+          </p:cNvPr>
+          <p:cNvSpPr>
+            <a:spLocks noGrp="1"/>
+          </p:cNvSpPr>
+          <p:nvPr>
+            <p:ph type="title"/>
+          </p:nvPr>
+        </p:nvSpPr>
+        <p:spPr/>
+        <p:txBody>
+          <a:bodyPr/>
+          <a:lstStyle/>
+          <a:p>
+            <a:r>
+              <a:rPr lang="pt-BR" dirty="0"/>
+              <a:t>CLASSES</a:t>
+            </a:r>
+            <a:br>
+              <a:rPr lang="pt-BR" dirty="0"/>
+            </a:br>
+            <a:r>
+              <a:rPr lang="pt-BR" sz="2400" dirty="0"/>
+              <a:t>MODIFICADORES</a:t>
+            </a:r>
+          </a:p>
+        </p:txBody>
+      </p:sp>
+      <p:sp>
+        <p:nvSpPr>
+          <p:cNvPr id="3" name="Espaço Reservado para Conteúdo 2">
+            <a:extLst>
+              <a:ext uri="{FF2B5EF4-FFF2-40B4-BE49-F238E27FC236}">
+                <a16:creationId xmlns:a16="http://schemas.microsoft.com/office/drawing/2014/main" id="{69FCF1EF-6B42-806B-1C74-12D36B66A7D4}"/>
+              </a:ext>
+            </a:extLst>
+          </p:cNvPr>
+          <p:cNvSpPr>
+            <a:spLocks noGrp="1"/>
+          </p:cNvSpPr>
+          <p:nvPr>
+            <p:ph idx="1"/>
+          </p:nvPr>
+        </p:nvSpPr>
+        <p:spPr>
+          <a:xfrm>
+            <a:off x="1097278" y="1845734"/>
+            <a:ext cx="10058399" cy="4023360"/>
+          </a:xfrm>
+        </p:spPr>
+        <p:txBody>
+          <a:bodyPr>
+            <a:normAutofit/>
+          </a:bodyPr>
+          <a:lstStyle/>
+          <a:p>
+            <a:r>
+              <a:rPr lang="pt-BR" dirty="0"/>
+              <a:t>Exemplo:</a:t>
+            </a:r>
+          </a:p>
+          <a:p>
+            <a:r>
+              <a:rPr lang="pt-BR" dirty="0"/>
+              <a:t>Ao declarar um modificador, sempre lembre de seguir este exemplo:</a:t>
+            </a:r>
+          </a:p>
+          <a:p>
+            <a:endParaRPr lang="pt-BR" dirty="0"/>
+          </a:p>
+          <a:p>
+            <a:r>
+              <a:rPr lang="pt-BR" dirty="0">
+                <a:solidFill>
+                  <a:srgbClr val="FF0000"/>
+                </a:solidFill>
+              </a:rPr>
+              <a:t>Modificador</a:t>
+            </a:r>
+            <a:r>
+              <a:rPr lang="pt-BR" dirty="0"/>
+              <a:t> </a:t>
+            </a:r>
+            <a:r>
+              <a:rPr lang="pt-BR" dirty="0">
+                <a:solidFill>
+                  <a:srgbClr val="0070C0"/>
+                </a:solidFill>
+              </a:rPr>
+              <a:t>class</a:t>
+            </a:r>
+            <a:r>
+              <a:rPr lang="pt-BR" dirty="0"/>
+              <a:t> </a:t>
+            </a:r>
+            <a:r>
+              <a:rPr lang="pt-BR" dirty="0" err="1">
+                <a:solidFill>
+                  <a:srgbClr val="00B050"/>
+                </a:solidFill>
+              </a:rPr>
+              <a:t>nomeClasse</a:t>
+            </a:r>
+            <a:r>
+              <a:rPr lang="pt-BR" dirty="0"/>
+              <a:t> { </a:t>
+            </a:r>
+          </a:p>
+          <a:p>
+            <a:pPr marL="201168" lvl="1" indent="0">
+              <a:buNone/>
+            </a:pPr>
+            <a:r>
+              <a:rPr lang="pt-BR" sz="2000" dirty="0">
+                <a:solidFill>
+                  <a:srgbClr val="7030A0"/>
+                </a:solidFill>
+              </a:rPr>
+              <a:t>// código</a:t>
+            </a:r>
+          </a:p>
+          <a:p>
+            <a:r>
+              <a:rPr lang="pt-BR" dirty="0"/>
+              <a:t>}</a:t>
+            </a:r>
+          </a:p>
+          <a:p>
+            <a:endParaRPr lang="pt-BR" dirty="0"/>
+          </a:p>
+          <a:p>
+            <a:endParaRPr lang="pt-BR" dirty="0"/>
+          </a:p>
+        </p:txBody>
+      </p:sp>
+    </p:spTree>
+    <p:extLst>
+      <p:ext uri="{BB962C8B-B14F-4D97-AF65-F5344CB8AC3E}">
+        <p14:creationId xmlns:p14="http://schemas.microsoft.com/office/powerpoint/2010/main" val="3336362069"/>
+      </p:ext>
+    </p:extLst>
+  </p:cSld>
+  <p:clrMapOvr>
+    <a:masterClrMapping/>
+  </p:clrMapOvr>
+</p:sld>
+</file>
+
+<file path=ppt/slides/slide15.xml><?xml version="1.0" encoding="utf-8"?>
+<p:sld xmlns:a="http://schemas.openxmlformats.org/drawingml/2006/main" xmlns:r="http://schemas.openxmlformats.org/officeDocument/2006/relationships" xmlns:p="http://schemas.openxmlformats.org/presentationml/2006/main">
+  <p:cSld>
+    <p:spTree>
+      <p:nvGrpSpPr>
+        <p:cNvPr id="1" name=""/>
+        <p:cNvGrpSpPr/>
+        <p:nvPr/>
+      </p:nvGrpSpPr>
+      <p:grpSpPr>
+        <a:xfrm>
+          <a:off x="0" y="0"/>
+          <a:ext cx="0" cy="0"/>
+          <a:chOff x="0" y="0"/>
+          <a:chExt cx="0" cy="0"/>
+        </a:xfrm>
+      </p:grpSpPr>
+      <p:sp>
+        <p:nvSpPr>
+          <p:cNvPr id="2" name="Título 1">
+            <a:extLst>
+              <a:ext uri="{FF2B5EF4-FFF2-40B4-BE49-F238E27FC236}">
+                <a16:creationId xmlns:a16="http://schemas.microsoft.com/office/drawing/2014/main" id="{DFA4C97B-A4B4-FF8B-2726-264C74B961DD}"/>
+              </a:ext>
+            </a:extLst>
+          </p:cNvPr>
+          <p:cNvSpPr>
+            <a:spLocks noGrp="1"/>
+          </p:cNvSpPr>
+          <p:nvPr>
+            <p:ph type="title"/>
+          </p:nvPr>
+        </p:nvSpPr>
+        <p:spPr/>
+        <p:txBody>
+          <a:bodyPr/>
+          <a:lstStyle/>
+          <a:p>
+            <a:r>
+              <a:rPr lang="pt-BR" dirty="0"/>
+              <a:t>CLASSES</a:t>
+            </a:r>
+            <a:br>
+              <a:rPr lang="pt-BR" dirty="0"/>
+            </a:br>
+            <a:r>
+              <a:rPr lang="pt-BR" sz="2400" dirty="0"/>
+              <a:t>MODIFICADORES DE ACESSO</a:t>
+            </a:r>
+          </a:p>
+        </p:txBody>
+      </p:sp>
+      <p:sp>
+        <p:nvSpPr>
+          <p:cNvPr id="3" name="Espaço Reservado para Conteúdo 2">
+            <a:extLst>
+              <a:ext uri="{FF2B5EF4-FFF2-40B4-BE49-F238E27FC236}">
+                <a16:creationId xmlns:a16="http://schemas.microsoft.com/office/drawing/2014/main" id="{69FCF1EF-6B42-806B-1C74-12D36B66A7D4}"/>
+              </a:ext>
+            </a:extLst>
+          </p:cNvPr>
+          <p:cNvSpPr>
+            <a:spLocks noGrp="1"/>
+          </p:cNvSpPr>
+          <p:nvPr>
+            <p:ph idx="1"/>
+          </p:nvPr>
+        </p:nvSpPr>
+        <p:spPr>
+          <a:xfrm>
+            <a:off x="1097278" y="1845734"/>
+            <a:ext cx="10058399" cy="4023360"/>
+          </a:xfrm>
+        </p:spPr>
+        <p:txBody>
+          <a:bodyPr>
+            <a:normAutofit/>
+          </a:bodyPr>
+          <a:lstStyle/>
+          <a:p>
+            <a:r>
+              <a:rPr lang="pt-BR" dirty="0"/>
+              <a:t>Temos uma hierarquia de modificadores, onde temos do acesso restrito ao acesso irrestrito.</a:t>
+            </a:r>
+          </a:p>
+          <a:p>
+            <a:pPr marL="0" indent="0">
+              <a:buNone/>
+            </a:pPr>
+            <a:endParaRPr lang="pt-BR" dirty="0"/>
+          </a:p>
+          <a:p>
+            <a:endParaRPr lang="pt-BR" dirty="0"/>
+          </a:p>
+        </p:txBody>
+      </p:sp>
+      <p:sp>
+        <p:nvSpPr>
+          <p:cNvPr id="4" name="Seta: para a Direita 3">
+            <a:extLst>
+              <a:ext uri="{FF2B5EF4-FFF2-40B4-BE49-F238E27FC236}">
+                <a16:creationId xmlns:a16="http://schemas.microsoft.com/office/drawing/2014/main" id="{A5F3D2BE-6CA0-07EC-ABE5-62BB81E8D89C}"/>
+              </a:ext>
+            </a:extLst>
+          </p:cNvPr>
+          <p:cNvSpPr/>
+          <p:nvPr/>
+        </p:nvSpPr>
+        <p:spPr>
+          <a:xfrm>
+            <a:off x="2344618" y="2458681"/>
+            <a:ext cx="1688122" cy="970319"/>
+          </a:xfrm>
+          <a:prstGeom prst="rightArrow">
+            <a:avLst/>
+          </a:prstGeom>
+          <a:solidFill>
+            <a:srgbClr val="FF0000"/>
+          </a:solidFill>
+        </p:spPr>
+        <p:style>
+          <a:lnRef idx="2">
+            <a:schemeClr val="accent1">
+              <a:shade val="15000"/>
+            </a:schemeClr>
+          </a:lnRef>
+          <a:fillRef idx="1">
+            <a:schemeClr val="accent1"/>
+          </a:fillRef>
+          <a:effectRef idx="0">
+            <a:schemeClr val="accent1"/>
+          </a:effectRef>
+          <a:fontRef idx="minor">
+            <a:schemeClr val="lt1"/>
+          </a:fontRef>
+        </p:style>
+        <p:txBody>
+          <a:bodyPr rtlCol="0" anchor="ctr"/>
+          <a:lstStyle/>
+          <a:p>
+            <a:pPr algn="ctr"/>
+            <a:r>
+              <a:rPr lang="pt-BR" dirty="0"/>
+              <a:t>PRIVATED</a:t>
+            </a:r>
+          </a:p>
+        </p:txBody>
+      </p:sp>
+      <p:sp>
+        <p:nvSpPr>
+          <p:cNvPr id="5" name="Seta: para a Direita 4">
+            <a:extLst>
+              <a:ext uri="{FF2B5EF4-FFF2-40B4-BE49-F238E27FC236}">
+                <a16:creationId xmlns:a16="http://schemas.microsoft.com/office/drawing/2014/main" id="{81FF6E0D-EBC5-56FC-49CB-FA31711A1095}"/>
+              </a:ext>
+            </a:extLst>
+          </p:cNvPr>
+          <p:cNvSpPr/>
+          <p:nvPr/>
+        </p:nvSpPr>
+        <p:spPr>
+          <a:xfrm>
+            <a:off x="6096000" y="2458681"/>
+            <a:ext cx="1688122" cy="970319"/>
+          </a:xfrm>
+          <a:prstGeom prst="rightArrow">
+            <a:avLst/>
+          </a:prstGeom>
+          <a:solidFill>
+            <a:srgbClr val="FFFF00"/>
+          </a:solidFill>
+        </p:spPr>
+        <p:style>
+          <a:lnRef idx="2">
+            <a:schemeClr val="accent1">
+              <a:shade val="15000"/>
+            </a:schemeClr>
+          </a:lnRef>
+          <a:fillRef idx="1">
+            <a:schemeClr val="accent1"/>
+          </a:fillRef>
+          <a:effectRef idx="0">
+            <a:schemeClr val="accent1"/>
+          </a:effectRef>
+          <a:fontRef idx="minor">
+            <a:schemeClr val="lt1"/>
+          </a:fontRef>
+        </p:style>
+        <p:txBody>
+          <a:bodyPr rtlCol="0" anchor="ctr"/>
+          <a:lstStyle/>
+          <a:p>
+            <a:pPr algn="ctr"/>
+            <a:r>
+              <a:rPr lang="pt-BR" dirty="0"/>
+              <a:t>PROTECTED</a:t>
+            </a:r>
+          </a:p>
+        </p:txBody>
+      </p:sp>
+      <p:sp>
+        <p:nvSpPr>
+          <p:cNvPr id="6" name="Seta: para a Direita 5">
+            <a:extLst>
+              <a:ext uri="{FF2B5EF4-FFF2-40B4-BE49-F238E27FC236}">
+                <a16:creationId xmlns:a16="http://schemas.microsoft.com/office/drawing/2014/main" id="{E0FD0DE5-621E-D1E3-64E2-39E99742CFA9}"/>
+              </a:ext>
+            </a:extLst>
+          </p:cNvPr>
+          <p:cNvSpPr/>
+          <p:nvPr/>
+        </p:nvSpPr>
+        <p:spPr>
+          <a:xfrm>
+            <a:off x="4220309" y="2458681"/>
+            <a:ext cx="1688122" cy="970319"/>
+          </a:xfrm>
+          <a:prstGeom prst="rightArrow">
+            <a:avLst/>
+          </a:prstGeom>
+          <a:solidFill>
+            <a:srgbClr val="FFC000"/>
+          </a:solidFill>
+        </p:spPr>
+        <p:style>
+          <a:lnRef idx="2">
+            <a:schemeClr val="accent1">
+              <a:shade val="15000"/>
+            </a:schemeClr>
+          </a:lnRef>
+          <a:fillRef idx="1">
+            <a:schemeClr val="accent1"/>
+          </a:fillRef>
+          <a:effectRef idx="0">
+            <a:schemeClr val="accent1"/>
+          </a:effectRef>
+          <a:fontRef idx="minor">
+            <a:schemeClr val="lt1"/>
+          </a:fontRef>
+        </p:style>
+        <p:txBody>
+          <a:bodyPr rtlCol="0" anchor="ctr"/>
+          <a:lstStyle/>
+          <a:p>
+            <a:pPr algn="ctr"/>
+            <a:r>
+              <a:rPr lang="pt-BR" dirty="0"/>
+              <a:t>FRIENDLY</a:t>
+            </a:r>
+          </a:p>
+        </p:txBody>
+      </p:sp>
+      <p:sp>
+        <p:nvSpPr>
+          <p:cNvPr id="7" name="Seta: para a Direita 6">
+            <a:extLst>
+              <a:ext uri="{FF2B5EF4-FFF2-40B4-BE49-F238E27FC236}">
+                <a16:creationId xmlns:a16="http://schemas.microsoft.com/office/drawing/2014/main" id="{1B8B3DB7-BD81-D63A-8B67-B1DA1AF8901A}"/>
+              </a:ext>
+            </a:extLst>
+          </p:cNvPr>
+          <p:cNvSpPr/>
+          <p:nvPr/>
+        </p:nvSpPr>
+        <p:spPr>
+          <a:xfrm>
+            <a:off x="7971691" y="2458681"/>
+            <a:ext cx="1688122" cy="970319"/>
+          </a:xfrm>
+          <a:prstGeom prst="rightArrow">
+            <a:avLst/>
+          </a:prstGeom>
+          <a:solidFill>
+            <a:srgbClr val="92D050"/>
+          </a:solidFill>
+        </p:spPr>
+        <p:style>
+          <a:lnRef idx="2">
+            <a:schemeClr val="accent1">
+              <a:shade val="15000"/>
+            </a:schemeClr>
+          </a:lnRef>
+          <a:fillRef idx="1">
+            <a:schemeClr val="accent1"/>
+          </a:fillRef>
+          <a:effectRef idx="0">
+            <a:schemeClr val="accent1"/>
+          </a:effectRef>
+          <a:fontRef idx="minor">
+            <a:schemeClr val="lt1"/>
+          </a:fontRef>
+        </p:style>
+        <p:txBody>
+          <a:bodyPr rtlCol="0" anchor="ctr"/>
+          <a:lstStyle/>
+          <a:p>
+            <a:pPr algn="ctr"/>
+            <a:r>
+              <a:rPr lang="pt-BR" dirty="0"/>
+              <a:t>PUBLIC</a:t>
+            </a:r>
+          </a:p>
+        </p:txBody>
+      </p:sp>
+      <p:graphicFrame>
+        <p:nvGraphicFramePr>
+          <p:cNvPr id="8" name="Tabela 7">
+            <a:extLst>
+              <a:ext uri="{FF2B5EF4-FFF2-40B4-BE49-F238E27FC236}">
+                <a16:creationId xmlns:a16="http://schemas.microsoft.com/office/drawing/2014/main" id="{199B134B-06D8-9F9F-8CE3-C395D51B897D}"/>
+              </a:ext>
+            </a:extLst>
+          </p:cNvPr>
+          <p:cNvGraphicFramePr>
+            <a:graphicFrameLocks noGrp="1"/>
+          </p:cNvGraphicFramePr>
+          <p:nvPr>
+            <p:extLst>
+              <p:ext uri="{D42A27DB-BD31-4B8C-83A1-F6EECF244321}">
+                <p14:modId xmlns:p14="http://schemas.microsoft.com/office/powerpoint/2010/main" val="2316112533"/>
+              </p:ext>
+            </p:extLst>
+          </p:nvPr>
+        </p:nvGraphicFramePr>
+        <p:xfrm>
+          <a:off x="3154203" y="3860280"/>
+          <a:ext cx="5883593" cy="1854200"/>
+        </p:xfrm>
+        <a:graphic>
+          <a:graphicData uri="http://schemas.openxmlformats.org/drawingml/2006/table">
+            <a:tbl>
+              <a:tblPr firstRow="1" bandRow="1">
+                <a:tableStyleId>{5940675A-B579-460E-94D1-54222C63F5DA}</a:tableStyleId>
+              </a:tblPr>
+              <a:tblGrid>
+                <a:gridCol w="1611630">
+                  <a:extLst>
+                    <a:ext uri="{9D8B030D-6E8A-4147-A177-3AD203B41FA5}">
+                      <a16:colId xmlns:a16="http://schemas.microsoft.com/office/drawing/2014/main" val="265408287"/>
+                    </a:ext>
+                  </a:extLst>
+                </a:gridCol>
+                <a:gridCol w="906780">
+                  <a:extLst>
+                    <a:ext uri="{9D8B030D-6E8A-4147-A177-3AD203B41FA5}">
+                      <a16:colId xmlns:a16="http://schemas.microsoft.com/office/drawing/2014/main" val="2380968845"/>
+                    </a:ext>
+                  </a:extLst>
+                </a:gridCol>
+                <a:gridCol w="953135">
+                  <a:extLst>
+                    <a:ext uri="{9D8B030D-6E8A-4147-A177-3AD203B41FA5}">
+                      <a16:colId xmlns:a16="http://schemas.microsoft.com/office/drawing/2014/main" val="2480090339"/>
+                    </a:ext>
+                  </a:extLst>
+                </a:gridCol>
+                <a:gridCol w="1395730">
+                  <a:extLst>
+                    <a:ext uri="{9D8B030D-6E8A-4147-A177-3AD203B41FA5}">
+                      <a16:colId xmlns:a16="http://schemas.microsoft.com/office/drawing/2014/main" val="3151802610"/>
+                    </a:ext>
+                  </a:extLst>
+                </a:gridCol>
+                <a:gridCol w="1016318">
+                  <a:extLst>
+                    <a:ext uri="{9D8B030D-6E8A-4147-A177-3AD203B41FA5}">
+                      <a16:colId xmlns:a16="http://schemas.microsoft.com/office/drawing/2014/main" val="3490426498"/>
+                    </a:ext>
+                  </a:extLst>
+                </a:gridCol>
+              </a:tblGrid>
+              <a:tr h="370840">
+                <a:tc>
+                  <a:txBody>
+                    <a:bodyPr/>
+                    <a:lstStyle/>
+                    <a:p>
+                      <a:r>
+                        <a:rPr lang="pt-BR" dirty="0"/>
+                        <a:t>MODIFICADOR</a:t>
+                      </a:r>
+                    </a:p>
+                  </a:txBody>
+                  <a:tcPr>
+                    <a:solidFill>
+                      <a:schemeClr val="bg1">
+                        <a:lumMod val="65000"/>
+                      </a:schemeClr>
+                    </a:solidFill>
+                  </a:tcPr>
+                </a:tc>
+                <a:tc>
+                  <a:txBody>
+                    <a:bodyPr/>
+                    <a:lstStyle/>
+                    <a:p>
+                      <a:r>
+                        <a:rPr lang="pt-BR" dirty="0"/>
+                        <a:t>CLASSE</a:t>
+                      </a:r>
+                    </a:p>
+                  </a:txBody>
+                  <a:tcPr>
+                    <a:solidFill>
+                      <a:schemeClr val="bg1">
+                        <a:lumMod val="65000"/>
+                      </a:schemeClr>
+                    </a:solidFill>
+                  </a:tcPr>
+                </a:tc>
+                <a:tc>
+                  <a:txBody>
+                    <a:bodyPr/>
+                    <a:lstStyle/>
+                    <a:p>
+                      <a:r>
+                        <a:rPr lang="pt-BR" dirty="0"/>
+                        <a:t>PACOTE</a:t>
+                      </a:r>
+                    </a:p>
+                  </a:txBody>
+                  <a:tcPr>
+                    <a:solidFill>
+                      <a:schemeClr val="bg1">
+                        <a:lumMod val="65000"/>
+                      </a:schemeClr>
+                    </a:solidFill>
+                  </a:tcPr>
+                </a:tc>
+                <a:tc>
+                  <a:txBody>
+                    <a:bodyPr/>
+                    <a:lstStyle/>
+                    <a:p>
+                      <a:r>
+                        <a:rPr lang="pt-BR" dirty="0"/>
+                        <a:t>SUB_CLASSE</a:t>
+                      </a:r>
+                    </a:p>
+                  </a:txBody>
+                  <a:tcPr>
+                    <a:solidFill>
+                      <a:schemeClr val="bg1">
+                        <a:lumMod val="65000"/>
+                      </a:schemeClr>
+                    </a:solidFill>
+                  </a:tcPr>
+                </a:tc>
+                <a:tc>
+                  <a:txBody>
+                    <a:bodyPr/>
+                    <a:lstStyle/>
+                    <a:p>
+                      <a:r>
+                        <a:rPr lang="pt-BR" dirty="0"/>
+                        <a:t>MUNDO</a:t>
+                      </a:r>
+                    </a:p>
+                  </a:txBody>
+                  <a:tcPr>
+                    <a:solidFill>
+                      <a:schemeClr val="bg1">
+                        <a:lumMod val="65000"/>
+                      </a:schemeClr>
+                    </a:solidFill>
+                  </a:tcPr>
+                </a:tc>
+                <a:extLst>
+                  <a:ext uri="{0D108BD9-81ED-4DB2-BD59-A6C34878D82A}">
+                    <a16:rowId xmlns:a16="http://schemas.microsoft.com/office/drawing/2014/main" val="4101570909"/>
+                  </a:ext>
+                </a:extLst>
+              </a:tr>
+              <a:tr h="370840">
+                <a:tc>
+                  <a:txBody>
+                    <a:bodyPr/>
+                    <a:lstStyle/>
+                    <a:p>
+                      <a:r>
+                        <a:rPr lang="pt-BR" dirty="0"/>
+                        <a:t>PUBLIC</a:t>
+                      </a:r>
+                    </a:p>
+                  </a:txBody>
+                  <a:tcPr/>
+                </a:tc>
+                <a:tc>
+                  <a:txBody>
+                    <a:bodyPr/>
+                    <a:lstStyle/>
+                    <a:p>
+                      <a:endParaRPr lang="pt-BR" dirty="0"/>
+                    </a:p>
+                  </a:txBody>
+                  <a:tcPr>
+                    <a:solidFill>
+                      <a:srgbClr val="92D050"/>
+                    </a:solidFill>
+                  </a:tcPr>
+                </a:tc>
+                <a:tc>
+                  <a:txBody>
+                    <a:bodyPr/>
+                    <a:lstStyle/>
+                    <a:p>
+                      <a:endParaRPr lang="pt-BR" dirty="0"/>
+                    </a:p>
+                  </a:txBody>
+                  <a:tcPr>
+                    <a:solidFill>
+                      <a:srgbClr val="92D050"/>
+                    </a:solidFill>
+                  </a:tcPr>
+                </a:tc>
+                <a:tc>
+                  <a:txBody>
+                    <a:bodyPr/>
+                    <a:lstStyle/>
+                    <a:p>
+                      <a:endParaRPr lang="pt-BR" dirty="0"/>
+                    </a:p>
+                  </a:txBody>
+                  <a:tcPr>
+                    <a:solidFill>
+                      <a:srgbClr val="92D050"/>
+                    </a:solidFill>
+                  </a:tcPr>
+                </a:tc>
+                <a:tc>
+                  <a:txBody>
+                    <a:bodyPr/>
+                    <a:lstStyle/>
+                    <a:p>
+                      <a:endParaRPr lang="pt-BR" dirty="0"/>
+                    </a:p>
+                  </a:txBody>
+                  <a:tcPr>
+                    <a:solidFill>
+                      <a:srgbClr val="92D050"/>
+                    </a:solidFill>
+                  </a:tcPr>
+                </a:tc>
+                <a:extLst>
+                  <a:ext uri="{0D108BD9-81ED-4DB2-BD59-A6C34878D82A}">
+                    <a16:rowId xmlns:a16="http://schemas.microsoft.com/office/drawing/2014/main" val="4062906579"/>
+                  </a:ext>
+                </a:extLst>
+              </a:tr>
+              <a:tr h="370840">
+                <a:tc>
+                  <a:txBody>
+                    <a:bodyPr/>
+                    <a:lstStyle/>
+                    <a:p>
+                      <a:r>
+                        <a:rPr lang="pt-BR" dirty="0"/>
+                        <a:t>PROTECTED</a:t>
+                      </a:r>
+                    </a:p>
+                  </a:txBody>
+                  <a:tcPr/>
+                </a:tc>
+                <a:tc>
+                  <a:txBody>
+                    <a:bodyPr/>
+                    <a:lstStyle/>
+                    <a:p>
+                      <a:endParaRPr lang="pt-BR" dirty="0"/>
+                    </a:p>
+                  </a:txBody>
+                  <a:tcPr>
+                    <a:solidFill>
+                      <a:srgbClr val="92D050"/>
+                    </a:solidFill>
+                  </a:tcPr>
+                </a:tc>
+                <a:tc>
+                  <a:txBody>
+                    <a:bodyPr/>
+                    <a:lstStyle/>
+                    <a:p>
+                      <a:endParaRPr lang="pt-BR" dirty="0"/>
+                    </a:p>
+                  </a:txBody>
+                  <a:tcPr>
+                    <a:solidFill>
+                      <a:srgbClr val="92D050"/>
+                    </a:solidFill>
+                  </a:tcPr>
+                </a:tc>
+                <a:tc>
+                  <a:txBody>
+                    <a:bodyPr/>
+                    <a:lstStyle/>
+                    <a:p>
+                      <a:endParaRPr lang="pt-BR" dirty="0"/>
+                    </a:p>
+                  </a:txBody>
+                  <a:tcPr>
+                    <a:solidFill>
+                      <a:srgbClr val="92D050"/>
+                    </a:solidFill>
+                  </a:tcPr>
+                </a:tc>
+                <a:tc>
+                  <a:txBody>
+                    <a:bodyPr/>
+                    <a:lstStyle/>
+                    <a:p>
+                      <a:endParaRPr lang="pt-BR" dirty="0"/>
+                    </a:p>
+                  </a:txBody>
+                  <a:tcPr>
+                    <a:solidFill>
+                      <a:srgbClr val="FF0000"/>
+                    </a:solidFill>
+                  </a:tcPr>
+                </a:tc>
+                <a:extLst>
+                  <a:ext uri="{0D108BD9-81ED-4DB2-BD59-A6C34878D82A}">
+                    <a16:rowId xmlns:a16="http://schemas.microsoft.com/office/drawing/2014/main" val="2410559424"/>
+                  </a:ext>
+                </a:extLst>
+              </a:tr>
+              <a:tr h="370840">
+                <a:tc>
+                  <a:txBody>
+                    <a:bodyPr/>
+                    <a:lstStyle/>
+                    <a:p>
+                      <a:r>
+                        <a:rPr lang="pt-BR" dirty="0"/>
+                        <a:t>FRIENDLY</a:t>
+                      </a:r>
+                    </a:p>
+                  </a:txBody>
+                  <a:tcPr/>
+                </a:tc>
+                <a:tc>
+                  <a:txBody>
+                    <a:bodyPr/>
+                    <a:lstStyle/>
+                    <a:p>
+                      <a:endParaRPr lang="pt-BR" dirty="0"/>
+                    </a:p>
+                  </a:txBody>
+                  <a:tcPr>
+                    <a:solidFill>
+                      <a:srgbClr val="92D050"/>
+                    </a:solidFill>
+                  </a:tcPr>
+                </a:tc>
+                <a:tc>
+                  <a:txBody>
+                    <a:bodyPr/>
+                    <a:lstStyle/>
+                    <a:p>
+                      <a:endParaRPr lang="pt-BR" dirty="0"/>
+                    </a:p>
+                  </a:txBody>
+                  <a:tcPr>
+                    <a:solidFill>
+                      <a:srgbClr val="92D050"/>
+                    </a:solidFill>
+                  </a:tcPr>
+                </a:tc>
+                <a:tc>
+                  <a:txBody>
+                    <a:bodyPr/>
+                    <a:lstStyle/>
+                    <a:p>
+                      <a:endParaRPr lang="pt-BR" dirty="0"/>
+                    </a:p>
+                  </a:txBody>
+                  <a:tcPr>
+                    <a:solidFill>
+                      <a:srgbClr val="FF0000"/>
+                    </a:solidFill>
+                  </a:tcPr>
+                </a:tc>
+                <a:tc>
+                  <a:txBody>
+                    <a:bodyPr/>
+                    <a:lstStyle/>
+                    <a:p>
+                      <a:endParaRPr lang="pt-BR" dirty="0"/>
+                    </a:p>
+                  </a:txBody>
+                  <a:tcPr>
+                    <a:solidFill>
+                      <a:srgbClr val="FF0000"/>
+                    </a:solidFill>
+                  </a:tcPr>
+                </a:tc>
+                <a:extLst>
+                  <a:ext uri="{0D108BD9-81ED-4DB2-BD59-A6C34878D82A}">
+                    <a16:rowId xmlns:a16="http://schemas.microsoft.com/office/drawing/2014/main" val="2281336794"/>
+                  </a:ext>
+                </a:extLst>
+              </a:tr>
+              <a:tr h="370840">
+                <a:tc>
+                  <a:txBody>
+                    <a:bodyPr/>
+                    <a:lstStyle/>
+                    <a:p>
+                      <a:r>
+                        <a:rPr lang="pt-BR" dirty="0"/>
+                        <a:t>PRIVATE</a:t>
+                      </a:r>
+                    </a:p>
+                  </a:txBody>
+                  <a:tcPr/>
+                </a:tc>
+                <a:tc>
+                  <a:txBody>
+                    <a:bodyPr/>
+                    <a:lstStyle/>
+                    <a:p>
+                      <a:endParaRPr lang="pt-BR" dirty="0"/>
+                    </a:p>
+                  </a:txBody>
+                  <a:tcPr>
+                    <a:solidFill>
+                      <a:srgbClr val="92D050"/>
+                    </a:solidFill>
+                  </a:tcPr>
+                </a:tc>
+                <a:tc>
+                  <a:txBody>
+                    <a:bodyPr/>
+                    <a:lstStyle/>
+                    <a:p>
+                      <a:endParaRPr lang="pt-BR" dirty="0"/>
+                    </a:p>
+                  </a:txBody>
+                  <a:tcPr>
+                    <a:solidFill>
+                      <a:srgbClr val="FF0000"/>
+                    </a:solidFill>
+                  </a:tcPr>
+                </a:tc>
+                <a:tc>
+                  <a:txBody>
+                    <a:bodyPr/>
+                    <a:lstStyle/>
+                    <a:p>
+                      <a:endParaRPr lang="pt-BR" dirty="0"/>
+                    </a:p>
+                  </a:txBody>
+                  <a:tcPr>
+                    <a:solidFill>
+                      <a:srgbClr val="FF0000"/>
+                    </a:solidFill>
+                  </a:tcPr>
+                </a:tc>
+                <a:tc>
+                  <a:txBody>
+                    <a:bodyPr/>
+                    <a:lstStyle/>
+                    <a:p>
+                      <a:endParaRPr lang="pt-BR" dirty="0"/>
+                    </a:p>
+                  </a:txBody>
+                  <a:tcPr>
+                    <a:solidFill>
+                      <a:srgbClr val="FF0000"/>
+                    </a:solidFill>
+                  </a:tcPr>
+                </a:tc>
+                <a:extLst>
+                  <a:ext uri="{0D108BD9-81ED-4DB2-BD59-A6C34878D82A}">
+                    <a16:rowId xmlns:a16="http://schemas.microsoft.com/office/drawing/2014/main" val="2177143093"/>
+                  </a:ext>
+                </a:extLst>
+              </a:tr>
+            </a:tbl>
+          </a:graphicData>
+        </a:graphic>
+      </p:graphicFrame>
+    </p:spTree>
+    <p:extLst>
+      <p:ext uri="{BB962C8B-B14F-4D97-AF65-F5344CB8AC3E}">
+        <p14:creationId xmlns:p14="http://schemas.microsoft.com/office/powerpoint/2010/main" val="2974879593"/>
+      </p:ext>
+    </p:extLst>
+  </p:cSld>
+  <p:clrMapOvr>
+    <a:masterClrMapping/>
+  </p:clrMapOvr>
+</p:sld>
+</file>
+
+<file path=ppt/slides/slide16.xml><?xml version="1.0" encoding="utf-8"?>
+<p:sld xmlns:a="http://schemas.openxmlformats.org/drawingml/2006/main" xmlns:r="http://schemas.openxmlformats.org/officeDocument/2006/relationships" xmlns:p="http://schemas.openxmlformats.org/presentationml/2006/main">
+  <p:cSld>
+    <p:spTree>
+      <p:nvGrpSpPr>
+        <p:cNvPr id="1" name=""/>
+        <p:cNvGrpSpPr/>
+        <p:nvPr/>
+      </p:nvGrpSpPr>
+      <p:grpSpPr>
+        <a:xfrm>
+          <a:off x="0" y="0"/>
+          <a:ext cx="0" cy="0"/>
+          <a:chOff x="0" y="0"/>
+          <a:chExt cx="0" cy="0"/>
+        </a:xfrm>
+      </p:grpSpPr>
+      <p:sp>
+        <p:nvSpPr>
+          <p:cNvPr id="2" name="Título 1">
+            <a:extLst>
+              <a:ext uri="{FF2B5EF4-FFF2-40B4-BE49-F238E27FC236}">
+                <a16:creationId xmlns:a16="http://schemas.microsoft.com/office/drawing/2014/main" id="{DFA4C97B-A4B4-FF8B-2726-264C74B961DD}"/>
+              </a:ext>
+            </a:extLst>
+          </p:cNvPr>
+          <p:cNvSpPr>
+            <a:spLocks noGrp="1"/>
+          </p:cNvSpPr>
+          <p:nvPr>
+            <p:ph type="title"/>
+          </p:nvPr>
+        </p:nvSpPr>
+        <p:spPr/>
+        <p:txBody>
+          <a:bodyPr/>
+          <a:lstStyle/>
+          <a:p>
+            <a:r>
+              <a:rPr lang="pt-BR" dirty="0"/>
+              <a:t>CLASSES</a:t>
+            </a:r>
+            <a:br>
+              <a:rPr lang="pt-BR" dirty="0"/>
+            </a:br>
+            <a:r>
+              <a:rPr lang="pt-BR" sz="2400" dirty="0"/>
+              <a:t>MODIFICADORES NON-ACESS</a:t>
+            </a:r>
+          </a:p>
+        </p:txBody>
+      </p:sp>
+      <p:sp>
+        <p:nvSpPr>
+          <p:cNvPr id="3" name="Espaço Reservado para Conteúdo 2">
+            <a:extLst>
+              <a:ext uri="{FF2B5EF4-FFF2-40B4-BE49-F238E27FC236}">
+                <a16:creationId xmlns:a16="http://schemas.microsoft.com/office/drawing/2014/main" id="{69FCF1EF-6B42-806B-1C74-12D36B66A7D4}"/>
+              </a:ext>
+            </a:extLst>
+          </p:cNvPr>
+          <p:cNvSpPr>
+            <a:spLocks noGrp="1"/>
+          </p:cNvSpPr>
+          <p:nvPr>
+            <p:ph idx="1"/>
+          </p:nvPr>
+        </p:nvSpPr>
+        <p:spPr>
+          <a:xfrm>
+            <a:off x="1097278" y="1845734"/>
+            <a:ext cx="10058399" cy="4023360"/>
+          </a:xfrm>
+        </p:spPr>
+        <p:txBody>
+          <a:bodyPr>
+            <a:normAutofit/>
+          </a:bodyPr>
+          <a:lstStyle/>
+          <a:p>
+            <a:r>
+              <a:rPr lang="pt-BR" dirty="0"/>
+              <a:t>Permitem especificar algumas propriedades especificas de uma Classe, Método ou Atributo, determinando como as Classes (que herdarão uma Classe, Método ou Atributo) podem ou não instanciar uma Classe, redefinir e alterar um Método ou Atributo.</a:t>
+            </a:r>
+          </a:p>
+          <a:p>
+            <a:r>
+              <a:rPr lang="pt-BR" dirty="0"/>
+              <a:t>Para as Classes, temos dois modificadores:</a:t>
+            </a:r>
+          </a:p>
+          <a:p>
+            <a:r>
+              <a:rPr lang="pt-BR" b="1" dirty="0"/>
+              <a:t>Abstract</a:t>
+            </a:r>
+            <a:r>
+              <a:rPr lang="pt-BR" dirty="0"/>
+              <a:t>: não pode ser usado para criar (instanciar) objetos de forma direta. Para acessar uma Classe Abstrata, ela deve ser herdada por outra classe e instanciada por meio desta herança.</a:t>
+            </a:r>
+          </a:p>
+          <a:p>
+            <a:r>
+              <a:rPr lang="pt-BR" b="1" dirty="0"/>
+              <a:t>Final</a:t>
+            </a:r>
+            <a:r>
+              <a:rPr lang="pt-BR" dirty="0"/>
+              <a:t>: não pode ser herdada por outra Classe.</a:t>
+            </a:r>
+          </a:p>
+          <a:p>
+            <a:r>
+              <a:rPr lang="pt-BR" b="1" dirty="0"/>
+              <a:t>Importante</a:t>
+            </a:r>
+            <a:r>
+              <a:rPr lang="pt-BR" dirty="0"/>
+              <a:t>: os modificadores não podem ser combinados.</a:t>
+            </a:r>
+            <a:endParaRPr lang="pt-BR" b="1" dirty="0"/>
+          </a:p>
+          <a:p>
+            <a:pPr marL="0" indent="0">
+              <a:buNone/>
+            </a:pPr>
+            <a:endParaRPr lang="pt-BR" dirty="0"/>
+          </a:p>
+          <a:p>
+            <a:endParaRPr lang="pt-BR" dirty="0"/>
+          </a:p>
+        </p:txBody>
+      </p:sp>
+    </p:spTree>
+    <p:extLst>
+      <p:ext uri="{BB962C8B-B14F-4D97-AF65-F5344CB8AC3E}">
+        <p14:creationId xmlns:p14="http://schemas.microsoft.com/office/powerpoint/2010/main" val="2050530230"/>
+      </p:ext>
+    </p:extLst>
+  </p:cSld>
+  <p:clrMapOvr>
+    <a:masterClrMapping/>
+  </p:clrMapOvr>
+</p:sld>
+</file>
+
+<file path=ppt/slides/slide17.xml><?xml version="1.0" encoding="utf-8"?>
+<p:sld xmlns:a="http://schemas.openxmlformats.org/drawingml/2006/main" xmlns:r="http://schemas.openxmlformats.org/officeDocument/2006/relationships" xmlns:p="http://schemas.openxmlformats.org/presentationml/2006/main">
+  <p:cSld>
+    <p:spTree>
+      <p:nvGrpSpPr>
+        <p:cNvPr id="1" name=""/>
+        <p:cNvGrpSpPr/>
+        <p:nvPr/>
+      </p:nvGrpSpPr>
+      <p:grpSpPr>
+        <a:xfrm>
+          <a:off x="0" y="0"/>
+          <a:ext cx="0" cy="0"/>
+          <a:chOff x="0" y="0"/>
+          <a:chExt cx="0" cy="0"/>
+        </a:xfrm>
+      </p:grpSpPr>
+      <p:sp>
+        <p:nvSpPr>
+          <p:cNvPr id="2" name="Título 1">
+            <a:extLst>
+              <a:ext uri="{FF2B5EF4-FFF2-40B4-BE49-F238E27FC236}">
+                <a16:creationId xmlns:a16="http://schemas.microsoft.com/office/drawing/2014/main" id="{DFA4C97B-A4B4-FF8B-2726-264C74B961DD}"/>
+              </a:ext>
+            </a:extLst>
+          </p:cNvPr>
+          <p:cNvSpPr>
+            <a:spLocks noGrp="1"/>
+          </p:cNvSpPr>
+          <p:nvPr>
+            <p:ph type="title"/>
+          </p:nvPr>
+        </p:nvSpPr>
+        <p:spPr/>
+        <p:txBody>
+          <a:bodyPr/>
+          <a:lstStyle/>
+          <a:p>
+            <a:r>
+              <a:rPr lang="pt-BR" dirty="0"/>
+              <a:t>CLASSES</a:t>
+            </a:r>
+            <a:br>
+              <a:rPr lang="pt-BR" dirty="0"/>
+            </a:br>
+            <a:r>
+              <a:rPr lang="pt-BR" sz="2400" dirty="0"/>
+              <a:t>MODIFICADORES NON-ACESS</a:t>
+            </a:r>
+          </a:p>
+        </p:txBody>
+      </p:sp>
+      <p:sp>
+        <p:nvSpPr>
+          <p:cNvPr id="3" name="Espaço Reservado para Conteúdo 2">
+            <a:extLst>
+              <a:ext uri="{FF2B5EF4-FFF2-40B4-BE49-F238E27FC236}">
+                <a16:creationId xmlns:a16="http://schemas.microsoft.com/office/drawing/2014/main" id="{69FCF1EF-6B42-806B-1C74-12D36B66A7D4}"/>
+              </a:ext>
+            </a:extLst>
+          </p:cNvPr>
+          <p:cNvSpPr>
+            <a:spLocks noGrp="1"/>
+          </p:cNvSpPr>
+          <p:nvPr>
+            <p:ph idx="1"/>
+          </p:nvPr>
+        </p:nvSpPr>
+        <p:spPr>
+          <a:xfrm>
+            <a:off x="1097278" y="1845734"/>
+            <a:ext cx="10058399" cy="4023360"/>
+          </a:xfrm>
+        </p:spPr>
+        <p:txBody>
+          <a:bodyPr>
+            <a:normAutofit fontScale="92500" lnSpcReduction="10000"/>
+          </a:bodyPr>
+          <a:lstStyle/>
+          <a:p>
+            <a:r>
+              <a:rPr lang="pt-BR" dirty="0"/>
+              <a:t>Para os Métodos, temos 3 modificadores:</a:t>
+            </a:r>
+          </a:p>
+          <a:p>
+            <a:r>
+              <a:rPr lang="pt-BR" b="1" dirty="0"/>
+              <a:t>Abstract</a:t>
+            </a:r>
+            <a:r>
+              <a:rPr lang="pt-BR" dirty="0"/>
+              <a:t>: não implementa nenhuma funcionalidade, apenas assina o método e faz com que a primeira subclasse concreta seja obrigada a implementar o método. Uma classe que contenha um método abstrato é obrigada a ser abstrata.</a:t>
+            </a:r>
+          </a:p>
+          <a:p>
+            <a:r>
+              <a:rPr lang="pt-BR" b="1" dirty="0"/>
+              <a:t>Final</a:t>
+            </a:r>
+            <a:r>
+              <a:rPr lang="pt-BR" dirty="0"/>
+              <a:t>: define que ele não pode ser sobrescrito ou modificado.</a:t>
+            </a:r>
+          </a:p>
+          <a:p>
+            <a:r>
+              <a:rPr lang="pt-BR" b="1" dirty="0"/>
+              <a:t>Static</a:t>
+            </a:r>
+            <a:r>
+              <a:rPr lang="pt-BR" dirty="0"/>
+              <a:t>: é um método da classe e não dependem de um objeto. Quando são chamados, executam funções sem a dependência de um objeto</a:t>
+            </a:r>
+            <a:endParaRPr lang="pt-BR" b="1" dirty="0"/>
+          </a:p>
+          <a:p>
+            <a:r>
+              <a:rPr lang="pt-BR" b="1" dirty="0"/>
+              <a:t>Importante</a:t>
+            </a:r>
+            <a:r>
+              <a:rPr lang="pt-BR" dirty="0"/>
+              <a:t>: </a:t>
+            </a:r>
+          </a:p>
+          <a:p>
+            <a:pPr lvl="1"/>
+            <a:r>
+              <a:rPr lang="pt-BR" dirty="0"/>
+              <a:t>os modificadores não podem ser combinados;</a:t>
+            </a:r>
+          </a:p>
+          <a:p>
+            <a:pPr lvl="1"/>
+            <a:r>
+              <a:rPr lang="pt-BR" dirty="0"/>
+              <a:t>Um método não pode ser abstract e final, nem abstract e private;</a:t>
+            </a:r>
+          </a:p>
+          <a:p>
+            <a:pPr lvl="1"/>
+            <a:r>
+              <a:rPr lang="pt-BR" dirty="0"/>
+              <a:t>Um método final não pode ser sobrescrito ou sobrecarregado;</a:t>
+            </a:r>
+          </a:p>
+          <a:p>
+            <a:pPr lvl="1"/>
+            <a:r>
+              <a:rPr lang="pt-BR" dirty="0"/>
+              <a:t>Um método abstrato não pode ser implementado, e sua classe deve ser abstrata.</a:t>
+            </a:r>
+          </a:p>
+          <a:p>
+            <a:pPr lvl="1"/>
+            <a:endParaRPr lang="pt-BR" dirty="0"/>
+          </a:p>
+          <a:p>
+            <a:pPr lvl="1"/>
+            <a:endParaRPr lang="pt-BR" dirty="0"/>
+          </a:p>
+          <a:p>
+            <a:pPr marL="0" indent="0">
+              <a:buNone/>
+            </a:pPr>
+            <a:endParaRPr lang="pt-BR" dirty="0"/>
+          </a:p>
+          <a:p>
+            <a:endParaRPr lang="pt-BR" dirty="0"/>
+          </a:p>
+        </p:txBody>
+      </p:sp>
+    </p:spTree>
+    <p:extLst>
+      <p:ext uri="{BB962C8B-B14F-4D97-AF65-F5344CB8AC3E}">
+        <p14:creationId xmlns:p14="http://schemas.microsoft.com/office/powerpoint/2010/main" val="3482890838"/>
+      </p:ext>
+    </p:extLst>
+  </p:cSld>
+  <p:clrMapOvr>
+    <a:masterClrMapping/>
+  </p:clrMapOvr>
+</p:sld>
+</file>
+
+<file path=ppt/slides/slide18.xml><?xml version="1.0" encoding="utf-8"?>
+<p:sld xmlns:a="http://schemas.openxmlformats.org/drawingml/2006/main" xmlns:r="http://schemas.openxmlformats.org/officeDocument/2006/relationships" xmlns:p="http://schemas.openxmlformats.org/presentationml/2006/main">
+  <p:cSld>
+    <p:spTree>
+      <p:nvGrpSpPr>
+        <p:cNvPr id="1" name=""/>
+        <p:cNvGrpSpPr/>
+        <p:nvPr/>
+      </p:nvGrpSpPr>
+      <p:grpSpPr>
+        <a:xfrm>
+          <a:off x="0" y="0"/>
+          <a:ext cx="0" cy="0"/>
+          <a:chOff x="0" y="0"/>
+          <a:chExt cx="0" cy="0"/>
+        </a:xfrm>
+      </p:grpSpPr>
+      <p:sp>
+        <p:nvSpPr>
+          <p:cNvPr id="2" name="Título 1">
+            <a:extLst>
+              <a:ext uri="{FF2B5EF4-FFF2-40B4-BE49-F238E27FC236}">
+                <a16:creationId xmlns:a16="http://schemas.microsoft.com/office/drawing/2014/main" id="{DFA4C97B-A4B4-FF8B-2726-264C74B961DD}"/>
+              </a:ext>
+            </a:extLst>
+          </p:cNvPr>
+          <p:cNvSpPr>
+            <a:spLocks noGrp="1"/>
+          </p:cNvSpPr>
+          <p:nvPr>
+            <p:ph type="title"/>
+          </p:nvPr>
+        </p:nvSpPr>
+        <p:spPr/>
+        <p:txBody>
+          <a:bodyPr/>
+          <a:lstStyle/>
+          <a:p>
+            <a:r>
+              <a:rPr lang="pt-BR" dirty="0"/>
+              <a:t>CLASSES</a:t>
+            </a:r>
+            <a:br>
+              <a:rPr lang="pt-BR" dirty="0"/>
+            </a:br>
+            <a:r>
+              <a:rPr lang="pt-BR" sz="2400" dirty="0"/>
+              <a:t>MODIFICADORES NON-ACESS</a:t>
+            </a:r>
+          </a:p>
+        </p:txBody>
+      </p:sp>
+      <p:sp>
+        <p:nvSpPr>
+          <p:cNvPr id="3" name="Espaço Reservado para Conteúdo 2">
+            <a:extLst>
+              <a:ext uri="{FF2B5EF4-FFF2-40B4-BE49-F238E27FC236}">
+                <a16:creationId xmlns:a16="http://schemas.microsoft.com/office/drawing/2014/main" id="{69FCF1EF-6B42-806B-1C74-12D36B66A7D4}"/>
+              </a:ext>
+            </a:extLst>
+          </p:cNvPr>
+          <p:cNvSpPr>
+            <a:spLocks noGrp="1"/>
+          </p:cNvSpPr>
+          <p:nvPr>
+            <p:ph idx="1"/>
+          </p:nvPr>
+        </p:nvSpPr>
+        <p:spPr>
+          <a:xfrm>
+            <a:off x="1097278" y="1845734"/>
+            <a:ext cx="10058399" cy="4023360"/>
+          </a:xfrm>
+        </p:spPr>
+        <p:txBody>
+          <a:bodyPr>
+            <a:normAutofit fontScale="92500" lnSpcReduction="20000"/>
+          </a:bodyPr>
+          <a:lstStyle/>
+          <a:p>
+            <a:r>
+              <a:rPr lang="pt-BR" dirty="0"/>
+              <a:t>Para os Atributos temos dois modificadores:</a:t>
+            </a:r>
+          </a:p>
+          <a:p>
+            <a:r>
+              <a:rPr lang="pt-BR" b="1" dirty="0"/>
+              <a:t>Final</a:t>
+            </a:r>
+            <a:r>
+              <a:rPr lang="pt-BR" dirty="0"/>
+              <a:t>: não pode ser modificado.</a:t>
+            </a:r>
+          </a:p>
+          <a:p>
+            <a:r>
+              <a:rPr lang="pt-BR" b="1" dirty="0"/>
+              <a:t>Static</a:t>
+            </a:r>
+            <a:r>
+              <a:rPr lang="pt-BR" dirty="0"/>
+              <a:t>: é um atributo da Classe, não depende de um objeto ou instancia de uma classe.</a:t>
+            </a:r>
+            <a:endParaRPr lang="pt-BR" b="1" dirty="0"/>
+          </a:p>
+          <a:p>
+            <a:r>
+              <a:rPr lang="pt-BR" dirty="0"/>
+              <a:t>Exemplo:</a:t>
+            </a:r>
+          </a:p>
+          <a:p>
+            <a:pPr marL="1317120" lvl="7" indent="0">
+              <a:buNone/>
+            </a:pPr>
+            <a:r>
+              <a:rPr lang="pt-BR" sz="2200" dirty="0">
+                <a:solidFill>
+                  <a:srgbClr val="FF0000"/>
+                </a:solidFill>
+              </a:rPr>
+              <a:t>Public class </a:t>
+            </a:r>
+            <a:r>
+              <a:rPr lang="pt-BR" sz="2200" dirty="0"/>
+              <a:t>Conta {</a:t>
+            </a:r>
+          </a:p>
+          <a:p>
+            <a:pPr marL="1517120" lvl="8" indent="0">
+              <a:buNone/>
+            </a:pPr>
+            <a:r>
+              <a:rPr lang="pt-BR" sz="2200" dirty="0"/>
+              <a:t>	</a:t>
+            </a:r>
+            <a:r>
+              <a:rPr lang="pt-BR" sz="2200" dirty="0">
+                <a:solidFill>
+                  <a:srgbClr val="00B050"/>
+                </a:solidFill>
+              </a:rPr>
+              <a:t>/*Atributos da Classe*/</a:t>
+            </a:r>
+          </a:p>
+          <a:p>
+            <a:pPr marL="1517120" lvl="8" indent="0">
+              <a:buNone/>
+            </a:pPr>
+            <a:r>
+              <a:rPr lang="pt-BR" sz="2200" dirty="0"/>
+              <a:t>	</a:t>
+            </a:r>
+            <a:r>
+              <a:rPr lang="pt-BR" sz="2200" dirty="0">
+                <a:solidFill>
+                  <a:srgbClr val="FF0000"/>
+                </a:solidFill>
+              </a:rPr>
+              <a:t>private</a:t>
+            </a:r>
+            <a:r>
+              <a:rPr lang="pt-BR" sz="2200" dirty="0"/>
+              <a:t> int numero;</a:t>
+            </a:r>
+          </a:p>
+          <a:p>
+            <a:pPr marL="1517120" lvl="8" indent="0">
+              <a:buNone/>
+            </a:pPr>
+            <a:r>
+              <a:rPr lang="pt-BR" sz="2200" dirty="0"/>
+              <a:t>	</a:t>
+            </a:r>
+            <a:r>
+              <a:rPr lang="pt-BR" sz="2200" dirty="0">
+                <a:solidFill>
+                  <a:srgbClr val="FF0000"/>
+                </a:solidFill>
+              </a:rPr>
+              <a:t>private</a:t>
+            </a:r>
+            <a:r>
+              <a:rPr lang="pt-BR" sz="2200" dirty="0"/>
+              <a:t> int agencia;</a:t>
+            </a:r>
+          </a:p>
+          <a:p>
+            <a:pPr marL="1517120" lvl="8" indent="0">
+              <a:buNone/>
+            </a:pPr>
+            <a:r>
+              <a:rPr lang="pt-BR" sz="2200" dirty="0"/>
+              <a:t>	</a:t>
+            </a:r>
+            <a:r>
+              <a:rPr lang="pt-BR" sz="2200" dirty="0">
+                <a:solidFill>
+                  <a:srgbClr val="FF0000"/>
+                </a:solidFill>
+              </a:rPr>
+              <a:t>private</a:t>
+            </a:r>
+            <a:r>
+              <a:rPr lang="pt-BR" sz="2200" dirty="0"/>
+              <a:t> int tipo;</a:t>
+            </a:r>
+          </a:p>
+          <a:p>
+            <a:pPr marL="1517120" lvl="8" indent="0">
+              <a:buNone/>
+            </a:pPr>
+            <a:r>
+              <a:rPr lang="pt-BR" sz="2200" dirty="0"/>
+              <a:t>	</a:t>
+            </a:r>
+            <a:r>
+              <a:rPr lang="pt-BR" sz="2200" dirty="0">
+                <a:solidFill>
+                  <a:srgbClr val="FF0000"/>
+                </a:solidFill>
+              </a:rPr>
+              <a:t>private</a:t>
+            </a:r>
+            <a:r>
+              <a:rPr lang="pt-BR" sz="2200" dirty="0"/>
+              <a:t> String titular;</a:t>
+            </a:r>
+          </a:p>
+          <a:p>
+            <a:pPr marL="1517120" lvl="8" indent="0">
+              <a:buNone/>
+            </a:pPr>
+            <a:r>
+              <a:rPr lang="pt-BR" sz="2200" dirty="0"/>
+              <a:t>	</a:t>
+            </a:r>
+            <a:r>
+              <a:rPr lang="pt-BR" sz="2200" dirty="0">
+                <a:solidFill>
+                  <a:srgbClr val="FF0000"/>
+                </a:solidFill>
+              </a:rPr>
+              <a:t>private</a:t>
+            </a:r>
+            <a:r>
+              <a:rPr lang="pt-BR" sz="2200" dirty="0"/>
+              <a:t> float saldo;</a:t>
+            </a:r>
+          </a:p>
+          <a:p>
+            <a:pPr marL="1271400" lvl="7" indent="0">
+              <a:buNone/>
+            </a:pPr>
+            <a:r>
+              <a:rPr lang="pt-BR" sz="2200" dirty="0"/>
+              <a:t>}</a:t>
+            </a:r>
+          </a:p>
+        </p:txBody>
+      </p:sp>
+    </p:spTree>
+    <p:extLst>
+      <p:ext uri="{BB962C8B-B14F-4D97-AF65-F5344CB8AC3E}">
+        <p14:creationId xmlns:p14="http://schemas.microsoft.com/office/powerpoint/2010/main" val="3987372679"/>
+      </p:ext>
+    </p:extLst>
+  </p:cSld>
+  <p:clrMapOvr>
+    <a:masterClrMapping/>
+  </p:clrMapOvr>
+</p:sld>
+</file>
+
+<file path=ppt/slides/slide19.xml><?xml version="1.0" encoding="utf-8"?>
+<p:sld xmlns:a="http://schemas.openxmlformats.org/drawingml/2006/main" xmlns:r="http://schemas.openxmlformats.org/officeDocument/2006/relationships" xmlns:p="http://schemas.openxmlformats.org/presentationml/2006/main">
+  <p:cSld>
+    <p:spTree>
+      <p:nvGrpSpPr>
+        <p:cNvPr id="1" name=""/>
+        <p:cNvGrpSpPr/>
+        <p:nvPr/>
+      </p:nvGrpSpPr>
+      <p:grpSpPr>
+        <a:xfrm>
+          <a:off x="0" y="0"/>
+          <a:ext cx="0" cy="0"/>
+          <a:chOff x="0" y="0"/>
+          <a:chExt cx="0" cy="0"/>
+        </a:xfrm>
+      </p:grpSpPr>
+      <p:sp>
+        <p:nvSpPr>
+          <p:cNvPr id="2" name="Título 1">
+            <a:extLst>
+              <a:ext uri="{FF2B5EF4-FFF2-40B4-BE49-F238E27FC236}">
+                <a16:creationId xmlns:a16="http://schemas.microsoft.com/office/drawing/2014/main" id="{1446C375-068E-C004-D4FD-C526E4959ACC}"/>
+              </a:ext>
+            </a:extLst>
+          </p:cNvPr>
+          <p:cNvSpPr>
+            <a:spLocks noGrp="1"/>
+          </p:cNvSpPr>
+          <p:nvPr>
+            <p:ph type="title"/>
+          </p:nvPr>
+        </p:nvSpPr>
+        <p:spPr/>
+        <p:txBody>
+          <a:bodyPr/>
+          <a:lstStyle/>
+          <a:p>
+            <a:r>
+              <a:rPr lang="pt-BR" dirty="0"/>
+              <a:t>MÉTODOS ESPECIAIS</a:t>
+            </a:r>
+          </a:p>
+        </p:txBody>
+      </p:sp>
+      <p:sp>
+        <p:nvSpPr>
+          <p:cNvPr id="3" name="Espaço Reservado para Conteúdo 2">
+            <a:extLst>
+              <a:ext uri="{FF2B5EF4-FFF2-40B4-BE49-F238E27FC236}">
+                <a16:creationId xmlns:a16="http://schemas.microsoft.com/office/drawing/2014/main" id="{764519FC-2B02-5BE1-482B-D3172B8F2C2A}"/>
+              </a:ext>
+            </a:extLst>
+          </p:cNvPr>
+          <p:cNvSpPr>
+            <a:spLocks noGrp="1"/>
+          </p:cNvSpPr>
+          <p:nvPr>
+            <p:ph idx="1"/>
+          </p:nvPr>
+        </p:nvSpPr>
+        <p:spPr/>
+        <p:txBody>
+          <a:bodyPr/>
+          <a:lstStyle/>
+          <a:p>
+            <a:r>
+              <a:rPr lang="pt-BR" dirty="0"/>
+              <a:t>Após a construção de uma classe, precisamos implementar alguns métodos especiais: </a:t>
+            </a:r>
+          </a:p>
+          <a:p>
+            <a:pPr lvl="1"/>
+            <a:r>
+              <a:rPr lang="pt-BR" dirty="0"/>
+              <a:t>Método Construtor;</a:t>
+            </a:r>
+          </a:p>
+          <a:p>
+            <a:pPr lvl="1"/>
+            <a:r>
+              <a:rPr lang="pt-BR" dirty="0"/>
+              <a:t>Método </a:t>
+            </a:r>
+            <a:r>
+              <a:rPr lang="pt-BR" dirty="0" err="1"/>
+              <a:t>Get</a:t>
+            </a:r>
+            <a:r>
+              <a:rPr lang="pt-BR" dirty="0"/>
+              <a:t> e Set.</a:t>
+            </a:r>
+          </a:p>
+          <a:p>
+            <a:endParaRPr lang="pt-BR" dirty="0"/>
+          </a:p>
+        </p:txBody>
+      </p:sp>
+    </p:spTree>
+    <p:extLst>
+      <p:ext uri="{BB962C8B-B14F-4D97-AF65-F5344CB8AC3E}">
+        <p14:creationId xmlns:p14="http://schemas.microsoft.com/office/powerpoint/2010/main" val="4293583628"/>
+      </p:ext>
+    </p:extLst>
+  </p:cSld>
+  <p:clrMapOvr>
+    <a:masterClrMapping/>
+  </p:clrMapOvr>
+</p:sld>
+</file>
+
 <file path=ppt/slides/slide2.xml><?xml version="1.0" encoding="utf-8"?>
 <p:sld xmlns:a="http://schemas.openxmlformats.org/drawingml/2006/main" xmlns:r="http://schemas.openxmlformats.org/officeDocument/2006/relationships" xmlns:p="http://schemas.openxmlformats.org/presentationml/2006/main">
   <p:cSld>
@@ -7563,6 +9249,1917 @@
     <p:extLst>
       <p:ext uri="{BB962C8B-B14F-4D97-AF65-F5344CB8AC3E}">
         <p14:creationId xmlns:p14="http://schemas.microsoft.com/office/powerpoint/2010/main" val="2034609272"/>
+      </p:ext>
+    </p:extLst>
+  </p:cSld>
+  <p:clrMapOvr>
+    <a:masterClrMapping/>
+  </p:clrMapOvr>
+</p:sld>
+</file>
+
+<file path=ppt/slides/slide20.xml><?xml version="1.0" encoding="utf-8"?>
+<p:sld xmlns:a="http://schemas.openxmlformats.org/drawingml/2006/main" xmlns:r="http://schemas.openxmlformats.org/officeDocument/2006/relationships" xmlns:p="http://schemas.openxmlformats.org/presentationml/2006/main">
+  <p:cSld>
+    <p:spTree>
+      <p:nvGrpSpPr>
+        <p:cNvPr id="1" name=""/>
+        <p:cNvGrpSpPr/>
+        <p:nvPr/>
+      </p:nvGrpSpPr>
+      <p:grpSpPr>
+        <a:xfrm>
+          <a:off x="0" y="0"/>
+          <a:ext cx="0" cy="0"/>
+          <a:chOff x="0" y="0"/>
+          <a:chExt cx="0" cy="0"/>
+        </a:xfrm>
+      </p:grpSpPr>
+      <p:sp>
+        <p:nvSpPr>
+          <p:cNvPr id="2" name="Título 1">
+            <a:extLst>
+              <a:ext uri="{FF2B5EF4-FFF2-40B4-BE49-F238E27FC236}">
+                <a16:creationId xmlns:a16="http://schemas.microsoft.com/office/drawing/2014/main" id="{1446C375-068E-C004-D4FD-C526E4959ACC}"/>
+              </a:ext>
+            </a:extLst>
+          </p:cNvPr>
+          <p:cNvSpPr>
+            <a:spLocks noGrp="1"/>
+          </p:cNvSpPr>
+          <p:nvPr>
+            <p:ph type="title"/>
+          </p:nvPr>
+        </p:nvSpPr>
+        <p:spPr/>
+        <p:txBody>
+          <a:bodyPr/>
+          <a:lstStyle/>
+          <a:p>
+            <a:r>
+              <a:rPr lang="pt-BR" dirty="0"/>
+              <a:t>MÉTODOS ESPECIAIS</a:t>
+            </a:r>
+            <a:br>
+              <a:rPr lang="pt-BR" dirty="0"/>
+            </a:br>
+            <a:r>
+              <a:rPr lang="pt-BR" sz="2000" dirty="0"/>
+              <a:t>MÉTODO CONSTRUTOR</a:t>
+            </a:r>
+          </a:p>
+        </p:txBody>
+      </p:sp>
+      <p:sp>
+        <p:nvSpPr>
+          <p:cNvPr id="3" name="Espaço Reservado para Conteúdo 2">
+            <a:extLst>
+              <a:ext uri="{FF2B5EF4-FFF2-40B4-BE49-F238E27FC236}">
+                <a16:creationId xmlns:a16="http://schemas.microsoft.com/office/drawing/2014/main" id="{764519FC-2B02-5BE1-482B-D3172B8F2C2A}"/>
+              </a:ext>
+            </a:extLst>
+          </p:cNvPr>
+          <p:cNvSpPr>
+            <a:spLocks noGrp="1"/>
+          </p:cNvSpPr>
+          <p:nvPr>
+            <p:ph idx="1"/>
+          </p:nvPr>
+        </p:nvSpPr>
+        <p:spPr/>
+        <p:txBody>
+          <a:bodyPr>
+            <a:normAutofit lnSpcReduction="10000"/>
+          </a:bodyPr>
+          <a:lstStyle/>
+          <a:p>
+            <a:r>
+              <a:rPr lang="pt-BR" dirty="0"/>
+              <a:t>Para instanciar um objeto em uma classe, precisamos implementar um método para gerar o novo objeto. O </a:t>
+            </a:r>
+            <a:r>
+              <a:rPr lang="pt-BR" i="1" dirty="0"/>
+              <a:t>método construtor</a:t>
+            </a:r>
+            <a:r>
+              <a:rPr lang="pt-BR" dirty="0"/>
+              <a:t> é responsável por essa tarefa. É um método especial criado automaticamente quando um objeto e classe é criado. </a:t>
+            </a:r>
+          </a:p>
+          <a:p>
+            <a:r>
+              <a:rPr lang="pt-BR" dirty="0"/>
+              <a:t>Este método possui algumas características:</a:t>
+            </a:r>
+          </a:p>
+          <a:p>
+            <a:pPr lvl="1"/>
+            <a:r>
+              <a:rPr lang="pt-BR" dirty="0"/>
+              <a:t>Determina as ações referentes à inicialização de cada objeto criado;</a:t>
+            </a:r>
+          </a:p>
+          <a:p>
+            <a:pPr lvl="1"/>
+            <a:r>
+              <a:rPr lang="pt-BR" dirty="0"/>
+              <a:t>Quando o programa instancia um objeto da classe, este método é chamado;</a:t>
+            </a:r>
+          </a:p>
+          <a:p>
+            <a:pPr lvl="1"/>
+            <a:r>
+              <a:rPr lang="pt-BR" dirty="0"/>
+              <a:t>Este método não tem retorno, nem mesmo </a:t>
+            </a:r>
+            <a:r>
+              <a:rPr lang="pt-BR" i="1" dirty="0"/>
+              <a:t>void</a:t>
+            </a:r>
+            <a:r>
+              <a:rPr lang="pt-BR" dirty="0"/>
+              <a:t>;</a:t>
+            </a:r>
+          </a:p>
+          <a:p>
+            <a:pPr lvl="1"/>
+            <a:r>
+              <a:rPr lang="pt-BR" dirty="0"/>
+              <a:t>O nome do método deve ser o mesmo nome da classe;</a:t>
+            </a:r>
+          </a:p>
+          <a:p>
+            <a:pPr lvl="1"/>
+            <a:r>
+              <a:rPr lang="pt-BR" dirty="0"/>
+              <a:t>Embora pode receber alguns argumentos, iguais aos métodos, geralmente recebe variáveis com os mesmo nome dos atributos da classe;</a:t>
+            </a:r>
+          </a:p>
+          <a:p>
+            <a:pPr lvl="1"/>
+            <a:r>
+              <a:rPr lang="pt-BR" dirty="0"/>
+              <a:t>Toda classe deve conter um método construtor definido;</a:t>
+            </a:r>
+          </a:p>
+          <a:p>
+            <a:pPr lvl="1"/>
+            <a:r>
+              <a:rPr lang="pt-BR" dirty="0"/>
+              <a:t>Caso não haja um construtor definido na classe, um construtor </a:t>
+            </a:r>
+            <a:r>
+              <a:rPr lang="pt-BR" i="1" dirty="0"/>
+              <a:t>default</a:t>
+            </a:r>
+            <a:r>
+              <a:rPr lang="pt-BR" dirty="0"/>
+              <a:t> será criado pelo compilador. </a:t>
+            </a:r>
+          </a:p>
+          <a:p>
+            <a:pPr lvl="1"/>
+            <a:r>
+              <a:rPr lang="pt-BR" dirty="0"/>
+              <a:t>Caso o desenvolvedor crie um construtor, o construtor </a:t>
+            </a:r>
+            <a:r>
+              <a:rPr lang="pt-BR" i="1" dirty="0"/>
+              <a:t>default</a:t>
+            </a:r>
+            <a:r>
+              <a:rPr lang="pt-BR" dirty="0"/>
+              <a:t> não será criado.</a:t>
+            </a:r>
+          </a:p>
+          <a:p>
+            <a:endParaRPr lang="pt-BR" dirty="0"/>
+          </a:p>
+        </p:txBody>
+      </p:sp>
+    </p:spTree>
+    <p:extLst>
+      <p:ext uri="{BB962C8B-B14F-4D97-AF65-F5344CB8AC3E}">
+        <p14:creationId xmlns:p14="http://schemas.microsoft.com/office/powerpoint/2010/main" val="4259278438"/>
+      </p:ext>
+    </p:extLst>
+  </p:cSld>
+  <p:clrMapOvr>
+    <a:masterClrMapping/>
+  </p:clrMapOvr>
+</p:sld>
+</file>
+
+<file path=ppt/slides/slide21.xml><?xml version="1.0" encoding="utf-8"?>
+<p:sld xmlns:a="http://schemas.openxmlformats.org/drawingml/2006/main" xmlns:r="http://schemas.openxmlformats.org/officeDocument/2006/relationships" xmlns:p="http://schemas.openxmlformats.org/presentationml/2006/main">
+  <p:cSld>
+    <p:spTree>
+      <p:nvGrpSpPr>
+        <p:cNvPr id="1" name=""/>
+        <p:cNvGrpSpPr/>
+        <p:nvPr/>
+      </p:nvGrpSpPr>
+      <p:grpSpPr>
+        <a:xfrm>
+          <a:off x="0" y="0"/>
+          <a:ext cx="0" cy="0"/>
+          <a:chOff x="0" y="0"/>
+          <a:chExt cx="0" cy="0"/>
+        </a:xfrm>
+      </p:grpSpPr>
+      <p:sp>
+        <p:nvSpPr>
+          <p:cNvPr id="2" name="Título 1">
+            <a:extLst>
+              <a:ext uri="{FF2B5EF4-FFF2-40B4-BE49-F238E27FC236}">
+                <a16:creationId xmlns:a16="http://schemas.microsoft.com/office/drawing/2014/main" id="{1446C375-068E-C004-D4FD-C526E4959ACC}"/>
+              </a:ext>
+            </a:extLst>
+          </p:cNvPr>
+          <p:cNvSpPr>
+            <a:spLocks noGrp="1"/>
+          </p:cNvSpPr>
+          <p:nvPr>
+            <p:ph type="title"/>
+          </p:nvPr>
+        </p:nvSpPr>
+        <p:spPr/>
+        <p:txBody>
+          <a:bodyPr/>
+          <a:lstStyle/>
+          <a:p>
+            <a:r>
+              <a:rPr lang="pt-BR" dirty="0"/>
+              <a:t>MÉTODOS ESPECIAIS</a:t>
+            </a:r>
+            <a:br>
+              <a:rPr lang="pt-BR" dirty="0"/>
+            </a:br>
+            <a:r>
+              <a:rPr lang="pt-BR" sz="2000" dirty="0"/>
+              <a:t>MÉTODO CONSTRUTOR</a:t>
+            </a:r>
+          </a:p>
+        </p:txBody>
+      </p:sp>
+      <p:sp>
+        <p:nvSpPr>
+          <p:cNvPr id="3" name="Espaço Reservado para Conteúdo 2">
+            <a:extLst>
+              <a:ext uri="{FF2B5EF4-FFF2-40B4-BE49-F238E27FC236}">
+                <a16:creationId xmlns:a16="http://schemas.microsoft.com/office/drawing/2014/main" id="{764519FC-2B02-5BE1-482B-D3172B8F2C2A}"/>
+              </a:ext>
+            </a:extLst>
+          </p:cNvPr>
+          <p:cNvSpPr>
+            <a:spLocks noGrp="1"/>
+          </p:cNvSpPr>
+          <p:nvPr>
+            <p:ph idx="1"/>
+          </p:nvPr>
+        </p:nvSpPr>
+        <p:spPr>
+          <a:xfrm>
+            <a:off x="5711483" y="1737360"/>
+            <a:ext cx="6480517" cy="4353951"/>
+          </a:xfrm>
+          <a:ln>
+            <a:solidFill>
+              <a:schemeClr val="bg1">
+                <a:lumMod val="65000"/>
+              </a:schemeClr>
+            </a:solidFill>
+          </a:ln>
+        </p:spPr>
+        <p:txBody>
+          <a:bodyPr>
+            <a:normAutofit fontScale="85000" lnSpcReduction="10000"/>
+          </a:bodyPr>
+          <a:lstStyle/>
+          <a:p>
+            <a:r>
+              <a:rPr lang="pt-BR" dirty="0"/>
+              <a:t>Public class Conta {</a:t>
+            </a:r>
+          </a:p>
+          <a:p>
+            <a:pPr marL="201168" lvl="1" indent="0">
+              <a:buNone/>
+            </a:pPr>
+            <a:r>
+              <a:rPr lang="pt-BR" dirty="0"/>
+              <a:t>	/*Atributos*/</a:t>
+            </a:r>
+          </a:p>
+          <a:p>
+            <a:pPr marL="201168" lvl="1" indent="0">
+              <a:buNone/>
+            </a:pPr>
+            <a:r>
+              <a:rPr lang="pt-BR" sz="1800" dirty="0">
+                <a:solidFill>
+                  <a:srgbClr val="FF0000"/>
+                </a:solidFill>
+              </a:rPr>
+              <a:t>	private</a:t>
+            </a:r>
+            <a:r>
+              <a:rPr lang="pt-BR" sz="1800" dirty="0"/>
+              <a:t> int numero;</a:t>
+            </a:r>
+          </a:p>
+          <a:p>
+            <a:pPr marL="201168" lvl="1" indent="0">
+              <a:buNone/>
+            </a:pPr>
+            <a:r>
+              <a:rPr lang="pt-BR" sz="1800" dirty="0"/>
+              <a:t>	</a:t>
+            </a:r>
+            <a:r>
+              <a:rPr lang="pt-BR" sz="1800" dirty="0">
+                <a:solidFill>
+                  <a:srgbClr val="FF0000"/>
+                </a:solidFill>
+              </a:rPr>
+              <a:t>private</a:t>
+            </a:r>
+            <a:r>
+              <a:rPr lang="pt-BR" sz="1800" dirty="0"/>
+              <a:t> int agencia;</a:t>
+            </a:r>
+          </a:p>
+          <a:p>
+            <a:pPr marL="201168" lvl="1" indent="0">
+              <a:buNone/>
+            </a:pPr>
+            <a:r>
+              <a:rPr lang="pt-BR" sz="1800" dirty="0"/>
+              <a:t>	</a:t>
+            </a:r>
+            <a:r>
+              <a:rPr lang="pt-BR" sz="1800" dirty="0">
+                <a:solidFill>
+                  <a:srgbClr val="FF0000"/>
+                </a:solidFill>
+              </a:rPr>
+              <a:t>private</a:t>
+            </a:r>
+            <a:r>
+              <a:rPr lang="pt-BR" sz="1800" dirty="0"/>
+              <a:t> int tipo;</a:t>
+            </a:r>
+          </a:p>
+          <a:p>
+            <a:pPr marL="201168" lvl="1" indent="0">
+              <a:buNone/>
+            </a:pPr>
+            <a:r>
+              <a:rPr lang="pt-BR" sz="1800" dirty="0"/>
+              <a:t>	</a:t>
+            </a:r>
+            <a:r>
+              <a:rPr lang="pt-BR" sz="1800" dirty="0">
+                <a:solidFill>
+                  <a:srgbClr val="FF0000"/>
+                </a:solidFill>
+              </a:rPr>
+              <a:t>private</a:t>
+            </a:r>
+            <a:r>
+              <a:rPr lang="pt-BR" sz="1800" dirty="0"/>
+              <a:t> String titular;</a:t>
+            </a:r>
+          </a:p>
+          <a:p>
+            <a:pPr marL="201168" lvl="1" indent="0">
+              <a:buNone/>
+            </a:pPr>
+            <a:r>
+              <a:rPr lang="pt-BR" sz="1800" dirty="0"/>
+              <a:t>	</a:t>
+            </a:r>
+            <a:r>
+              <a:rPr lang="pt-BR" sz="1800" dirty="0">
+                <a:solidFill>
+                  <a:srgbClr val="FF0000"/>
+                </a:solidFill>
+              </a:rPr>
+              <a:t>private</a:t>
+            </a:r>
+            <a:r>
+              <a:rPr lang="pt-BR" sz="1800" dirty="0"/>
+              <a:t> float saldo;</a:t>
+            </a:r>
+          </a:p>
+          <a:p>
+            <a:pPr marL="201168" lvl="1" indent="0">
+              <a:buNone/>
+            </a:pPr>
+            <a:endParaRPr lang="pt-BR" dirty="0"/>
+          </a:p>
+          <a:p>
+            <a:pPr marL="201168" lvl="1" indent="0">
+              <a:buNone/>
+            </a:pPr>
+            <a:r>
+              <a:rPr lang="pt-BR" dirty="0"/>
+              <a:t>	</a:t>
+            </a:r>
+            <a:r>
+              <a:rPr lang="pt-BR" dirty="0">
+                <a:solidFill>
+                  <a:srgbClr val="FF0000"/>
+                </a:solidFill>
+              </a:rPr>
+              <a:t>public</a:t>
+            </a:r>
+            <a:r>
+              <a:rPr lang="pt-BR" dirty="0"/>
+              <a:t> Conta(int numero, int agencia, int tipo, String titular, float saldo) {</a:t>
+            </a:r>
+          </a:p>
+          <a:p>
+            <a:pPr marL="201168" lvl="1" indent="0">
+              <a:buNone/>
+            </a:pPr>
+            <a:r>
+              <a:rPr lang="pt-BR" dirty="0"/>
+              <a:t>		this.numero = numero;</a:t>
+            </a:r>
+          </a:p>
+          <a:p>
+            <a:pPr marL="201168" lvl="1" indent="0">
+              <a:buNone/>
+            </a:pPr>
+            <a:r>
+              <a:rPr lang="pt-BR" dirty="0"/>
+              <a:t>		this.agencia = agencia;</a:t>
+            </a:r>
+          </a:p>
+          <a:p>
+            <a:pPr marL="201168" lvl="1" indent="0">
+              <a:buNone/>
+            </a:pPr>
+            <a:r>
+              <a:rPr lang="pt-BR" dirty="0"/>
+              <a:t>		this.tipo = tipo;</a:t>
+            </a:r>
+          </a:p>
+          <a:p>
+            <a:pPr marL="201168" lvl="1" indent="0">
+              <a:buNone/>
+            </a:pPr>
+            <a:r>
+              <a:rPr lang="pt-BR" dirty="0"/>
+              <a:t>		this.titular = titular;</a:t>
+            </a:r>
+          </a:p>
+          <a:p>
+            <a:pPr marL="201168" lvl="1" indent="0">
+              <a:buNone/>
+            </a:pPr>
+            <a:r>
+              <a:rPr lang="pt-BR" dirty="0"/>
+              <a:t>		this.saldo = saldo;</a:t>
+            </a:r>
+          </a:p>
+          <a:p>
+            <a:pPr marL="201168" lvl="1" indent="0">
+              <a:buNone/>
+            </a:pPr>
+            <a:r>
+              <a:rPr lang="pt-BR" dirty="0"/>
+              <a:t>	}</a:t>
+            </a:r>
+          </a:p>
+          <a:p>
+            <a:pPr marL="201168" lvl="1" indent="0">
+              <a:buNone/>
+            </a:pPr>
+            <a:r>
+              <a:rPr lang="pt-BR" dirty="0"/>
+              <a:t>}</a:t>
+            </a:r>
+          </a:p>
+          <a:p>
+            <a:endParaRPr lang="pt-BR" dirty="0"/>
+          </a:p>
+        </p:txBody>
+      </p:sp>
+      <p:sp>
+        <p:nvSpPr>
+          <p:cNvPr id="4" name="Espaço Reservado para Conteúdo 2">
+            <a:extLst>
+              <a:ext uri="{FF2B5EF4-FFF2-40B4-BE49-F238E27FC236}">
+                <a16:creationId xmlns:a16="http://schemas.microsoft.com/office/drawing/2014/main" id="{FBA106C9-A0A0-F649-D83B-0D847F351552}"/>
+              </a:ext>
+            </a:extLst>
+          </p:cNvPr>
+          <p:cNvSpPr txBox="1">
+            <a:spLocks/>
+          </p:cNvSpPr>
+          <p:nvPr/>
+        </p:nvSpPr>
+        <p:spPr>
+          <a:xfrm>
+            <a:off x="7709094" y="1954108"/>
+            <a:ext cx="3950677" cy="4023360"/>
+          </a:xfrm>
+          <a:prstGeom prst="rect">
+            <a:avLst/>
+          </a:prstGeom>
+        </p:spPr>
+        <p:txBody>
+          <a:bodyPr vert="horz" lIns="0" tIns="45720" rIns="0" bIns="45720" rtlCol="0">
+            <a:normAutofit/>
+          </a:bodyPr>
+          <a:lstStyle>
+            <a:lvl1pPr marL="91440" indent="-91440" algn="l" defTabSz="914400" rtl="0" eaLnBrk="1" latinLnBrk="0" hangingPunct="1">
+              <a:lnSpc>
+                <a:spcPct val="90000"/>
+              </a:lnSpc>
+              <a:spcBef>
+                <a:spcPts val="1200"/>
+              </a:spcBef>
+              <a:spcAft>
+                <a:spcPts val="200"/>
+              </a:spcAft>
+              <a:buClr>
+                <a:schemeClr val="accent1"/>
+              </a:buClr>
+              <a:buSzPct val="100000"/>
+              <a:buFont typeface="Calibri" panose="020F0502020204030204" pitchFamily="34" charset="0"/>
+              <a:buChar char=" "/>
+              <a:defRPr sz="2000" kern="1200">
+                <a:solidFill>
+                  <a:schemeClr val="tx1">
+                    <a:lumMod val="75000"/>
+                    <a:lumOff val="25000"/>
+                  </a:schemeClr>
+                </a:solidFill>
+                <a:latin typeface="+mn-lt"/>
+                <a:ea typeface="+mn-ea"/>
+                <a:cs typeface="+mn-cs"/>
+              </a:defRPr>
+            </a:lvl1pPr>
+            <a:lvl2pPr marL="384048" indent="-182880" algn="l" defTabSz="914400" rtl="0" eaLnBrk="1" latinLnBrk="0" hangingPunct="1">
+              <a:lnSpc>
+                <a:spcPct val="90000"/>
+              </a:lnSpc>
+              <a:spcBef>
+                <a:spcPts val="200"/>
+              </a:spcBef>
+              <a:spcAft>
+                <a:spcPts val="400"/>
+              </a:spcAft>
+              <a:buClr>
+                <a:schemeClr val="accent1"/>
+              </a:buClr>
+              <a:buFont typeface="Calibri" pitchFamily="34" charset="0"/>
+              <a:buChar char="◦"/>
+              <a:defRPr sz="1800" kern="1200">
+                <a:solidFill>
+                  <a:schemeClr val="tx1">
+                    <a:lumMod val="75000"/>
+                    <a:lumOff val="25000"/>
+                  </a:schemeClr>
+                </a:solidFill>
+                <a:latin typeface="+mn-lt"/>
+                <a:ea typeface="+mn-ea"/>
+                <a:cs typeface="+mn-cs"/>
+              </a:defRPr>
+            </a:lvl2pPr>
+            <a:lvl3pPr marL="566928" indent="-182880" algn="l" defTabSz="914400" rtl="0" eaLnBrk="1" latinLnBrk="0" hangingPunct="1">
+              <a:lnSpc>
+                <a:spcPct val="90000"/>
+              </a:lnSpc>
+              <a:spcBef>
+                <a:spcPts val="200"/>
+              </a:spcBef>
+              <a:spcAft>
+                <a:spcPts val="400"/>
+              </a:spcAft>
+              <a:buClr>
+                <a:schemeClr val="accent1"/>
+              </a:buClr>
+              <a:buFont typeface="Calibri" pitchFamily="34" charset="0"/>
+              <a:buChar char="◦"/>
+              <a:defRPr sz="1400" kern="1200">
+                <a:solidFill>
+                  <a:schemeClr val="tx1">
+                    <a:lumMod val="75000"/>
+                    <a:lumOff val="25000"/>
+                  </a:schemeClr>
+                </a:solidFill>
+                <a:latin typeface="+mn-lt"/>
+                <a:ea typeface="+mn-ea"/>
+                <a:cs typeface="+mn-cs"/>
+              </a:defRPr>
+            </a:lvl3pPr>
+            <a:lvl4pPr marL="749808" indent="-182880" algn="l" defTabSz="914400" rtl="0" eaLnBrk="1" latinLnBrk="0" hangingPunct="1">
+              <a:lnSpc>
+                <a:spcPct val="90000"/>
+              </a:lnSpc>
+              <a:spcBef>
+                <a:spcPts val="200"/>
+              </a:spcBef>
+              <a:spcAft>
+                <a:spcPts val="400"/>
+              </a:spcAft>
+              <a:buClr>
+                <a:schemeClr val="accent1"/>
+              </a:buClr>
+              <a:buFont typeface="Calibri" pitchFamily="34" charset="0"/>
+              <a:buChar char="◦"/>
+              <a:defRPr sz="1400" kern="1200">
+                <a:solidFill>
+                  <a:schemeClr val="tx1">
+                    <a:lumMod val="75000"/>
+                    <a:lumOff val="25000"/>
+                  </a:schemeClr>
+                </a:solidFill>
+                <a:latin typeface="+mn-lt"/>
+                <a:ea typeface="+mn-ea"/>
+                <a:cs typeface="+mn-cs"/>
+              </a:defRPr>
+            </a:lvl4pPr>
+            <a:lvl5pPr marL="932688" indent="-182880" algn="l" defTabSz="914400" rtl="0" eaLnBrk="1" latinLnBrk="0" hangingPunct="1">
+              <a:lnSpc>
+                <a:spcPct val="90000"/>
+              </a:lnSpc>
+              <a:spcBef>
+                <a:spcPts val="200"/>
+              </a:spcBef>
+              <a:spcAft>
+                <a:spcPts val="400"/>
+              </a:spcAft>
+              <a:buClr>
+                <a:schemeClr val="accent1"/>
+              </a:buClr>
+              <a:buFont typeface="Calibri" pitchFamily="34" charset="0"/>
+              <a:buChar char="◦"/>
+              <a:defRPr sz="1400" kern="1200">
+                <a:solidFill>
+                  <a:schemeClr val="tx1">
+                    <a:lumMod val="75000"/>
+                    <a:lumOff val="25000"/>
+                  </a:schemeClr>
+                </a:solidFill>
+                <a:latin typeface="+mn-lt"/>
+                <a:ea typeface="+mn-ea"/>
+                <a:cs typeface="+mn-cs"/>
+              </a:defRPr>
+            </a:lvl5pPr>
+            <a:lvl6pPr marL="1100000" indent="-228600" algn="l" defTabSz="914400" rtl="0" eaLnBrk="1" latinLnBrk="0" hangingPunct="1">
+              <a:lnSpc>
+                <a:spcPct val="90000"/>
+              </a:lnSpc>
+              <a:spcBef>
+                <a:spcPts val="200"/>
+              </a:spcBef>
+              <a:spcAft>
+                <a:spcPts val="400"/>
+              </a:spcAft>
+              <a:buClr>
+                <a:schemeClr val="accent1"/>
+              </a:buClr>
+              <a:buFont typeface="Calibri" pitchFamily="34" charset="0"/>
+              <a:buChar char="◦"/>
+              <a:defRPr sz="1400" kern="1200">
+                <a:solidFill>
+                  <a:schemeClr val="tx1">
+                    <a:lumMod val="75000"/>
+                    <a:lumOff val="25000"/>
+                  </a:schemeClr>
+                </a:solidFill>
+                <a:latin typeface="+mn-lt"/>
+                <a:ea typeface="+mn-ea"/>
+                <a:cs typeface="+mn-cs"/>
+              </a:defRPr>
+            </a:lvl6pPr>
+            <a:lvl7pPr marL="1300000" indent="-228600" algn="l" defTabSz="914400" rtl="0" eaLnBrk="1" latinLnBrk="0" hangingPunct="1">
+              <a:lnSpc>
+                <a:spcPct val="90000"/>
+              </a:lnSpc>
+              <a:spcBef>
+                <a:spcPts val="200"/>
+              </a:spcBef>
+              <a:spcAft>
+                <a:spcPts val="400"/>
+              </a:spcAft>
+              <a:buClr>
+                <a:schemeClr val="accent1"/>
+              </a:buClr>
+              <a:buFont typeface="Calibri" pitchFamily="34" charset="0"/>
+              <a:buChar char="◦"/>
+              <a:defRPr sz="1400" kern="1200">
+                <a:solidFill>
+                  <a:schemeClr val="tx1">
+                    <a:lumMod val="75000"/>
+                    <a:lumOff val="25000"/>
+                  </a:schemeClr>
+                </a:solidFill>
+                <a:latin typeface="+mn-lt"/>
+                <a:ea typeface="+mn-ea"/>
+                <a:cs typeface="+mn-cs"/>
+              </a:defRPr>
+            </a:lvl7pPr>
+            <a:lvl8pPr marL="1500000" indent="-228600" algn="l" defTabSz="914400" rtl="0" eaLnBrk="1" latinLnBrk="0" hangingPunct="1">
+              <a:lnSpc>
+                <a:spcPct val="90000"/>
+              </a:lnSpc>
+              <a:spcBef>
+                <a:spcPts val="200"/>
+              </a:spcBef>
+              <a:spcAft>
+                <a:spcPts val="400"/>
+              </a:spcAft>
+              <a:buClr>
+                <a:schemeClr val="accent1"/>
+              </a:buClr>
+              <a:buFont typeface="Calibri" pitchFamily="34" charset="0"/>
+              <a:buChar char="◦"/>
+              <a:defRPr sz="1400" kern="1200">
+                <a:solidFill>
+                  <a:schemeClr val="tx1">
+                    <a:lumMod val="75000"/>
+                    <a:lumOff val="25000"/>
+                  </a:schemeClr>
+                </a:solidFill>
+                <a:latin typeface="+mn-lt"/>
+                <a:ea typeface="+mn-ea"/>
+                <a:cs typeface="+mn-cs"/>
+              </a:defRPr>
+            </a:lvl8pPr>
+            <a:lvl9pPr marL="1700000" indent="-228600" algn="l" defTabSz="914400" rtl="0" eaLnBrk="1" latinLnBrk="0" hangingPunct="1">
+              <a:lnSpc>
+                <a:spcPct val="90000"/>
+              </a:lnSpc>
+              <a:spcBef>
+                <a:spcPts val="200"/>
+              </a:spcBef>
+              <a:spcAft>
+                <a:spcPts val="400"/>
+              </a:spcAft>
+              <a:buClr>
+                <a:schemeClr val="accent1"/>
+              </a:buClr>
+              <a:buFont typeface="Calibri" pitchFamily="34" charset="0"/>
+              <a:buChar char="◦"/>
+              <a:defRPr sz="1400" kern="1200">
+                <a:solidFill>
+                  <a:schemeClr val="tx1">
+                    <a:lumMod val="75000"/>
+                    <a:lumOff val="25000"/>
+                  </a:schemeClr>
+                </a:solidFill>
+                <a:latin typeface="+mn-lt"/>
+                <a:ea typeface="+mn-ea"/>
+                <a:cs typeface="+mn-cs"/>
+              </a:defRPr>
+            </a:lvl9pPr>
+          </a:lstStyle>
+          <a:p>
+            <a:endParaRPr lang="pt-BR" dirty="0"/>
+          </a:p>
+        </p:txBody>
+      </p:sp>
+      <p:sp>
+        <p:nvSpPr>
+          <p:cNvPr id="5" name="Espaço Reservado para Conteúdo 2">
+            <a:extLst>
+              <a:ext uri="{FF2B5EF4-FFF2-40B4-BE49-F238E27FC236}">
+                <a16:creationId xmlns:a16="http://schemas.microsoft.com/office/drawing/2014/main" id="{9B40BD10-B73A-1734-AF31-4BE4AEF5FECE}"/>
+              </a:ext>
+            </a:extLst>
+          </p:cNvPr>
+          <p:cNvSpPr txBox="1">
+            <a:spLocks/>
+          </p:cNvSpPr>
+          <p:nvPr/>
+        </p:nvSpPr>
+        <p:spPr>
+          <a:xfrm>
+            <a:off x="147712" y="1737360"/>
+            <a:ext cx="5432474" cy="4240108"/>
+          </a:xfrm>
+          <a:prstGeom prst="rect">
+            <a:avLst/>
+          </a:prstGeom>
+        </p:spPr>
+        <p:txBody>
+          <a:bodyPr vert="horz" lIns="0" tIns="45720" rIns="0" bIns="45720" rtlCol="0">
+            <a:normAutofit/>
+          </a:bodyPr>
+          <a:lstStyle>
+            <a:lvl1pPr marL="91440" indent="-91440" algn="l" defTabSz="914400" rtl="0" eaLnBrk="1" latinLnBrk="0" hangingPunct="1">
+              <a:lnSpc>
+                <a:spcPct val="90000"/>
+              </a:lnSpc>
+              <a:spcBef>
+                <a:spcPts val="1200"/>
+              </a:spcBef>
+              <a:spcAft>
+                <a:spcPts val="200"/>
+              </a:spcAft>
+              <a:buClr>
+                <a:schemeClr val="accent1"/>
+              </a:buClr>
+              <a:buSzPct val="100000"/>
+              <a:buFont typeface="Calibri" panose="020F0502020204030204" pitchFamily="34" charset="0"/>
+              <a:buChar char=" "/>
+              <a:defRPr sz="2000" kern="1200">
+                <a:solidFill>
+                  <a:schemeClr val="tx1">
+                    <a:lumMod val="75000"/>
+                    <a:lumOff val="25000"/>
+                  </a:schemeClr>
+                </a:solidFill>
+                <a:latin typeface="+mn-lt"/>
+                <a:ea typeface="+mn-ea"/>
+                <a:cs typeface="+mn-cs"/>
+              </a:defRPr>
+            </a:lvl1pPr>
+            <a:lvl2pPr marL="384048" indent="-182880" algn="l" defTabSz="914400" rtl="0" eaLnBrk="1" latinLnBrk="0" hangingPunct="1">
+              <a:lnSpc>
+                <a:spcPct val="90000"/>
+              </a:lnSpc>
+              <a:spcBef>
+                <a:spcPts val="200"/>
+              </a:spcBef>
+              <a:spcAft>
+                <a:spcPts val="400"/>
+              </a:spcAft>
+              <a:buClr>
+                <a:schemeClr val="accent1"/>
+              </a:buClr>
+              <a:buFont typeface="Calibri" pitchFamily="34" charset="0"/>
+              <a:buChar char="◦"/>
+              <a:defRPr sz="1800" kern="1200">
+                <a:solidFill>
+                  <a:schemeClr val="tx1">
+                    <a:lumMod val="75000"/>
+                    <a:lumOff val="25000"/>
+                  </a:schemeClr>
+                </a:solidFill>
+                <a:latin typeface="+mn-lt"/>
+                <a:ea typeface="+mn-ea"/>
+                <a:cs typeface="+mn-cs"/>
+              </a:defRPr>
+            </a:lvl2pPr>
+            <a:lvl3pPr marL="566928" indent="-182880" algn="l" defTabSz="914400" rtl="0" eaLnBrk="1" latinLnBrk="0" hangingPunct="1">
+              <a:lnSpc>
+                <a:spcPct val="90000"/>
+              </a:lnSpc>
+              <a:spcBef>
+                <a:spcPts val="200"/>
+              </a:spcBef>
+              <a:spcAft>
+                <a:spcPts val="400"/>
+              </a:spcAft>
+              <a:buClr>
+                <a:schemeClr val="accent1"/>
+              </a:buClr>
+              <a:buFont typeface="Calibri" pitchFamily="34" charset="0"/>
+              <a:buChar char="◦"/>
+              <a:defRPr sz="1400" kern="1200">
+                <a:solidFill>
+                  <a:schemeClr val="tx1">
+                    <a:lumMod val="75000"/>
+                    <a:lumOff val="25000"/>
+                  </a:schemeClr>
+                </a:solidFill>
+                <a:latin typeface="+mn-lt"/>
+                <a:ea typeface="+mn-ea"/>
+                <a:cs typeface="+mn-cs"/>
+              </a:defRPr>
+            </a:lvl3pPr>
+            <a:lvl4pPr marL="749808" indent="-182880" algn="l" defTabSz="914400" rtl="0" eaLnBrk="1" latinLnBrk="0" hangingPunct="1">
+              <a:lnSpc>
+                <a:spcPct val="90000"/>
+              </a:lnSpc>
+              <a:spcBef>
+                <a:spcPts val="200"/>
+              </a:spcBef>
+              <a:spcAft>
+                <a:spcPts val="400"/>
+              </a:spcAft>
+              <a:buClr>
+                <a:schemeClr val="accent1"/>
+              </a:buClr>
+              <a:buFont typeface="Calibri" pitchFamily="34" charset="0"/>
+              <a:buChar char="◦"/>
+              <a:defRPr sz="1400" kern="1200">
+                <a:solidFill>
+                  <a:schemeClr val="tx1">
+                    <a:lumMod val="75000"/>
+                    <a:lumOff val="25000"/>
+                  </a:schemeClr>
+                </a:solidFill>
+                <a:latin typeface="+mn-lt"/>
+                <a:ea typeface="+mn-ea"/>
+                <a:cs typeface="+mn-cs"/>
+              </a:defRPr>
+            </a:lvl4pPr>
+            <a:lvl5pPr marL="932688" indent="-182880" algn="l" defTabSz="914400" rtl="0" eaLnBrk="1" latinLnBrk="0" hangingPunct="1">
+              <a:lnSpc>
+                <a:spcPct val="90000"/>
+              </a:lnSpc>
+              <a:spcBef>
+                <a:spcPts val="200"/>
+              </a:spcBef>
+              <a:spcAft>
+                <a:spcPts val="400"/>
+              </a:spcAft>
+              <a:buClr>
+                <a:schemeClr val="accent1"/>
+              </a:buClr>
+              <a:buFont typeface="Calibri" pitchFamily="34" charset="0"/>
+              <a:buChar char="◦"/>
+              <a:defRPr sz="1400" kern="1200">
+                <a:solidFill>
+                  <a:schemeClr val="tx1">
+                    <a:lumMod val="75000"/>
+                    <a:lumOff val="25000"/>
+                  </a:schemeClr>
+                </a:solidFill>
+                <a:latin typeface="+mn-lt"/>
+                <a:ea typeface="+mn-ea"/>
+                <a:cs typeface="+mn-cs"/>
+              </a:defRPr>
+            </a:lvl5pPr>
+            <a:lvl6pPr marL="1100000" indent="-228600" algn="l" defTabSz="914400" rtl="0" eaLnBrk="1" latinLnBrk="0" hangingPunct="1">
+              <a:lnSpc>
+                <a:spcPct val="90000"/>
+              </a:lnSpc>
+              <a:spcBef>
+                <a:spcPts val="200"/>
+              </a:spcBef>
+              <a:spcAft>
+                <a:spcPts val="400"/>
+              </a:spcAft>
+              <a:buClr>
+                <a:schemeClr val="accent1"/>
+              </a:buClr>
+              <a:buFont typeface="Calibri" pitchFamily="34" charset="0"/>
+              <a:buChar char="◦"/>
+              <a:defRPr sz="1400" kern="1200">
+                <a:solidFill>
+                  <a:schemeClr val="tx1">
+                    <a:lumMod val="75000"/>
+                    <a:lumOff val="25000"/>
+                  </a:schemeClr>
+                </a:solidFill>
+                <a:latin typeface="+mn-lt"/>
+                <a:ea typeface="+mn-ea"/>
+                <a:cs typeface="+mn-cs"/>
+              </a:defRPr>
+            </a:lvl6pPr>
+            <a:lvl7pPr marL="1300000" indent="-228600" algn="l" defTabSz="914400" rtl="0" eaLnBrk="1" latinLnBrk="0" hangingPunct="1">
+              <a:lnSpc>
+                <a:spcPct val="90000"/>
+              </a:lnSpc>
+              <a:spcBef>
+                <a:spcPts val="200"/>
+              </a:spcBef>
+              <a:spcAft>
+                <a:spcPts val="400"/>
+              </a:spcAft>
+              <a:buClr>
+                <a:schemeClr val="accent1"/>
+              </a:buClr>
+              <a:buFont typeface="Calibri" pitchFamily="34" charset="0"/>
+              <a:buChar char="◦"/>
+              <a:defRPr sz="1400" kern="1200">
+                <a:solidFill>
+                  <a:schemeClr val="tx1">
+                    <a:lumMod val="75000"/>
+                    <a:lumOff val="25000"/>
+                  </a:schemeClr>
+                </a:solidFill>
+                <a:latin typeface="+mn-lt"/>
+                <a:ea typeface="+mn-ea"/>
+                <a:cs typeface="+mn-cs"/>
+              </a:defRPr>
+            </a:lvl7pPr>
+            <a:lvl8pPr marL="1500000" indent="-228600" algn="l" defTabSz="914400" rtl="0" eaLnBrk="1" latinLnBrk="0" hangingPunct="1">
+              <a:lnSpc>
+                <a:spcPct val="90000"/>
+              </a:lnSpc>
+              <a:spcBef>
+                <a:spcPts val="200"/>
+              </a:spcBef>
+              <a:spcAft>
+                <a:spcPts val="400"/>
+              </a:spcAft>
+              <a:buClr>
+                <a:schemeClr val="accent1"/>
+              </a:buClr>
+              <a:buFont typeface="Calibri" pitchFamily="34" charset="0"/>
+              <a:buChar char="◦"/>
+              <a:defRPr sz="1400" kern="1200">
+                <a:solidFill>
+                  <a:schemeClr val="tx1">
+                    <a:lumMod val="75000"/>
+                    <a:lumOff val="25000"/>
+                  </a:schemeClr>
+                </a:solidFill>
+                <a:latin typeface="+mn-lt"/>
+                <a:ea typeface="+mn-ea"/>
+                <a:cs typeface="+mn-cs"/>
+              </a:defRPr>
+            </a:lvl8pPr>
+            <a:lvl9pPr marL="1700000" indent="-228600" algn="l" defTabSz="914400" rtl="0" eaLnBrk="1" latinLnBrk="0" hangingPunct="1">
+              <a:lnSpc>
+                <a:spcPct val="90000"/>
+              </a:lnSpc>
+              <a:spcBef>
+                <a:spcPts val="200"/>
+              </a:spcBef>
+              <a:spcAft>
+                <a:spcPts val="400"/>
+              </a:spcAft>
+              <a:buClr>
+                <a:schemeClr val="accent1"/>
+              </a:buClr>
+              <a:buFont typeface="Calibri" pitchFamily="34" charset="0"/>
+              <a:buChar char="◦"/>
+              <a:defRPr sz="1400" kern="1200">
+                <a:solidFill>
+                  <a:schemeClr val="tx1">
+                    <a:lumMod val="75000"/>
+                    <a:lumOff val="25000"/>
+                  </a:schemeClr>
+                </a:solidFill>
+                <a:latin typeface="+mn-lt"/>
+                <a:ea typeface="+mn-ea"/>
+                <a:cs typeface="+mn-cs"/>
+              </a:defRPr>
+            </a:lvl9pPr>
+          </a:lstStyle>
+          <a:p>
+            <a:r>
+              <a:rPr lang="pt-BR" dirty="0"/>
+              <a:t>O método construtor está definido como </a:t>
+            </a:r>
+            <a:r>
+              <a:rPr lang="pt-BR" b="1" dirty="0"/>
+              <a:t>public</a:t>
+            </a:r>
+            <a:r>
+              <a:rPr lang="pt-BR" dirty="0"/>
+              <a:t>, para que a classe tenha acesso ao Método, e assim, conseguir instanciar novos Objetos da Classe Conta.</a:t>
+            </a:r>
+          </a:p>
+          <a:p>
+            <a:r>
+              <a:rPr lang="pt-BR" dirty="0"/>
+              <a:t>Em cada atributo temos a palavra </a:t>
+            </a:r>
+            <a:r>
+              <a:rPr lang="pt-BR" b="1" dirty="0"/>
+              <a:t>this</a:t>
+            </a:r>
+            <a:r>
+              <a:rPr lang="pt-BR" dirty="0"/>
+              <a:t>. </a:t>
+            </a:r>
+          </a:p>
+          <a:p>
+            <a:r>
+              <a:rPr lang="pt-BR" dirty="0"/>
+              <a:t>Sempre que os nomes dos parâmetros forem iguais aos nomes dos atributos da classe, devemos usar a palavra reservada </a:t>
+            </a:r>
+            <a:r>
+              <a:rPr lang="pt-BR" b="1" dirty="0"/>
+              <a:t>this </a:t>
+            </a:r>
+            <a:r>
+              <a:rPr lang="pt-BR" dirty="0"/>
+              <a:t>para identificar quem é o atributo.</a:t>
+            </a:r>
+          </a:p>
+        </p:txBody>
+      </p:sp>
+    </p:spTree>
+    <p:extLst>
+      <p:ext uri="{BB962C8B-B14F-4D97-AF65-F5344CB8AC3E}">
+        <p14:creationId xmlns:p14="http://schemas.microsoft.com/office/powerpoint/2010/main" val="376680265"/>
+      </p:ext>
+    </p:extLst>
+  </p:cSld>
+  <p:clrMapOvr>
+    <a:masterClrMapping/>
+  </p:clrMapOvr>
+</p:sld>
+</file>
+
+<file path=ppt/slides/slide22.xml><?xml version="1.0" encoding="utf-8"?>
+<p:sld xmlns:a="http://schemas.openxmlformats.org/drawingml/2006/main" xmlns:r="http://schemas.openxmlformats.org/officeDocument/2006/relationships" xmlns:p="http://schemas.openxmlformats.org/presentationml/2006/main">
+  <p:cSld>
+    <p:spTree>
+      <p:nvGrpSpPr>
+        <p:cNvPr id="1" name=""/>
+        <p:cNvGrpSpPr/>
+        <p:nvPr/>
+      </p:nvGrpSpPr>
+      <p:grpSpPr>
+        <a:xfrm>
+          <a:off x="0" y="0"/>
+          <a:ext cx="0" cy="0"/>
+          <a:chOff x="0" y="0"/>
+          <a:chExt cx="0" cy="0"/>
+        </a:xfrm>
+      </p:grpSpPr>
+      <p:sp>
+        <p:nvSpPr>
+          <p:cNvPr id="2" name="Título 1">
+            <a:extLst>
+              <a:ext uri="{FF2B5EF4-FFF2-40B4-BE49-F238E27FC236}">
+                <a16:creationId xmlns:a16="http://schemas.microsoft.com/office/drawing/2014/main" id="{1446C375-068E-C004-D4FD-C526E4959ACC}"/>
+              </a:ext>
+            </a:extLst>
+          </p:cNvPr>
+          <p:cNvSpPr>
+            <a:spLocks noGrp="1"/>
+          </p:cNvSpPr>
+          <p:nvPr>
+            <p:ph type="title"/>
+          </p:nvPr>
+        </p:nvSpPr>
+        <p:spPr/>
+        <p:txBody>
+          <a:bodyPr/>
+          <a:lstStyle/>
+          <a:p>
+            <a:r>
+              <a:rPr lang="pt-BR" dirty="0"/>
+              <a:t>MÉTODOS ESPECIAIS</a:t>
+            </a:r>
+            <a:br>
+              <a:rPr lang="pt-BR" dirty="0"/>
+            </a:br>
+            <a:r>
+              <a:rPr lang="pt-BR" sz="2000" dirty="0"/>
+              <a:t>MÉTODO GET E SET</a:t>
+            </a:r>
+          </a:p>
+        </p:txBody>
+      </p:sp>
+      <p:sp>
+        <p:nvSpPr>
+          <p:cNvPr id="3" name="Espaço Reservado para Conteúdo 2">
+            <a:extLst>
+              <a:ext uri="{FF2B5EF4-FFF2-40B4-BE49-F238E27FC236}">
+                <a16:creationId xmlns:a16="http://schemas.microsoft.com/office/drawing/2014/main" id="{764519FC-2B02-5BE1-482B-D3172B8F2C2A}"/>
+              </a:ext>
+            </a:extLst>
+          </p:cNvPr>
+          <p:cNvSpPr>
+            <a:spLocks noGrp="1"/>
+          </p:cNvSpPr>
+          <p:nvPr>
+            <p:ph idx="1"/>
+          </p:nvPr>
+        </p:nvSpPr>
+        <p:spPr/>
+        <p:txBody>
+          <a:bodyPr>
+            <a:normAutofit/>
+          </a:bodyPr>
+          <a:lstStyle/>
+          <a:p>
+            <a:r>
+              <a:rPr lang="pt-BR" dirty="0"/>
+              <a:t>São técnicas para gerenciamento de acesso dos atributos., onde será determinado quando será o atributo e o acesso, tornando o controle e modificação mais pratico, sem alterar a estrutura do código.</a:t>
+            </a:r>
+          </a:p>
+          <a:p>
+            <a:r>
+              <a:rPr lang="pt-BR" dirty="0"/>
+              <a:t>Os atributos privados apenas podem ser modificados e manipulados por estes métodos.</a:t>
+            </a:r>
+          </a:p>
+          <a:p>
+            <a:endParaRPr lang="pt-BR" dirty="0"/>
+          </a:p>
+        </p:txBody>
+      </p:sp>
+    </p:spTree>
+    <p:extLst>
+      <p:ext uri="{BB962C8B-B14F-4D97-AF65-F5344CB8AC3E}">
+        <p14:creationId xmlns:p14="http://schemas.microsoft.com/office/powerpoint/2010/main" val="3522731292"/>
+      </p:ext>
+    </p:extLst>
+  </p:cSld>
+  <p:clrMapOvr>
+    <a:masterClrMapping/>
+  </p:clrMapOvr>
+</p:sld>
+</file>
+
+<file path=ppt/slides/slide23.xml><?xml version="1.0" encoding="utf-8"?>
+<p:sld xmlns:a="http://schemas.openxmlformats.org/drawingml/2006/main" xmlns:r="http://schemas.openxmlformats.org/officeDocument/2006/relationships" xmlns:p="http://schemas.openxmlformats.org/presentationml/2006/main">
+  <p:cSld>
+    <p:spTree>
+      <p:nvGrpSpPr>
+        <p:cNvPr id="1" name=""/>
+        <p:cNvGrpSpPr/>
+        <p:nvPr/>
+      </p:nvGrpSpPr>
+      <p:grpSpPr>
+        <a:xfrm>
+          <a:off x="0" y="0"/>
+          <a:ext cx="0" cy="0"/>
+          <a:chOff x="0" y="0"/>
+          <a:chExt cx="0" cy="0"/>
+        </a:xfrm>
+      </p:grpSpPr>
+      <p:sp>
+        <p:nvSpPr>
+          <p:cNvPr id="2" name="Título 1">
+            <a:extLst>
+              <a:ext uri="{FF2B5EF4-FFF2-40B4-BE49-F238E27FC236}">
+                <a16:creationId xmlns:a16="http://schemas.microsoft.com/office/drawing/2014/main" id="{1446C375-068E-C004-D4FD-C526E4959ACC}"/>
+              </a:ext>
+            </a:extLst>
+          </p:cNvPr>
+          <p:cNvSpPr>
+            <a:spLocks noGrp="1"/>
+          </p:cNvSpPr>
+          <p:nvPr>
+            <p:ph type="title"/>
+          </p:nvPr>
+        </p:nvSpPr>
+        <p:spPr/>
+        <p:txBody>
+          <a:bodyPr/>
+          <a:lstStyle/>
+          <a:p>
+            <a:r>
+              <a:rPr lang="pt-BR" dirty="0"/>
+              <a:t>MÉTODOS ESPECIAIS</a:t>
+            </a:r>
+            <a:br>
+              <a:rPr lang="pt-BR" dirty="0"/>
+            </a:br>
+            <a:r>
+              <a:rPr lang="pt-BR" sz="2000" dirty="0"/>
+              <a:t>MÉTODO GET E SET</a:t>
+            </a:r>
+          </a:p>
+        </p:txBody>
+      </p:sp>
+      <p:sp>
+        <p:nvSpPr>
+          <p:cNvPr id="3" name="Espaço Reservado para Conteúdo 2">
+            <a:extLst>
+              <a:ext uri="{FF2B5EF4-FFF2-40B4-BE49-F238E27FC236}">
+                <a16:creationId xmlns:a16="http://schemas.microsoft.com/office/drawing/2014/main" id="{764519FC-2B02-5BE1-482B-D3172B8F2C2A}"/>
+              </a:ext>
+            </a:extLst>
+          </p:cNvPr>
+          <p:cNvSpPr>
+            <a:spLocks noGrp="1"/>
+          </p:cNvSpPr>
+          <p:nvPr>
+            <p:ph idx="1"/>
+          </p:nvPr>
+        </p:nvSpPr>
+        <p:spPr/>
+        <p:txBody>
+          <a:bodyPr>
+            <a:normAutofit/>
+          </a:bodyPr>
+          <a:lstStyle/>
+          <a:p>
+            <a:r>
+              <a:rPr lang="pt-BR" dirty="0"/>
+              <a:t>O método SET (</a:t>
+            </a:r>
+            <a:r>
+              <a:rPr lang="pt-BR" dirty="0" err="1"/>
+              <a:t>setters</a:t>
+            </a:r>
+            <a:r>
+              <a:rPr lang="pt-BR" dirty="0"/>
+              <a:t>) serve para modificar atributos.</a:t>
+            </a:r>
+          </a:p>
+          <a:p>
+            <a:r>
+              <a:rPr lang="pt-BR" dirty="0"/>
+              <a:t>Caso o nome do atributo seja </a:t>
+            </a:r>
+            <a:r>
+              <a:rPr lang="pt-BR" b="1" dirty="0"/>
+              <a:t>nome</a:t>
+            </a:r>
+            <a:r>
+              <a:rPr lang="pt-BR" dirty="0"/>
+              <a:t>, com o método ficará </a:t>
+            </a:r>
+            <a:r>
+              <a:rPr lang="pt-BR" b="1" dirty="0"/>
+              <a:t>setNome</a:t>
+            </a:r>
+            <a:r>
+              <a:rPr lang="pt-BR" dirty="0"/>
+              <a:t>.</a:t>
+            </a:r>
+          </a:p>
+          <a:p>
+            <a:r>
+              <a:rPr lang="pt-BR" dirty="0"/>
+              <a:t>Exemplo:</a:t>
+            </a:r>
+          </a:p>
+          <a:p>
+            <a:pPr marL="1117120" lvl="6" indent="0">
+              <a:buNone/>
+            </a:pPr>
+            <a:r>
+              <a:rPr lang="pt-BR" dirty="0">
+                <a:solidFill>
+                  <a:srgbClr val="FF0000"/>
+                </a:solidFill>
+              </a:rPr>
+              <a:t>	</a:t>
+            </a:r>
+            <a:r>
+              <a:rPr lang="pt-BR" sz="2000" dirty="0">
+                <a:solidFill>
+                  <a:srgbClr val="FF0000"/>
+                </a:solidFill>
+              </a:rPr>
+              <a:t>public </a:t>
+            </a:r>
+            <a:r>
+              <a:rPr lang="pt-BR" sz="2000" dirty="0">
+                <a:solidFill>
+                  <a:schemeClr val="tx1"/>
+                </a:solidFill>
+              </a:rPr>
+              <a:t>void setNome(String nome) {</a:t>
+            </a:r>
+          </a:p>
+          <a:p>
+            <a:pPr marL="1117120" lvl="6" indent="0">
+              <a:buNone/>
+            </a:pPr>
+            <a:r>
+              <a:rPr lang="pt-BR" sz="2000" dirty="0">
+                <a:solidFill>
+                  <a:schemeClr val="tx1"/>
+                </a:solidFill>
+              </a:rPr>
+              <a:t>		this.numero = numero;</a:t>
+            </a:r>
+          </a:p>
+          <a:p>
+            <a:pPr marL="871400" lvl="5" indent="0">
+              <a:buNone/>
+            </a:pPr>
+            <a:r>
+              <a:rPr lang="pt-BR" sz="2000" dirty="0">
+                <a:solidFill>
+                  <a:schemeClr val="tx1"/>
+                </a:solidFill>
+              </a:rPr>
+              <a:t>		}</a:t>
+            </a:r>
+          </a:p>
+          <a:p>
+            <a:r>
+              <a:rPr lang="pt-BR" dirty="0"/>
+              <a:t>O atributo nome foi adicionado a palavra reservada </a:t>
+            </a:r>
+            <a:r>
+              <a:rPr lang="pt-BR" b="1" dirty="0"/>
+              <a:t>this</a:t>
+            </a:r>
+            <a:r>
+              <a:rPr lang="pt-BR" dirty="0"/>
+              <a:t> porque o nome é igual para a variável do método SET e o nome do atributo da classe.</a:t>
+            </a:r>
+            <a:endParaRPr lang="pt-BR" b="1" dirty="0"/>
+          </a:p>
+        </p:txBody>
+      </p:sp>
+    </p:spTree>
+    <p:extLst>
+      <p:ext uri="{BB962C8B-B14F-4D97-AF65-F5344CB8AC3E}">
+        <p14:creationId xmlns:p14="http://schemas.microsoft.com/office/powerpoint/2010/main" val="3930689822"/>
+      </p:ext>
+    </p:extLst>
+  </p:cSld>
+  <p:clrMapOvr>
+    <a:masterClrMapping/>
+  </p:clrMapOvr>
+</p:sld>
+</file>
+
+<file path=ppt/slides/slide24.xml><?xml version="1.0" encoding="utf-8"?>
+<p:sld xmlns:a="http://schemas.openxmlformats.org/drawingml/2006/main" xmlns:r="http://schemas.openxmlformats.org/officeDocument/2006/relationships" xmlns:p="http://schemas.openxmlformats.org/presentationml/2006/main">
+  <p:cSld>
+    <p:spTree>
+      <p:nvGrpSpPr>
+        <p:cNvPr id="1" name=""/>
+        <p:cNvGrpSpPr/>
+        <p:nvPr/>
+      </p:nvGrpSpPr>
+      <p:grpSpPr>
+        <a:xfrm>
+          <a:off x="0" y="0"/>
+          <a:ext cx="0" cy="0"/>
+          <a:chOff x="0" y="0"/>
+          <a:chExt cx="0" cy="0"/>
+        </a:xfrm>
+      </p:grpSpPr>
+      <p:sp>
+        <p:nvSpPr>
+          <p:cNvPr id="2" name="Título 1">
+            <a:extLst>
+              <a:ext uri="{FF2B5EF4-FFF2-40B4-BE49-F238E27FC236}">
+                <a16:creationId xmlns:a16="http://schemas.microsoft.com/office/drawing/2014/main" id="{1446C375-068E-C004-D4FD-C526E4959ACC}"/>
+              </a:ext>
+            </a:extLst>
+          </p:cNvPr>
+          <p:cNvSpPr>
+            <a:spLocks noGrp="1"/>
+          </p:cNvSpPr>
+          <p:nvPr>
+            <p:ph type="title"/>
+          </p:nvPr>
+        </p:nvSpPr>
+        <p:spPr/>
+        <p:txBody>
+          <a:bodyPr/>
+          <a:lstStyle/>
+          <a:p>
+            <a:r>
+              <a:rPr lang="pt-BR" dirty="0"/>
+              <a:t>MÉTODOS ESPECIAIS</a:t>
+            </a:r>
+            <a:br>
+              <a:rPr lang="pt-BR" dirty="0"/>
+            </a:br>
+            <a:r>
+              <a:rPr lang="pt-BR" sz="2000" dirty="0"/>
+              <a:t>MÉTODO GET E SET</a:t>
+            </a:r>
+          </a:p>
+        </p:txBody>
+      </p:sp>
+      <p:sp>
+        <p:nvSpPr>
+          <p:cNvPr id="3" name="Espaço Reservado para Conteúdo 2">
+            <a:extLst>
+              <a:ext uri="{FF2B5EF4-FFF2-40B4-BE49-F238E27FC236}">
+                <a16:creationId xmlns:a16="http://schemas.microsoft.com/office/drawing/2014/main" id="{764519FC-2B02-5BE1-482B-D3172B8F2C2A}"/>
+              </a:ext>
+            </a:extLst>
+          </p:cNvPr>
+          <p:cNvSpPr>
+            <a:spLocks noGrp="1"/>
+          </p:cNvSpPr>
+          <p:nvPr>
+            <p:ph idx="1"/>
+          </p:nvPr>
+        </p:nvSpPr>
+        <p:spPr/>
+        <p:txBody>
+          <a:bodyPr>
+            <a:normAutofit lnSpcReduction="10000"/>
+          </a:bodyPr>
+          <a:lstStyle/>
+          <a:p>
+            <a:r>
+              <a:rPr lang="pt-BR" dirty="0"/>
+              <a:t>O método GET (getters) serve para ler os dados dos atributos.</a:t>
+            </a:r>
+          </a:p>
+          <a:p>
+            <a:r>
+              <a:rPr lang="pt-BR" dirty="0"/>
+              <a:t>Este método não recebe um parâmetro, diferente do método SET, e são conhecidos como métodos de consulta, porque ele tem acesso aos atributos do objeto.</a:t>
+            </a:r>
+          </a:p>
+          <a:p>
+            <a:r>
+              <a:rPr lang="pt-BR" dirty="0"/>
+              <a:t>Caso o nome do atributo seja </a:t>
+            </a:r>
+            <a:r>
+              <a:rPr lang="pt-BR" b="1" dirty="0"/>
+              <a:t>nome</a:t>
+            </a:r>
+            <a:r>
+              <a:rPr lang="pt-BR" dirty="0"/>
+              <a:t>, com o método ficará </a:t>
+            </a:r>
+            <a:r>
+              <a:rPr lang="pt-BR" b="1" dirty="0"/>
+              <a:t>getNome()</a:t>
+            </a:r>
+            <a:r>
+              <a:rPr lang="pt-BR" dirty="0"/>
+              <a:t>.</a:t>
+            </a:r>
+          </a:p>
+          <a:p>
+            <a:r>
+              <a:rPr lang="pt-BR" dirty="0"/>
+              <a:t>Exemplo:</a:t>
+            </a:r>
+          </a:p>
+          <a:p>
+            <a:pPr marL="1117120" lvl="6" indent="0">
+              <a:buNone/>
+            </a:pPr>
+            <a:r>
+              <a:rPr lang="pt-BR" dirty="0">
+                <a:solidFill>
+                  <a:srgbClr val="FF0000"/>
+                </a:solidFill>
+              </a:rPr>
+              <a:t>	</a:t>
+            </a:r>
+            <a:r>
+              <a:rPr lang="pt-BR" sz="2000" dirty="0">
+                <a:solidFill>
+                  <a:srgbClr val="FF0000"/>
+                </a:solidFill>
+              </a:rPr>
+              <a:t>public </a:t>
+            </a:r>
+            <a:r>
+              <a:rPr lang="pt-BR" sz="2000" dirty="0">
+                <a:solidFill>
+                  <a:schemeClr val="tx1"/>
+                </a:solidFill>
+              </a:rPr>
+              <a:t>int getNome() {</a:t>
+            </a:r>
+          </a:p>
+          <a:p>
+            <a:pPr marL="1117120" lvl="6" indent="0">
+              <a:buNone/>
+            </a:pPr>
+            <a:r>
+              <a:rPr lang="pt-BR" sz="2000" dirty="0">
+                <a:solidFill>
+                  <a:schemeClr val="tx1"/>
+                </a:solidFill>
+              </a:rPr>
+              <a:t>		</a:t>
+            </a:r>
+            <a:r>
+              <a:rPr lang="pt-BR" sz="2000" dirty="0">
+                <a:solidFill>
+                  <a:srgbClr val="FF0000"/>
+                </a:solidFill>
+              </a:rPr>
+              <a:t>return</a:t>
+            </a:r>
+            <a:r>
+              <a:rPr lang="pt-BR" sz="2000" dirty="0">
+                <a:solidFill>
+                  <a:schemeClr val="tx1"/>
+                </a:solidFill>
+              </a:rPr>
+              <a:t> numero;</a:t>
+            </a:r>
+          </a:p>
+          <a:p>
+            <a:pPr marL="871400" lvl="5" indent="0">
+              <a:buNone/>
+            </a:pPr>
+            <a:r>
+              <a:rPr lang="pt-BR" sz="2000" dirty="0">
+                <a:solidFill>
+                  <a:schemeClr val="tx1"/>
+                </a:solidFill>
+              </a:rPr>
+              <a:t>		}</a:t>
+            </a:r>
+          </a:p>
+          <a:p>
+            <a:r>
+              <a:rPr lang="pt-BR" dirty="0"/>
+              <a:t>O método GET retorna o valor do atributo.</a:t>
+            </a:r>
+          </a:p>
+          <a:p>
+            <a:r>
+              <a:rPr lang="pt-BR" dirty="0"/>
+              <a:t>O método GET e SET podem fornecer acesso aos dados privados, mas o acesso é restringido pelo programador ao implementar os métodos.</a:t>
+            </a:r>
+          </a:p>
+        </p:txBody>
+      </p:sp>
+    </p:spTree>
+    <p:extLst>
+      <p:ext uri="{BB962C8B-B14F-4D97-AF65-F5344CB8AC3E}">
+        <p14:creationId xmlns:p14="http://schemas.microsoft.com/office/powerpoint/2010/main" val="93921650"/>
+      </p:ext>
+    </p:extLst>
+  </p:cSld>
+  <p:clrMapOvr>
+    <a:masterClrMapping/>
+  </p:clrMapOvr>
+</p:sld>
+</file>
+
+<file path=ppt/slides/slide25.xml><?xml version="1.0" encoding="utf-8"?>
+<p:sld xmlns:a="http://schemas.openxmlformats.org/drawingml/2006/main" xmlns:r="http://schemas.openxmlformats.org/officeDocument/2006/relationships" xmlns:p="http://schemas.openxmlformats.org/presentationml/2006/main">
+  <p:cSld>
+    <p:spTree>
+      <p:nvGrpSpPr>
+        <p:cNvPr id="1" name=""/>
+        <p:cNvGrpSpPr/>
+        <p:nvPr/>
+      </p:nvGrpSpPr>
+      <p:grpSpPr>
+        <a:xfrm>
+          <a:off x="0" y="0"/>
+          <a:ext cx="0" cy="0"/>
+          <a:chOff x="0" y="0"/>
+          <a:chExt cx="0" cy="0"/>
+        </a:xfrm>
+      </p:grpSpPr>
+      <p:sp>
+        <p:nvSpPr>
+          <p:cNvPr id="2" name="Título 1">
+            <a:extLst>
+              <a:ext uri="{FF2B5EF4-FFF2-40B4-BE49-F238E27FC236}">
+                <a16:creationId xmlns:a16="http://schemas.microsoft.com/office/drawing/2014/main" id="{1446C375-068E-C004-D4FD-C526E4959ACC}"/>
+              </a:ext>
+            </a:extLst>
+          </p:cNvPr>
+          <p:cNvSpPr>
+            <a:spLocks noGrp="1"/>
+          </p:cNvSpPr>
+          <p:nvPr>
+            <p:ph type="title"/>
+          </p:nvPr>
+        </p:nvSpPr>
+        <p:spPr/>
+        <p:txBody>
+          <a:bodyPr/>
+          <a:lstStyle/>
+          <a:p>
+            <a:r>
+              <a:rPr lang="pt-BR" dirty="0"/>
+              <a:t>MÉTODOS ESPECIAIS</a:t>
+            </a:r>
+            <a:br>
+              <a:rPr lang="pt-BR" dirty="0"/>
+            </a:br>
+            <a:r>
+              <a:rPr lang="pt-BR" sz="2000" dirty="0"/>
+              <a:t>MÉTODO GET E SET</a:t>
+            </a:r>
+          </a:p>
+        </p:txBody>
+      </p:sp>
+      <p:sp>
+        <p:nvSpPr>
+          <p:cNvPr id="3" name="Espaço Reservado para Conteúdo 2">
+            <a:extLst>
+              <a:ext uri="{FF2B5EF4-FFF2-40B4-BE49-F238E27FC236}">
+                <a16:creationId xmlns:a16="http://schemas.microsoft.com/office/drawing/2014/main" id="{764519FC-2B02-5BE1-482B-D3172B8F2C2A}"/>
+              </a:ext>
+            </a:extLst>
+          </p:cNvPr>
+          <p:cNvSpPr>
+            <a:spLocks noGrp="1"/>
+          </p:cNvSpPr>
+          <p:nvPr>
+            <p:ph idx="1"/>
+          </p:nvPr>
+        </p:nvSpPr>
+        <p:spPr>
+          <a:xfrm>
+            <a:off x="1097281" y="1845734"/>
+            <a:ext cx="10058400" cy="4023360"/>
+          </a:xfrm>
+        </p:spPr>
+        <p:txBody>
+          <a:bodyPr>
+            <a:normAutofit/>
+          </a:bodyPr>
+          <a:lstStyle/>
+          <a:p>
+            <a:r>
+              <a:rPr lang="pt-BR" dirty="0"/>
+              <a:t>As vantagens de usar os métodos GETTERS e SETTERS são:</a:t>
+            </a:r>
+          </a:p>
+          <a:p>
+            <a:pPr lvl="1"/>
+            <a:r>
+              <a:rPr lang="pt-BR" dirty="0"/>
+              <a:t>Remover o </a:t>
+            </a:r>
+            <a:r>
+              <a:rPr lang="pt-BR" dirty="0" err="1"/>
+              <a:t>setter</a:t>
+            </a:r>
+            <a:r>
+              <a:rPr lang="pt-BR" dirty="0"/>
+              <a:t> de um atributo fará ele não ser modificado por outras classes;</a:t>
+            </a:r>
+          </a:p>
+          <a:p>
+            <a:pPr lvl="1"/>
+            <a:r>
+              <a:rPr lang="pt-BR" dirty="0"/>
+              <a:t>Remover o </a:t>
+            </a:r>
+            <a:r>
+              <a:rPr lang="pt-BR" dirty="0" err="1"/>
+              <a:t>getter</a:t>
+            </a:r>
+            <a:r>
+              <a:rPr lang="pt-BR" dirty="0"/>
+              <a:t> de um atributo fará ele não ser lido por outras classes;</a:t>
+            </a:r>
+          </a:p>
+          <a:p>
+            <a:pPr lvl="1"/>
+            <a:r>
+              <a:rPr lang="pt-BR" dirty="0"/>
+              <a:t>O </a:t>
+            </a:r>
+            <a:r>
+              <a:rPr lang="pt-BR" dirty="0" err="1"/>
+              <a:t>setter</a:t>
+            </a:r>
+            <a:r>
+              <a:rPr lang="pt-BR" dirty="0"/>
+              <a:t> permite validar os dados, armazenando dados corretos ates de agregá-los aos atributos;</a:t>
+            </a:r>
+          </a:p>
+          <a:p>
+            <a:pPr lvl="1"/>
+            <a:r>
+              <a:rPr lang="pt-BR" dirty="0"/>
+              <a:t>O </a:t>
+            </a:r>
+            <a:r>
+              <a:rPr lang="pt-BR" dirty="0" err="1"/>
+              <a:t>getter</a:t>
+            </a:r>
+            <a:r>
+              <a:rPr lang="pt-BR" dirty="0"/>
+              <a:t> permite esconder o tipo de dado que o atributo tem armazenado.</a:t>
+            </a:r>
+          </a:p>
+        </p:txBody>
+      </p:sp>
+    </p:spTree>
+    <p:extLst>
+      <p:ext uri="{BB962C8B-B14F-4D97-AF65-F5344CB8AC3E}">
+        <p14:creationId xmlns:p14="http://schemas.microsoft.com/office/powerpoint/2010/main" val="2286055846"/>
+      </p:ext>
+    </p:extLst>
+  </p:cSld>
+  <p:clrMapOvr>
+    <a:masterClrMapping/>
+  </p:clrMapOvr>
+</p:sld>
+</file>
+
+<file path=ppt/slides/slide26.xml><?xml version="1.0" encoding="utf-8"?>
+<p:sld xmlns:a="http://schemas.openxmlformats.org/drawingml/2006/main" xmlns:r="http://schemas.openxmlformats.org/officeDocument/2006/relationships" xmlns:p="http://schemas.openxmlformats.org/presentationml/2006/main">
+  <p:cSld>
+    <p:spTree>
+      <p:nvGrpSpPr>
+        <p:cNvPr id="1" name=""/>
+        <p:cNvGrpSpPr/>
+        <p:nvPr/>
+      </p:nvGrpSpPr>
+      <p:grpSpPr>
+        <a:xfrm>
+          <a:off x="0" y="0"/>
+          <a:ext cx="0" cy="0"/>
+          <a:chOff x="0" y="0"/>
+          <a:chExt cx="0" cy="0"/>
+        </a:xfrm>
+      </p:grpSpPr>
+      <p:sp>
+        <p:nvSpPr>
+          <p:cNvPr id="2" name="Título 1">
+            <a:extLst>
+              <a:ext uri="{FF2B5EF4-FFF2-40B4-BE49-F238E27FC236}">
+                <a16:creationId xmlns:a16="http://schemas.microsoft.com/office/drawing/2014/main" id="{1446C375-068E-C004-D4FD-C526E4959ACC}"/>
+              </a:ext>
+            </a:extLst>
+          </p:cNvPr>
+          <p:cNvSpPr>
+            <a:spLocks noGrp="1"/>
+          </p:cNvSpPr>
+          <p:nvPr>
+            <p:ph type="title"/>
+          </p:nvPr>
+        </p:nvSpPr>
+        <p:spPr/>
+        <p:txBody>
+          <a:bodyPr/>
+          <a:lstStyle/>
+          <a:p>
+            <a:r>
+              <a:rPr lang="pt-BR" dirty="0"/>
+              <a:t>MÉTODOS ESPECIAIS</a:t>
+            </a:r>
+            <a:br>
+              <a:rPr lang="pt-BR" dirty="0"/>
+            </a:br>
+            <a:r>
+              <a:rPr lang="pt-BR" sz="2000" dirty="0"/>
+              <a:t>MÉTODO GET E SET</a:t>
+            </a:r>
+          </a:p>
+        </p:txBody>
+      </p:sp>
+      <p:sp>
+        <p:nvSpPr>
+          <p:cNvPr id="6" name="Espaço Reservado para Conteúdo 5">
+            <a:extLst>
+              <a:ext uri="{FF2B5EF4-FFF2-40B4-BE49-F238E27FC236}">
+                <a16:creationId xmlns:a16="http://schemas.microsoft.com/office/drawing/2014/main" id="{7F6AA69A-CE2C-DE8E-25ED-5DA18AB54FB7}"/>
+              </a:ext>
+            </a:extLst>
+          </p:cNvPr>
+          <p:cNvSpPr>
+            <a:spLocks noGrp="1"/>
+          </p:cNvSpPr>
+          <p:nvPr>
+            <p:ph idx="1"/>
+          </p:nvPr>
+        </p:nvSpPr>
+        <p:spPr/>
+        <p:txBody>
+          <a:bodyPr/>
+          <a:lstStyle/>
+          <a:p>
+            <a:r>
+              <a:rPr lang="pt-BR" b="1" dirty="0"/>
+              <a:t>Atividade</a:t>
+            </a:r>
+            <a:r>
+              <a:rPr lang="pt-BR" dirty="0"/>
+              <a:t>:</a:t>
+            </a:r>
+          </a:p>
+          <a:p>
+            <a:r>
+              <a:rPr lang="pt-BR" dirty="0"/>
+              <a:t>Implemente o método GET e SET dos seguintes atributos da classe Alunos:</a:t>
+            </a:r>
+          </a:p>
+          <a:p>
+            <a:pPr lvl="1"/>
+            <a:r>
+              <a:rPr lang="pt-BR" dirty="0"/>
+              <a:t>Nome;</a:t>
+            </a:r>
+          </a:p>
+          <a:p>
+            <a:pPr lvl="1"/>
+            <a:r>
+              <a:rPr lang="pt-BR" dirty="0"/>
+              <a:t>Idade;</a:t>
+            </a:r>
+          </a:p>
+          <a:p>
+            <a:pPr lvl="1"/>
+            <a:r>
+              <a:rPr lang="pt-BR" dirty="0"/>
+              <a:t>CPF;</a:t>
+            </a:r>
+          </a:p>
+          <a:p>
+            <a:pPr lvl="1"/>
+            <a:r>
+              <a:rPr lang="pt-BR" dirty="0"/>
+              <a:t>Serie;</a:t>
+            </a:r>
+          </a:p>
+          <a:p>
+            <a:r>
+              <a:rPr lang="pt-BR" dirty="0"/>
+              <a:t>Não se esqueça de colocar os tipos de dados para cada atributo.</a:t>
+            </a:r>
+          </a:p>
+        </p:txBody>
+      </p:sp>
+    </p:spTree>
+    <p:extLst>
+      <p:ext uri="{BB962C8B-B14F-4D97-AF65-F5344CB8AC3E}">
+        <p14:creationId xmlns:p14="http://schemas.microsoft.com/office/powerpoint/2010/main" val="3747660067"/>
       </p:ext>
     </p:extLst>
   </p:cSld>
@@ -9047,7 +12644,7 @@
             </a:r>
             <a:r>
               <a:rPr lang="pt-BR" dirty="0"/>
-              <a:t> (Carlito, -R$ 15k, 40028922) e os </a:t>
+              <a:t> (Guilherme, -R$ 15k, 40028922) e os </a:t>
             </a:r>
             <a:r>
               <a:rPr lang="pt-BR" u="sng" dirty="0"/>

</xml_diff>